<commit_message>
Set up presentation structure
- adjusted powerpoint
</commit_message>
<xml_diff>
--- a/DD2424_Presentation.pptx
+++ b/DD2424_Presentation.pptx
@@ -5,24 +5,26 @@
     <p:sldMasterId id="2147483648" r:id="rId1"/>
   </p:sldMasterIdLst>
   <p:notesMasterIdLst>
-    <p:notesMasterId r:id="rId7"/>
+    <p:notesMasterId r:id="rId9"/>
   </p:notesMasterIdLst>
   <p:sldIdLst>
-    <p:sldId id="257" r:id="rId2"/>
-    <p:sldId id="258" r:id="rId3"/>
-    <p:sldId id="259" r:id="rId4"/>
-    <p:sldId id="256" r:id="rId5"/>
-    <p:sldId id="260" r:id="rId6"/>
+    <p:sldId id="256" r:id="rId2"/>
+    <p:sldId id="260" r:id="rId3"/>
+    <p:sldId id="261" r:id="rId4"/>
+    <p:sldId id="262" r:id="rId5"/>
+    <p:sldId id="264" r:id="rId6"/>
+    <p:sldId id="263" r:id="rId7"/>
+    <p:sldId id="265" r:id="rId8"/>
   </p:sldIdLst>
   <p:sldSz cx="12192000" cy="6858000"/>
   <p:notesSz cx="6858000" cy="9144000"/>
   <p:embeddedFontLst>
     <p:embeddedFont>
       <p:font typeface="Figtree" panose="020B0604020202020204" charset="0"/>
-      <p:regular r:id="rId8"/>
-      <p:bold r:id="rId9"/>
-      <p:italic r:id="rId10"/>
-      <p:boldItalic r:id="rId11"/>
+      <p:regular r:id="rId10"/>
+      <p:bold r:id="rId11"/>
+      <p:italic r:id="rId12"/>
+      <p:boldItalic r:id="rId13"/>
     </p:embeddedFont>
   </p:embeddedFontLst>
   <p:defaultTextStyle>
@@ -131,7 +133,7 @@
 <file path=ppt/revisionInfo.xml><?xml version="1.0" encoding="utf-8"?>
 <p1510:revInfo xmlns:a="http://schemas.openxmlformats.org/drawingml/2006/main" xmlns:r="http://schemas.openxmlformats.org/officeDocument/2006/relationships" xmlns:p1510="http://schemas.microsoft.com/office/powerpoint/2015/10/main">
   <p1510:revLst>
-    <p1510:client id="{BFD96D7C-99C9-4945-9F60-205726AA4FD5}" v="1" dt="2025-05-21T07:40:24.155"/>
+    <p1510:client id="{BFD96D7C-99C9-4945-9F60-205726AA4FD5}" v="23" dt="2025-05-21T08:21:54.611"/>
   </p1510:revLst>
 </p1510:revInfo>
 </file>
@@ -140,17 +142,33 @@
 <pc:chgInfo xmlns:a="http://schemas.openxmlformats.org/drawingml/2006/main" xmlns:r="http://schemas.openxmlformats.org/officeDocument/2006/relationships" xmlns:ac="http://schemas.microsoft.com/office/drawing/2013/main/command" xmlns:pc="http://schemas.microsoft.com/office/powerpoint/2013/main/command">
   <pc:docChgLst>
     <pc:chgData name="Tobias Haunreiter" userId="0025fc2764ec76b2" providerId="LiveId" clId="{BFD96D7C-99C9-4945-9F60-205726AA4FD5}"/>
-    <pc:docChg chg="custSel modSld modMainMaster">
-      <pc:chgData name="Tobias Haunreiter" userId="0025fc2764ec76b2" providerId="LiveId" clId="{BFD96D7C-99C9-4945-9F60-205726AA4FD5}" dt="2025-05-21T07:41:03.505" v="207" actId="790"/>
+    <pc:docChg chg="undo custSel addSld delSld modSld modMainMaster">
+      <pc:chgData name="Tobias Haunreiter" userId="0025fc2764ec76b2" providerId="LiveId" clId="{BFD96D7C-99C9-4945-9F60-205726AA4FD5}" dt="2025-05-21T08:21:54.611" v="570"/>
       <pc:docMkLst>
         <pc:docMk/>
       </pc:docMkLst>
-      <pc:sldChg chg="modSp mod">
-        <pc:chgData name="Tobias Haunreiter" userId="0025fc2764ec76b2" providerId="LiveId" clId="{BFD96D7C-99C9-4945-9F60-205726AA4FD5}" dt="2025-05-21T07:40:15.718" v="206"/>
+      <pc:sldChg chg="addSp modSp mod">
+        <pc:chgData name="Tobias Haunreiter" userId="0025fc2764ec76b2" providerId="LiveId" clId="{BFD96D7C-99C9-4945-9F60-205726AA4FD5}" dt="2025-05-21T08:21:39.131" v="563" actId="207"/>
         <pc:sldMkLst>
           <pc:docMk/>
           <pc:sldMk cId="208122748" sldId="256"/>
         </pc:sldMkLst>
+        <pc:spChg chg="add mod">
+          <ac:chgData name="Tobias Haunreiter" userId="0025fc2764ec76b2" providerId="LiveId" clId="{BFD96D7C-99C9-4945-9F60-205726AA4FD5}" dt="2025-05-21T08:21:22.478" v="561"/>
+          <ac:spMkLst>
+            <pc:docMk/>
+            <pc:sldMk cId="208122748" sldId="256"/>
+            <ac:spMk id="2" creationId="{DF88E301-ECC5-8B1D-23F2-0141D098CCF1}"/>
+          </ac:spMkLst>
+        </pc:spChg>
+        <pc:spChg chg="add mod">
+          <ac:chgData name="Tobias Haunreiter" userId="0025fc2764ec76b2" providerId="LiveId" clId="{BFD96D7C-99C9-4945-9F60-205726AA4FD5}" dt="2025-05-21T08:21:22.478" v="561"/>
+          <ac:spMkLst>
+            <pc:docMk/>
+            <pc:sldMk cId="208122748" sldId="256"/>
+            <ac:spMk id="3" creationId="{05FD019D-0A36-8AE1-5196-BE214D7D8DF7}"/>
+          </ac:spMkLst>
+        </pc:spChg>
         <pc:spChg chg="mod">
           <ac:chgData name="Tobias Haunreiter" userId="0025fc2764ec76b2" providerId="LiveId" clId="{BFD96D7C-99C9-4945-9F60-205726AA4FD5}" dt="2025-05-21T07:40:15.718" v="206"/>
           <ac:spMkLst>
@@ -160,22 +178,75 @@
           </ac:spMkLst>
         </pc:spChg>
         <pc:spChg chg="mod">
-          <ac:chgData name="Tobias Haunreiter" userId="0025fc2764ec76b2" providerId="LiveId" clId="{BFD96D7C-99C9-4945-9F60-205726AA4FD5}" dt="2025-05-21T07:39:46.784" v="205" actId="20577"/>
+          <ac:chgData name="Tobias Haunreiter" userId="0025fc2764ec76b2" providerId="LiveId" clId="{BFD96D7C-99C9-4945-9F60-205726AA4FD5}" dt="2025-05-21T08:13:01.487" v="251" actId="6549"/>
           <ac:spMkLst>
             <pc:docMk/>
             <pc:sldMk cId="208122748" sldId="256"/>
             <ac:spMk id="5" creationId="{92A29924-00C9-C549-25FA-02CDD1D96ADA}"/>
           </ac:spMkLst>
         </pc:spChg>
+        <pc:spChg chg="add mod">
+          <ac:chgData name="Tobias Haunreiter" userId="0025fc2764ec76b2" providerId="LiveId" clId="{BFD96D7C-99C9-4945-9F60-205726AA4FD5}" dt="2025-05-21T08:21:22.478" v="561"/>
+          <ac:spMkLst>
+            <pc:docMk/>
+            <pc:sldMk cId="208122748" sldId="256"/>
+            <ac:spMk id="6" creationId="{88F90F12-1224-40E7-F43E-1DEE922B8DEB}"/>
+          </ac:spMkLst>
+        </pc:spChg>
+        <pc:spChg chg="add mod">
+          <ac:chgData name="Tobias Haunreiter" userId="0025fc2764ec76b2" providerId="LiveId" clId="{BFD96D7C-99C9-4945-9F60-205726AA4FD5}" dt="2025-05-21T08:21:39.131" v="563" actId="207"/>
+          <ac:spMkLst>
+            <pc:docMk/>
+            <pc:sldMk cId="208122748" sldId="256"/>
+            <ac:spMk id="7" creationId="{1208B5D9-EC21-9511-3DF3-BE0BB2ECF238}"/>
+          </ac:spMkLst>
+        </pc:spChg>
+        <pc:spChg chg="add mod">
+          <ac:chgData name="Tobias Haunreiter" userId="0025fc2764ec76b2" providerId="LiveId" clId="{BFD96D7C-99C9-4945-9F60-205726AA4FD5}" dt="2025-05-21T08:21:39.131" v="563" actId="207"/>
+          <ac:spMkLst>
+            <pc:docMk/>
+            <pc:sldMk cId="208122748" sldId="256"/>
+            <ac:spMk id="8" creationId="{FE2792F3-80EF-59E6-7BBA-89514789E73A}"/>
+          </ac:spMkLst>
+        </pc:spChg>
+        <pc:spChg chg="add mod">
+          <ac:chgData name="Tobias Haunreiter" userId="0025fc2764ec76b2" providerId="LiveId" clId="{BFD96D7C-99C9-4945-9F60-205726AA4FD5}" dt="2025-05-21T08:21:39.131" v="563" actId="207"/>
+          <ac:spMkLst>
+            <pc:docMk/>
+            <pc:sldMk cId="208122748" sldId="256"/>
+            <ac:spMk id="9" creationId="{26387869-C957-CB52-1AD0-879D80E2A755}"/>
+          </ac:spMkLst>
+        </pc:spChg>
       </pc:sldChg>
-      <pc:sldChg chg="modSp mod">
-        <pc:chgData name="Tobias Haunreiter" userId="0025fc2764ec76b2" providerId="LiveId" clId="{BFD96D7C-99C9-4945-9F60-205726AA4FD5}" dt="2025-05-21T07:41:03.505" v="207" actId="790"/>
+      <pc:sldChg chg="del">
+        <pc:chgData name="Tobias Haunreiter" userId="0025fc2764ec76b2" providerId="LiveId" clId="{BFD96D7C-99C9-4945-9F60-205726AA4FD5}" dt="2025-05-21T08:20:44.412" v="547" actId="47"/>
+        <pc:sldMkLst>
+          <pc:docMk/>
+          <pc:sldMk cId="1965575345" sldId="257"/>
+        </pc:sldMkLst>
+      </pc:sldChg>
+      <pc:sldChg chg="del">
+        <pc:chgData name="Tobias Haunreiter" userId="0025fc2764ec76b2" providerId="LiveId" clId="{BFD96D7C-99C9-4945-9F60-205726AA4FD5}" dt="2025-05-21T08:20:44.412" v="547" actId="47"/>
+        <pc:sldMkLst>
+          <pc:docMk/>
+          <pc:sldMk cId="1375005043" sldId="258"/>
+        </pc:sldMkLst>
+      </pc:sldChg>
+      <pc:sldChg chg="del">
+        <pc:chgData name="Tobias Haunreiter" userId="0025fc2764ec76b2" providerId="LiveId" clId="{BFD96D7C-99C9-4945-9F60-205726AA4FD5}" dt="2025-05-21T08:20:44.412" v="547" actId="47"/>
+        <pc:sldMkLst>
+          <pc:docMk/>
+          <pc:sldMk cId="3473794687" sldId="259"/>
+        </pc:sldMkLst>
+      </pc:sldChg>
+      <pc:sldChg chg="addSp modSp mod">
+        <pc:chgData name="Tobias Haunreiter" userId="0025fc2764ec76b2" providerId="LiveId" clId="{BFD96D7C-99C9-4945-9F60-205726AA4FD5}" dt="2025-05-21T08:21:49.838" v="565" actId="207"/>
         <pc:sldMkLst>
           <pc:docMk/>
           <pc:sldMk cId="214614124" sldId="260"/>
         </pc:sldMkLst>
         <pc:spChg chg="mod">
-          <ac:chgData name="Tobias Haunreiter" userId="0025fc2764ec76b2" providerId="LiveId" clId="{BFD96D7C-99C9-4945-9F60-205726AA4FD5}" dt="2025-05-21T07:41:03.505" v="207" actId="790"/>
+          <ac:chgData name="Tobias Haunreiter" userId="0025fc2764ec76b2" providerId="LiveId" clId="{BFD96D7C-99C9-4945-9F60-205726AA4FD5}" dt="2025-05-21T08:17:42.835" v="482" actId="790"/>
           <ac:spMkLst>
             <pc:docMk/>
             <pc:sldMk cId="214614124" sldId="260"/>
@@ -183,11 +254,414 @@
           </ac:spMkLst>
         </pc:spChg>
         <pc:spChg chg="mod">
-          <ac:chgData name="Tobias Haunreiter" userId="0025fc2764ec76b2" providerId="LiveId" clId="{BFD96D7C-99C9-4945-9F60-205726AA4FD5}" dt="2025-05-21T07:41:03.505" v="207" actId="790"/>
+          <ac:chgData name="Tobias Haunreiter" userId="0025fc2764ec76b2" providerId="LiveId" clId="{BFD96D7C-99C9-4945-9F60-205726AA4FD5}" dt="2025-05-21T08:17:42.835" v="482" actId="790"/>
           <ac:spMkLst>
             <pc:docMk/>
             <pc:sldMk cId="214614124" sldId="260"/>
             <ac:spMk id="3" creationId="{00000000-0000-0000-0000-000000000000}"/>
+          </ac:spMkLst>
+        </pc:spChg>
+        <pc:spChg chg="add mod">
+          <ac:chgData name="Tobias Haunreiter" userId="0025fc2764ec76b2" providerId="LiveId" clId="{BFD96D7C-99C9-4945-9F60-205726AA4FD5}" dt="2025-05-21T08:21:22.005" v="560"/>
+          <ac:spMkLst>
+            <pc:docMk/>
+            <pc:sldMk cId="214614124" sldId="260"/>
+            <ac:spMk id="4" creationId="{82264DEB-E308-4569-A7C3-C220249C1ECC}"/>
+          </ac:spMkLst>
+        </pc:spChg>
+        <pc:spChg chg="add mod">
+          <ac:chgData name="Tobias Haunreiter" userId="0025fc2764ec76b2" providerId="LiveId" clId="{BFD96D7C-99C9-4945-9F60-205726AA4FD5}" dt="2025-05-21T08:21:22.005" v="560"/>
+          <ac:spMkLst>
+            <pc:docMk/>
+            <pc:sldMk cId="214614124" sldId="260"/>
+            <ac:spMk id="5" creationId="{D8C6DCD7-DD0D-36A3-E8DA-242581F1D466}"/>
+          </ac:spMkLst>
+        </pc:spChg>
+        <pc:spChg chg="add mod">
+          <ac:chgData name="Tobias Haunreiter" userId="0025fc2764ec76b2" providerId="LiveId" clId="{BFD96D7C-99C9-4945-9F60-205726AA4FD5}" dt="2025-05-21T08:21:22.005" v="560"/>
+          <ac:spMkLst>
+            <pc:docMk/>
+            <pc:sldMk cId="214614124" sldId="260"/>
+            <ac:spMk id="6" creationId="{075F4A33-9500-BE0E-DB5C-E6D67FC70020}"/>
+          </ac:spMkLst>
+        </pc:spChg>
+        <pc:spChg chg="add mod">
+          <ac:chgData name="Tobias Haunreiter" userId="0025fc2764ec76b2" providerId="LiveId" clId="{BFD96D7C-99C9-4945-9F60-205726AA4FD5}" dt="2025-05-21T08:21:49.838" v="565" actId="207"/>
+          <ac:spMkLst>
+            <pc:docMk/>
+            <pc:sldMk cId="214614124" sldId="260"/>
+            <ac:spMk id="7" creationId="{C967664C-A1B6-AD03-D792-95292DCAA4F8}"/>
+          </ac:spMkLst>
+        </pc:spChg>
+        <pc:spChg chg="add mod">
+          <ac:chgData name="Tobias Haunreiter" userId="0025fc2764ec76b2" providerId="LiveId" clId="{BFD96D7C-99C9-4945-9F60-205726AA4FD5}" dt="2025-05-21T08:21:49.838" v="565" actId="207"/>
+          <ac:spMkLst>
+            <pc:docMk/>
+            <pc:sldMk cId="214614124" sldId="260"/>
+            <ac:spMk id="8" creationId="{5FB25BFE-F835-D72D-5CF6-5DD83795C63C}"/>
+          </ac:spMkLst>
+        </pc:spChg>
+        <pc:spChg chg="add mod">
+          <ac:chgData name="Tobias Haunreiter" userId="0025fc2764ec76b2" providerId="LiveId" clId="{BFD96D7C-99C9-4945-9F60-205726AA4FD5}" dt="2025-05-21T08:21:49.838" v="565" actId="207"/>
+          <ac:spMkLst>
+            <pc:docMk/>
+            <pc:sldMk cId="214614124" sldId="260"/>
+            <ac:spMk id="9" creationId="{4089DBF7-F1EF-9B28-0310-C1CDF24E523D}"/>
+          </ac:spMkLst>
+        </pc:spChg>
+      </pc:sldChg>
+      <pc:sldChg chg="addSp modSp new mod">
+        <pc:chgData name="Tobias Haunreiter" userId="0025fc2764ec76b2" providerId="LiveId" clId="{BFD96D7C-99C9-4945-9F60-205726AA4FD5}" dt="2025-05-21T08:21:51.737" v="566"/>
+        <pc:sldMkLst>
+          <pc:docMk/>
+          <pc:sldMk cId="3067886182" sldId="261"/>
+        </pc:sldMkLst>
+        <pc:spChg chg="mod">
+          <ac:chgData name="Tobias Haunreiter" userId="0025fc2764ec76b2" providerId="LiveId" clId="{BFD96D7C-99C9-4945-9F60-205726AA4FD5}" dt="2025-05-21T08:17:48.869" v="483" actId="790"/>
+          <ac:spMkLst>
+            <pc:docMk/>
+            <pc:sldMk cId="3067886182" sldId="261"/>
+            <ac:spMk id="2" creationId="{B58F7828-E2D2-DC6F-1C4B-82238F3405AE}"/>
+          </ac:spMkLst>
+        </pc:spChg>
+        <pc:spChg chg="mod">
+          <ac:chgData name="Tobias Haunreiter" userId="0025fc2764ec76b2" providerId="LiveId" clId="{BFD96D7C-99C9-4945-9F60-205726AA4FD5}" dt="2025-05-21T08:18:09.249" v="486" actId="313"/>
+          <ac:spMkLst>
+            <pc:docMk/>
+            <pc:sldMk cId="3067886182" sldId="261"/>
+            <ac:spMk id="3" creationId="{2BD1EE81-D28D-1580-AB3A-CA06824E22E7}"/>
+          </ac:spMkLst>
+        </pc:spChg>
+        <pc:spChg chg="add mod">
+          <ac:chgData name="Tobias Haunreiter" userId="0025fc2764ec76b2" providerId="LiveId" clId="{BFD96D7C-99C9-4945-9F60-205726AA4FD5}" dt="2025-05-21T08:21:21.200" v="559"/>
+          <ac:spMkLst>
+            <pc:docMk/>
+            <pc:sldMk cId="3067886182" sldId="261"/>
+            <ac:spMk id="4" creationId="{A048D491-BE03-8AEF-36FC-0F9AAF35F146}"/>
+          </ac:spMkLst>
+        </pc:spChg>
+        <pc:spChg chg="add mod">
+          <ac:chgData name="Tobias Haunreiter" userId="0025fc2764ec76b2" providerId="LiveId" clId="{BFD96D7C-99C9-4945-9F60-205726AA4FD5}" dt="2025-05-21T08:21:21.200" v="559"/>
+          <ac:spMkLst>
+            <pc:docMk/>
+            <pc:sldMk cId="3067886182" sldId="261"/>
+            <ac:spMk id="5" creationId="{9C7AEC64-239F-A80B-765A-683C7BD2E88B}"/>
+          </ac:spMkLst>
+        </pc:spChg>
+        <pc:spChg chg="add mod">
+          <ac:chgData name="Tobias Haunreiter" userId="0025fc2764ec76b2" providerId="LiveId" clId="{BFD96D7C-99C9-4945-9F60-205726AA4FD5}" dt="2025-05-21T08:21:21.200" v="559"/>
+          <ac:spMkLst>
+            <pc:docMk/>
+            <pc:sldMk cId="3067886182" sldId="261"/>
+            <ac:spMk id="6" creationId="{F7B69A2F-DE91-082E-422E-C480A8CACC59}"/>
+          </ac:spMkLst>
+        </pc:spChg>
+        <pc:spChg chg="add mod">
+          <ac:chgData name="Tobias Haunreiter" userId="0025fc2764ec76b2" providerId="LiveId" clId="{BFD96D7C-99C9-4945-9F60-205726AA4FD5}" dt="2025-05-21T08:21:51.737" v="566"/>
+          <ac:spMkLst>
+            <pc:docMk/>
+            <pc:sldMk cId="3067886182" sldId="261"/>
+            <ac:spMk id="7" creationId="{2ECD1F83-D21B-AF77-EA49-033CCB436F82}"/>
+          </ac:spMkLst>
+        </pc:spChg>
+        <pc:spChg chg="add mod">
+          <ac:chgData name="Tobias Haunreiter" userId="0025fc2764ec76b2" providerId="LiveId" clId="{BFD96D7C-99C9-4945-9F60-205726AA4FD5}" dt="2025-05-21T08:21:51.737" v="566"/>
+          <ac:spMkLst>
+            <pc:docMk/>
+            <pc:sldMk cId="3067886182" sldId="261"/>
+            <ac:spMk id="8" creationId="{12F14D8D-0A9A-A5CC-090B-F99029A75BAA}"/>
+          </ac:spMkLst>
+        </pc:spChg>
+        <pc:spChg chg="add mod">
+          <ac:chgData name="Tobias Haunreiter" userId="0025fc2764ec76b2" providerId="LiveId" clId="{BFD96D7C-99C9-4945-9F60-205726AA4FD5}" dt="2025-05-21T08:21:51.737" v="566"/>
+          <ac:spMkLst>
+            <pc:docMk/>
+            <pc:sldMk cId="3067886182" sldId="261"/>
+            <ac:spMk id="9" creationId="{0396A856-15AE-3EE9-51F0-CFD51A3CD954}"/>
+          </ac:spMkLst>
+        </pc:spChg>
+      </pc:sldChg>
+      <pc:sldChg chg="addSp modSp new mod">
+        <pc:chgData name="Tobias Haunreiter" userId="0025fc2764ec76b2" providerId="LiveId" clId="{BFD96D7C-99C9-4945-9F60-205726AA4FD5}" dt="2025-05-21T08:21:52.441" v="567"/>
+        <pc:sldMkLst>
+          <pc:docMk/>
+          <pc:sldMk cId="2906884876" sldId="262"/>
+        </pc:sldMkLst>
+        <pc:spChg chg="mod">
+          <ac:chgData name="Tobias Haunreiter" userId="0025fc2764ec76b2" providerId="LiveId" clId="{BFD96D7C-99C9-4945-9F60-205726AA4FD5}" dt="2025-05-21T08:17:54.404" v="484" actId="790"/>
+          <ac:spMkLst>
+            <pc:docMk/>
+            <pc:sldMk cId="2906884876" sldId="262"/>
+            <ac:spMk id="2" creationId="{D9FF4866-62A1-0E64-85B3-67642B7ADD5A}"/>
+          </ac:spMkLst>
+        </pc:spChg>
+        <pc:spChg chg="mod">
+          <ac:chgData name="Tobias Haunreiter" userId="0025fc2764ec76b2" providerId="LiveId" clId="{BFD96D7C-99C9-4945-9F60-205726AA4FD5}" dt="2025-05-21T08:18:32.081" v="491" actId="113"/>
+          <ac:spMkLst>
+            <pc:docMk/>
+            <pc:sldMk cId="2906884876" sldId="262"/>
+            <ac:spMk id="3" creationId="{40BFBBB2-E4C2-7FCE-868B-B0704779EC7D}"/>
+          </ac:spMkLst>
+        </pc:spChg>
+        <pc:spChg chg="add mod">
+          <ac:chgData name="Tobias Haunreiter" userId="0025fc2764ec76b2" providerId="LiveId" clId="{BFD96D7C-99C9-4945-9F60-205726AA4FD5}" dt="2025-05-21T08:21:20.774" v="558"/>
+          <ac:spMkLst>
+            <pc:docMk/>
+            <pc:sldMk cId="2906884876" sldId="262"/>
+            <ac:spMk id="4" creationId="{D654026E-1071-81B5-1CBA-C03901691CA3}"/>
+          </ac:spMkLst>
+        </pc:spChg>
+        <pc:spChg chg="add mod">
+          <ac:chgData name="Tobias Haunreiter" userId="0025fc2764ec76b2" providerId="LiveId" clId="{BFD96D7C-99C9-4945-9F60-205726AA4FD5}" dt="2025-05-21T08:21:20.774" v="558"/>
+          <ac:spMkLst>
+            <pc:docMk/>
+            <pc:sldMk cId="2906884876" sldId="262"/>
+            <ac:spMk id="5" creationId="{76C1B0CA-619B-0C1E-BF99-921D3B143121}"/>
+          </ac:spMkLst>
+        </pc:spChg>
+        <pc:spChg chg="add mod">
+          <ac:chgData name="Tobias Haunreiter" userId="0025fc2764ec76b2" providerId="LiveId" clId="{BFD96D7C-99C9-4945-9F60-205726AA4FD5}" dt="2025-05-21T08:21:20.774" v="558"/>
+          <ac:spMkLst>
+            <pc:docMk/>
+            <pc:sldMk cId="2906884876" sldId="262"/>
+            <ac:spMk id="6" creationId="{9DAB01EB-3733-E0BC-15F1-E33F0C274E89}"/>
+          </ac:spMkLst>
+        </pc:spChg>
+        <pc:spChg chg="add mod">
+          <ac:chgData name="Tobias Haunreiter" userId="0025fc2764ec76b2" providerId="LiveId" clId="{BFD96D7C-99C9-4945-9F60-205726AA4FD5}" dt="2025-05-21T08:21:52.441" v="567"/>
+          <ac:spMkLst>
+            <pc:docMk/>
+            <pc:sldMk cId="2906884876" sldId="262"/>
+            <ac:spMk id="7" creationId="{EABFEBCE-5350-B59D-F82C-7D67401B74B5}"/>
+          </ac:spMkLst>
+        </pc:spChg>
+        <pc:spChg chg="add mod">
+          <ac:chgData name="Tobias Haunreiter" userId="0025fc2764ec76b2" providerId="LiveId" clId="{BFD96D7C-99C9-4945-9F60-205726AA4FD5}" dt="2025-05-21T08:21:52.441" v="567"/>
+          <ac:spMkLst>
+            <pc:docMk/>
+            <pc:sldMk cId="2906884876" sldId="262"/>
+            <ac:spMk id="8" creationId="{D2049C64-F3E8-98F3-EB77-FF568ADAFEB3}"/>
+          </ac:spMkLst>
+        </pc:spChg>
+        <pc:spChg chg="add mod">
+          <ac:chgData name="Tobias Haunreiter" userId="0025fc2764ec76b2" providerId="LiveId" clId="{BFD96D7C-99C9-4945-9F60-205726AA4FD5}" dt="2025-05-21T08:21:52.441" v="567"/>
+          <ac:spMkLst>
+            <pc:docMk/>
+            <pc:sldMk cId="2906884876" sldId="262"/>
+            <ac:spMk id="9" creationId="{8136EB9B-069B-C96C-9CB6-FF60FAEA14BA}"/>
+          </ac:spMkLst>
+        </pc:spChg>
+      </pc:sldChg>
+      <pc:sldChg chg="addSp modSp new mod">
+        <pc:chgData name="Tobias Haunreiter" userId="0025fc2764ec76b2" providerId="LiveId" clId="{BFD96D7C-99C9-4945-9F60-205726AA4FD5}" dt="2025-05-21T08:21:53.883" v="569"/>
+        <pc:sldMkLst>
+          <pc:docMk/>
+          <pc:sldMk cId="2236761859" sldId="263"/>
+        </pc:sldMkLst>
+        <pc:spChg chg="mod">
+          <ac:chgData name="Tobias Haunreiter" userId="0025fc2764ec76b2" providerId="LiveId" clId="{BFD96D7C-99C9-4945-9F60-205726AA4FD5}" dt="2025-05-21T08:20:25.503" v="546" actId="790"/>
+          <ac:spMkLst>
+            <pc:docMk/>
+            <pc:sldMk cId="2236761859" sldId="263"/>
+            <ac:spMk id="2" creationId="{732E711C-BA83-5858-2A07-105FA2DE3416}"/>
+          </ac:spMkLst>
+        </pc:spChg>
+        <pc:spChg chg="mod">
+          <ac:chgData name="Tobias Haunreiter" userId="0025fc2764ec76b2" providerId="LiveId" clId="{BFD96D7C-99C9-4945-9F60-205726AA4FD5}" dt="2025-05-21T08:20:25.503" v="546" actId="790"/>
+          <ac:spMkLst>
+            <pc:docMk/>
+            <pc:sldMk cId="2236761859" sldId="263"/>
+            <ac:spMk id="3" creationId="{47C59EA8-DD3E-D62F-97C1-1B8CDC51852D}"/>
+          </ac:spMkLst>
+        </pc:spChg>
+        <pc:spChg chg="add mod">
+          <ac:chgData name="Tobias Haunreiter" userId="0025fc2764ec76b2" providerId="LiveId" clId="{BFD96D7C-99C9-4945-9F60-205726AA4FD5}" dt="2025-05-21T08:21:19.800" v="556"/>
+          <ac:spMkLst>
+            <pc:docMk/>
+            <pc:sldMk cId="2236761859" sldId="263"/>
+            <ac:spMk id="4" creationId="{9D52E15E-2B55-D143-E3F4-A167D5DD9741}"/>
+          </ac:spMkLst>
+        </pc:spChg>
+        <pc:spChg chg="add mod">
+          <ac:chgData name="Tobias Haunreiter" userId="0025fc2764ec76b2" providerId="LiveId" clId="{BFD96D7C-99C9-4945-9F60-205726AA4FD5}" dt="2025-05-21T08:21:19.800" v="556"/>
+          <ac:spMkLst>
+            <pc:docMk/>
+            <pc:sldMk cId="2236761859" sldId="263"/>
+            <ac:spMk id="5" creationId="{FDCC360C-A1B5-DB45-77E1-392F2B4AEC9A}"/>
+          </ac:spMkLst>
+        </pc:spChg>
+        <pc:spChg chg="add mod">
+          <ac:chgData name="Tobias Haunreiter" userId="0025fc2764ec76b2" providerId="LiveId" clId="{BFD96D7C-99C9-4945-9F60-205726AA4FD5}" dt="2025-05-21T08:21:19.800" v="556"/>
+          <ac:spMkLst>
+            <pc:docMk/>
+            <pc:sldMk cId="2236761859" sldId="263"/>
+            <ac:spMk id="6" creationId="{C46C9815-C069-D77B-6049-3172CBEEF413}"/>
+          </ac:spMkLst>
+        </pc:spChg>
+        <pc:spChg chg="add mod">
+          <ac:chgData name="Tobias Haunreiter" userId="0025fc2764ec76b2" providerId="LiveId" clId="{BFD96D7C-99C9-4945-9F60-205726AA4FD5}" dt="2025-05-21T08:21:53.883" v="569"/>
+          <ac:spMkLst>
+            <pc:docMk/>
+            <pc:sldMk cId="2236761859" sldId="263"/>
+            <ac:spMk id="7" creationId="{20E453B1-1C87-268F-D3D8-14446D2F3608}"/>
+          </ac:spMkLst>
+        </pc:spChg>
+        <pc:spChg chg="add mod">
+          <ac:chgData name="Tobias Haunreiter" userId="0025fc2764ec76b2" providerId="LiveId" clId="{BFD96D7C-99C9-4945-9F60-205726AA4FD5}" dt="2025-05-21T08:21:53.883" v="569"/>
+          <ac:spMkLst>
+            <pc:docMk/>
+            <pc:sldMk cId="2236761859" sldId="263"/>
+            <ac:spMk id="8" creationId="{73D44270-B7D2-12C6-55A0-5B934E038EBF}"/>
+          </ac:spMkLst>
+        </pc:spChg>
+        <pc:spChg chg="add mod">
+          <ac:chgData name="Tobias Haunreiter" userId="0025fc2764ec76b2" providerId="LiveId" clId="{BFD96D7C-99C9-4945-9F60-205726AA4FD5}" dt="2025-05-21T08:21:53.883" v="569"/>
+          <ac:spMkLst>
+            <pc:docMk/>
+            <pc:sldMk cId="2236761859" sldId="263"/>
+            <ac:spMk id="9" creationId="{AFD13401-EE95-5ACE-7DED-8E9EF013544E}"/>
+          </ac:spMkLst>
+        </pc:spChg>
+      </pc:sldChg>
+      <pc:sldChg chg="addSp modSp add mod">
+        <pc:chgData name="Tobias Haunreiter" userId="0025fc2764ec76b2" providerId="LiveId" clId="{BFD96D7C-99C9-4945-9F60-205726AA4FD5}" dt="2025-05-21T08:21:53.123" v="568"/>
+        <pc:sldMkLst>
+          <pc:docMk/>
+          <pc:sldMk cId="2157156751" sldId="264"/>
+        </pc:sldMkLst>
+        <pc:spChg chg="mod">
+          <ac:chgData name="Tobias Haunreiter" userId="0025fc2764ec76b2" providerId="LiveId" clId="{BFD96D7C-99C9-4945-9F60-205726AA4FD5}" dt="2025-05-21T08:18:53.938" v="510" actId="20577"/>
+          <ac:spMkLst>
+            <pc:docMk/>
+            <pc:sldMk cId="2157156751" sldId="264"/>
+            <ac:spMk id="2" creationId="{D9FF4866-62A1-0E64-85B3-67642B7ADD5A}"/>
+          </ac:spMkLst>
+        </pc:spChg>
+        <pc:spChg chg="mod">
+          <ac:chgData name="Tobias Haunreiter" userId="0025fc2764ec76b2" providerId="LiveId" clId="{BFD96D7C-99C9-4945-9F60-205726AA4FD5}" dt="2025-05-21T08:19:01.620" v="511"/>
+          <ac:spMkLst>
+            <pc:docMk/>
+            <pc:sldMk cId="2157156751" sldId="264"/>
+            <ac:spMk id="3" creationId="{40BFBBB2-E4C2-7FCE-868B-B0704779EC7D}"/>
+          </ac:spMkLst>
+        </pc:spChg>
+        <pc:spChg chg="add mod">
+          <ac:chgData name="Tobias Haunreiter" userId="0025fc2764ec76b2" providerId="LiveId" clId="{BFD96D7C-99C9-4945-9F60-205726AA4FD5}" dt="2025-05-21T08:21:20.236" v="557"/>
+          <ac:spMkLst>
+            <pc:docMk/>
+            <pc:sldMk cId="2157156751" sldId="264"/>
+            <ac:spMk id="4" creationId="{B6F66E00-4472-59A0-2DB7-E8DFD8B32712}"/>
+          </ac:spMkLst>
+        </pc:spChg>
+        <pc:spChg chg="add mod">
+          <ac:chgData name="Tobias Haunreiter" userId="0025fc2764ec76b2" providerId="LiveId" clId="{BFD96D7C-99C9-4945-9F60-205726AA4FD5}" dt="2025-05-21T08:21:20.236" v="557"/>
+          <ac:spMkLst>
+            <pc:docMk/>
+            <pc:sldMk cId="2157156751" sldId="264"/>
+            <ac:spMk id="5" creationId="{C29370C9-5FC5-D2CA-6265-E2214E7F3533}"/>
+          </ac:spMkLst>
+        </pc:spChg>
+        <pc:spChg chg="add mod">
+          <ac:chgData name="Tobias Haunreiter" userId="0025fc2764ec76b2" providerId="LiveId" clId="{BFD96D7C-99C9-4945-9F60-205726AA4FD5}" dt="2025-05-21T08:21:20.236" v="557"/>
+          <ac:spMkLst>
+            <pc:docMk/>
+            <pc:sldMk cId="2157156751" sldId="264"/>
+            <ac:spMk id="6" creationId="{35312E69-04D1-7A34-4D08-95F8ED075206}"/>
+          </ac:spMkLst>
+        </pc:spChg>
+        <pc:spChg chg="add mod">
+          <ac:chgData name="Tobias Haunreiter" userId="0025fc2764ec76b2" providerId="LiveId" clId="{BFD96D7C-99C9-4945-9F60-205726AA4FD5}" dt="2025-05-21T08:21:53.123" v="568"/>
+          <ac:spMkLst>
+            <pc:docMk/>
+            <pc:sldMk cId="2157156751" sldId="264"/>
+            <ac:spMk id="7" creationId="{D87F0818-16E1-A83F-E124-90AB2731619A}"/>
+          </ac:spMkLst>
+        </pc:spChg>
+        <pc:spChg chg="add mod">
+          <ac:chgData name="Tobias Haunreiter" userId="0025fc2764ec76b2" providerId="LiveId" clId="{BFD96D7C-99C9-4945-9F60-205726AA4FD5}" dt="2025-05-21T08:21:53.123" v="568"/>
+          <ac:spMkLst>
+            <pc:docMk/>
+            <pc:sldMk cId="2157156751" sldId="264"/>
+            <ac:spMk id="8" creationId="{F4304310-BB8A-7B70-7FE6-B0A260C829CD}"/>
+          </ac:spMkLst>
+        </pc:spChg>
+        <pc:spChg chg="add mod">
+          <ac:chgData name="Tobias Haunreiter" userId="0025fc2764ec76b2" providerId="LiveId" clId="{BFD96D7C-99C9-4945-9F60-205726AA4FD5}" dt="2025-05-21T08:21:53.123" v="568"/>
+          <ac:spMkLst>
+            <pc:docMk/>
+            <pc:sldMk cId="2157156751" sldId="264"/>
+            <ac:spMk id="9" creationId="{DA8CD499-30D8-7EED-2D55-A3FD4FB6364A}"/>
+          </ac:spMkLst>
+        </pc:spChg>
+      </pc:sldChg>
+      <pc:sldChg chg="addSp modSp new mod">
+        <pc:chgData name="Tobias Haunreiter" userId="0025fc2764ec76b2" providerId="LiveId" clId="{BFD96D7C-99C9-4945-9F60-205726AA4FD5}" dt="2025-05-21T08:21:54.611" v="570"/>
+        <pc:sldMkLst>
+          <pc:docMk/>
+          <pc:sldMk cId="2196825616" sldId="265"/>
+        </pc:sldMkLst>
+        <pc:spChg chg="mod">
+          <ac:chgData name="Tobias Haunreiter" userId="0025fc2764ec76b2" providerId="LiveId" clId="{BFD96D7C-99C9-4945-9F60-205726AA4FD5}" dt="2025-05-21T08:20:19.032" v="545" actId="790"/>
+          <ac:spMkLst>
+            <pc:docMk/>
+            <pc:sldMk cId="2196825616" sldId="265"/>
+            <ac:spMk id="2" creationId="{64225C8C-FDF9-4B5C-F532-1EE74FBE9408}"/>
+          </ac:spMkLst>
+        </pc:spChg>
+        <pc:spChg chg="mod">
+          <ac:chgData name="Tobias Haunreiter" userId="0025fc2764ec76b2" providerId="LiveId" clId="{BFD96D7C-99C9-4945-9F60-205726AA4FD5}" dt="2025-05-21T08:20:19.032" v="545" actId="790"/>
+          <ac:spMkLst>
+            <pc:docMk/>
+            <pc:sldMk cId="2196825616" sldId="265"/>
+            <ac:spMk id="3" creationId="{343D710B-EBCF-D90D-50B2-5B55E035EFC6}"/>
+          </ac:spMkLst>
+        </pc:spChg>
+        <pc:spChg chg="add mod">
+          <ac:chgData name="Tobias Haunreiter" userId="0025fc2764ec76b2" providerId="LiveId" clId="{BFD96D7C-99C9-4945-9F60-205726AA4FD5}" dt="2025-05-21T08:21:19.376" v="555"/>
+          <ac:spMkLst>
+            <pc:docMk/>
+            <pc:sldMk cId="2196825616" sldId="265"/>
+            <ac:spMk id="4" creationId="{EC29E910-FA28-0A42-4331-772846BD26BC}"/>
+          </ac:spMkLst>
+        </pc:spChg>
+        <pc:spChg chg="add mod">
+          <ac:chgData name="Tobias Haunreiter" userId="0025fc2764ec76b2" providerId="LiveId" clId="{BFD96D7C-99C9-4945-9F60-205726AA4FD5}" dt="2025-05-21T08:21:19.376" v="555"/>
+          <ac:spMkLst>
+            <pc:docMk/>
+            <pc:sldMk cId="2196825616" sldId="265"/>
+            <ac:spMk id="5" creationId="{E929E30C-3C1F-4C60-419B-4D5AA2F6B9F1}"/>
+          </ac:spMkLst>
+        </pc:spChg>
+        <pc:spChg chg="add mod">
+          <ac:chgData name="Tobias Haunreiter" userId="0025fc2764ec76b2" providerId="LiveId" clId="{BFD96D7C-99C9-4945-9F60-205726AA4FD5}" dt="2025-05-21T08:21:19.376" v="555"/>
+          <ac:spMkLst>
+            <pc:docMk/>
+            <pc:sldMk cId="2196825616" sldId="265"/>
+            <ac:spMk id="6" creationId="{A6F44CBC-3A4E-A40E-86E9-5A4E7F2F1A59}"/>
+          </ac:spMkLst>
+        </pc:spChg>
+        <pc:spChg chg="add mod">
+          <ac:chgData name="Tobias Haunreiter" userId="0025fc2764ec76b2" providerId="LiveId" clId="{BFD96D7C-99C9-4945-9F60-205726AA4FD5}" dt="2025-05-21T08:21:54.611" v="570"/>
+          <ac:spMkLst>
+            <pc:docMk/>
+            <pc:sldMk cId="2196825616" sldId="265"/>
+            <ac:spMk id="7" creationId="{17AADBC4-8DF6-967A-029B-E85A20BAE864}"/>
+          </ac:spMkLst>
+        </pc:spChg>
+        <pc:spChg chg="add mod">
+          <ac:chgData name="Tobias Haunreiter" userId="0025fc2764ec76b2" providerId="LiveId" clId="{BFD96D7C-99C9-4945-9F60-205726AA4FD5}" dt="2025-05-21T08:21:54.611" v="570"/>
+          <ac:spMkLst>
+            <pc:docMk/>
+            <pc:sldMk cId="2196825616" sldId="265"/>
+            <ac:spMk id="8" creationId="{A2E16514-729B-21BB-EF96-27ABF586F77B}"/>
+          </ac:spMkLst>
+        </pc:spChg>
+        <pc:spChg chg="add mod">
+          <ac:chgData name="Tobias Haunreiter" userId="0025fc2764ec76b2" providerId="LiveId" clId="{BFD96D7C-99C9-4945-9F60-205726AA4FD5}" dt="2025-05-21T08:21:54.611" v="570"/>
+          <ac:spMkLst>
+            <pc:docMk/>
+            <pc:sldMk cId="2196825616" sldId="265"/>
+            <ac:spMk id="9" creationId="{8BD878A8-C905-F916-2A74-27C87CD3820F}"/>
           </ac:spMkLst>
         </pc:spChg>
       </pc:sldChg>
@@ -15512,96 +15986,6 @@
 </file>
 
 <file path=ppt/slides/slide1.xml><?xml version="1.0" encoding="utf-8"?>
-<p:sld xmlns:a="http://schemas.openxmlformats.org/drawingml/2006/main" xmlns:r="http://schemas.openxmlformats.org/officeDocument/2006/relationships" xmlns:p="http://schemas.openxmlformats.org/presentationml/2006/main" show="0">
-  <p:cSld>
-    <p:spTree>
-      <p:nvGrpSpPr>
-        <p:cNvPr id="1" name=""/>
-        <p:cNvGrpSpPr/>
-        <p:nvPr/>
-      </p:nvGrpSpPr>
-      <p:grpSpPr>
-        <a:xfrm>
-          <a:off x="0" y="0"/>
-          <a:ext cx="0" cy="0"/>
-          <a:chOff x="0" y="0"/>
-          <a:chExt cx="0" cy="0"/>
-        </a:xfrm>
-      </p:grpSpPr>
-    </p:spTree>
-    <p:extLst>
-      <p:ext uri="{BB962C8B-B14F-4D97-AF65-F5344CB8AC3E}">
-        <p14:creationId xmlns:p14="http://schemas.microsoft.com/office/powerpoint/2010/main" val="1965575345"/>
-      </p:ext>
-    </p:extLst>
-  </p:cSld>
-  <p:clrMapOvr>
-    <a:masterClrMapping/>
-  </p:clrMapOvr>
-</p:sld>
-</file>
-
-<file path=ppt/slides/slide2.xml><?xml version="1.0" encoding="utf-8"?>
-<p:sld xmlns:a="http://schemas.openxmlformats.org/drawingml/2006/main" xmlns:r="http://schemas.openxmlformats.org/officeDocument/2006/relationships" xmlns:p="http://schemas.openxmlformats.org/presentationml/2006/main" show="0">
-  <p:cSld>
-    <p:spTree>
-      <p:nvGrpSpPr>
-        <p:cNvPr id="1" name=""/>
-        <p:cNvGrpSpPr/>
-        <p:nvPr/>
-      </p:nvGrpSpPr>
-      <p:grpSpPr>
-        <a:xfrm>
-          <a:off x="0" y="0"/>
-          <a:ext cx="0" cy="0"/>
-          <a:chOff x="0" y="0"/>
-          <a:chExt cx="0" cy="0"/>
-        </a:xfrm>
-      </p:grpSpPr>
-    </p:spTree>
-    <p:extLst>
-      <p:ext uri="{BB962C8B-B14F-4D97-AF65-F5344CB8AC3E}">
-        <p14:creationId xmlns:p14="http://schemas.microsoft.com/office/powerpoint/2010/main" val="1375005043"/>
-      </p:ext>
-    </p:extLst>
-  </p:cSld>
-  <p:clrMapOvr>
-    <a:masterClrMapping/>
-  </p:clrMapOvr>
-</p:sld>
-</file>
-
-<file path=ppt/slides/slide3.xml><?xml version="1.0" encoding="utf-8"?>
-<p:sld xmlns:a="http://schemas.openxmlformats.org/drawingml/2006/main" xmlns:r="http://schemas.openxmlformats.org/officeDocument/2006/relationships" xmlns:p="http://schemas.openxmlformats.org/presentationml/2006/main" show="0">
-  <p:cSld>
-    <p:spTree>
-      <p:nvGrpSpPr>
-        <p:cNvPr id="1" name=""/>
-        <p:cNvGrpSpPr/>
-        <p:nvPr/>
-      </p:nvGrpSpPr>
-      <p:grpSpPr>
-        <a:xfrm>
-          <a:off x="0" y="0"/>
-          <a:ext cx="0" cy="0"/>
-          <a:chOff x="0" y="0"/>
-          <a:chExt cx="0" cy="0"/>
-        </a:xfrm>
-      </p:grpSpPr>
-    </p:spTree>
-    <p:extLst>
-      <p:ext uri="{BB962C8B-B14F-4D97-AF65-F5344CB8AC3E}">
-        <p14:creationId xmlns:p14="http://schemas.microsoft.com/office/powerpoint/2010/main" val="3473794687"/>
-      </p:ext>
-    </p:extLst>
-  </p:cSld>
-  <p:clrMapOvr>
-    <a:masterClrMapping/>
-  </p:clrMapOvr>
-</p:sld>
-</file>
-
-<file path=ppt/slides/slide4.xml><?xml version="1.0" encoding="utf-8"?>
 <p:sld xmlns:a="http://schemas.openxmlformats.org/drawingml/2006/main" xmlns:r="http://schemas.openxmlformats.org/officeDocument/2006/relationships" xmlns:p="http://schemas.openxmlformats.org/presentationml/2006/main">
   <p:cSld>
     <p:spTree>
@@ -15682,8 +16066,433 @@
                   </a:schemeClr>
                 </a:solidFill>
               </a:rPr>
-              <a:t>Transfer Learning: Classifying Oxford-IIIT Pet Dataset Using FixMatch</a:t>
-            </a:r>
+              <a:t>Transfer Learning &amp; FixMatch to Classify the Oxford-IIIT Pet Dataset</a:t>
+            </a:r>
+          </a:p>
+        </p:txBody>
+      </p:sp>
+      <p:sp>
+        <p:nvSpPr>
+          <p:cNvPr id="7" name="Platshållare för datum 3">
+            <a:extLst>
+              <a:ext uri="{FF2B5EF4-FFF2-40B4-BE49-F238E27FC236}">
+                <a16:creationId xmlns:a16="http://schemas.microsoft.com/office/drawing/2014/main" id="{1208B5D9-EC21-9511-3DF3-BE0BB2ECF238}"/>
+              </a:ext>
+            </a:extLst>
+          </p:cNvPr>
+          <p:cNvSpPr txBox="1">
+            <a:spLocks/>
+          </p:cNvSpPr>
+          <p:nvPr/>
+        </p:nvSpPr>
+        <p:spPr>
+          <a:xfrm>
+            <a:off x="600075" y="6473327"/>
+            <a:ext cx="1355725" cy="220121"/>
+          </a:xfrm>
+          <a:prstGeom prst="rect">
+            <a:avLst/>
+          </a:prstGeom>
+        </p:spPr>
+        <p:txBody>
+          <a:bodyPr vert="horz" lIns="91440" tIns="45720" rIns="91440" bIns="45720" rtlCol="0" anchor="ctr"/>
+          <a:lstStyle>
+            <a:defPPr>
+              <a:defRPr lang="sv-SE"/>
+            </a:defPPr>
+            <a:lvl1pPr marL="0" algn="l" defTabSz="914400" rtl="0" eaLnBrk="1" latinLnBrk="0" hangingPunct="1">
+              <a:defRPr sz="1200" kern="1200">
+                <a:solidFill>
+                  <a:schemeClr val="accent2"/>
+                </a:solidFill>
+                <a:latin typeface="+mn-lt"/>
+                <a:ea typeface="+mn-ea"/>
+                <a:cs typeface="+mn-cs"/>
+              </a:defRPr>
+            </a:lvl1pPr>
+            <a:lvl2pPr marL="457200" algn="l" defTabSz="914400" rtl="0" eaLnBrk="1" latinLnBrk="0" hangingPunct="1">
+              <a:defRPr sz="1800" kern="1200">
+                <a:solidFill>
+                  <a:schemeClr val="tx1"/>
+                </a:solidFill>
+                <a:latin typeface="+mn-lt"/>
+                <a:ea typeface="+mn-ea"/>
+                <a:cs typeface="+mn-cs"/>
+              </a:defRPr>
+            </a:lvl2pPr>
+            <a:lvl3pPr marL="914400" algn="l" defTabSz="914400" rtl="0" eaLnBrk="1" latinLnBrk="0" hangingPunct="1">
+              <a:defRPr sz="1800" kern="1200">
+                <a:solidFill>
+                  <a:schemeClr val="tx1"/>
+                </a:solidFill>
+                <a:latin typeface="+mn-lt"/>
+                <a:ea typeface="+mn-ea"/>
+                <a:cs typeface="+mn-cs"/>
+              </a:defRPr>
+            </a:lvl3pPr>
+            <a:lvl4pPr marL="1371600" algn="l" defTabSz="914400" rtl="0" eaLnBrk="1" latinLnBrk="0" hangingPunct="1">
+              <a:defRPr sz="1800" kern="1200">
+                <a:solidFill>
+                  <a:schemeClr val="tx1"/>
+                </a:solidFill>
+                <a:latin typeface="+mn-lt"/>
+                <a:ea typeface="+mn-ea"/>
+                <a:cs typeface="+mn-cs"/>
+              </a:defRPr>
+            </a:lvl4pPr>
+            <a:lvl5pPr marL="1828800" algn="l" defTabSz="914400" rtl="0" eaLnBrk="1" latinLnBrk="0" hangingPunct="1">
+              <a:defRPr sz="1800" kern="1200">
+                <a:solidFill>
+                  <a:schemeClr val="tx1"/>
+                </a:solidFill>
+                <a:latin typeface="+mn-lt"/>
+                <a:ea typeface="+mn-ea"/>
+                <a:cs typeface="+mn-cs"/>
+              </a:defRPr>
+            </a:lvl5pPr>
+            <a:lvl6pPr marL="2286000" algn="l" defTabSz="914400" rtl="0" eaLnBrk="1" latinLnBrk="0" hangingPunct="1">
+              <a:defRPr sz="1800" kern="1200">
+                <a:solidFill>
+                  <a:schemeClr val="tx1"/>
+                </a:solidFill>
+                <a:latin typeface="+mn-lt"/>
+                <a:ea typeface="+mn-ea"/>
+                <a:cs typeface="+mn-cs"/>
+              </a:defRPr>
+            </a:lvl6pPr>
+            <a:lvl7pPr marL="2743200" algn="l" defTabSz="914400" rtl="0" eaLnBrk="1" latinLnBrk="0" hangingPunct="1">
+              <a:defRPr sz="1800" kern="1200">
+                <a:solidFill>
+                  <a:schemeClr val="tx1"/>
+                </a:solidFill>
+                <a:latin typeface="+mn-lt"/>
+                <a:ea typeface="+mn-ea"/>
+                <a:cs typeface="+mn-cs"/>
+              </a:defRPr>
+            </a:lvl7pPr>
+            <a:lvl8pPr marL="3200400" algn="l" defTabSz="914400" rtl="0" eaLnBrk="1" latinLnBrk="0" hangingPunct="1">
+              <a:defRPr sz="1800" kern="1200">
+                <a:solidFill>
+                  <a:schemeClr val="tx1"/>
+                </a:solidFill>
+                <a:latin typeface="+mn-lt"/>
+                <a:ea typeface="+mn-ea"/>
+                <a:cs typeface="+mn-cs"/>
+              </a:defRPr>
+            </a:lvl8pPr>
+            <a:lvl9pPr marL="3657600" algn="l" defTabSz="914400" rtl="0" eaLnBrk="1" latinLnBrk="0" hangingPunct="1">
+              <a:defRPr sz="1800" kern="1200">
+                <a:solidFill>
+                  <a:schemeClr val="tx1"/>
+                </a:solidFill>
+                <a:latin typeface="+mn-lt"/>
+                <a:ea typeface="+mn-ea"/>
+                <a:cs typeface="+mn-cs"/>
+              </a:defRPr>
+            </a:lvl9pPr>
+          </a:lstStyle>
+          <a:p>
+            <a:fld id="{888E4D63-BE2C-4D4B-BBD2-256262659A9F}" type="datetime1">
+              <a:rPr lang="sv-SE" smtClean="0">
+                <a:solidFill>
+                  <a:schemeClr val="bg1">
+                    <a:lumMod val="65000"/>
+                  </a:schemeClr>
+                </a:solidFill>
+              </a:rPr>
+              <a:pPr/>
+              <a:t>2025-05-21</a:t>
+            </a:fld>
+            <a:endParaRPr lang="sv-SE" dirty="0">
+              <a:solidFill>
+                <a:schemeClr val="bg1">
+                  <a:lumMod val="65000"/>
+                </a:schemeClr>
+              </a:solidFill>
+            </a:endParaRPr>
+          </a:p>
+        </p:txBody>
+      </p:sp>
+      <p:sp>
+        <p:nvSpPr>
+          <p:cNvPr id="8" name="Platshållare för sidfot 4">
+            <a:extLst>
+              <a:ext uri="{FF2B5EF4-FFF2-40B4-BE49-F238E27FC236}">
+                <a16:creationId xmlns:a16="http://schemas.microsoft.com/office/drawing/2014/main" id="{FE2792F3-80EF-59E6-7BBA-89514789E73A}"/>
+              </a:ext>
+            </a:extLst>
+          </p:cNvPr>
+          <p:cNvSpPr txBox="1">
+            <a:spLocks/>
+          </p:cNvSpPr>
+          <p:nvPr/>
+        </p:nvSpPr>
+        <p:spPr>
+          <a:xfrm>
+            <a:off x="1955800" y="6470364"/>
+            <a:ext cx="8280399" cy="220120"/>
+          </a:xfrm>
+          <a:prstGeom prst="rect">
+            <a:avLst/>
+          </a:prstGeom>
+        </p:spPr>
+        <p:txBody>
+          <a:bodyPr vert="horz" lIns="91440" tIns="45720" rIns="91440" bIns="45720" rtlCol="0" anchor="ctr"/>
+          <a:lstStyle>
+            <a:defPPr>
+              <a:defRPr lang="sv-SE"/>
+            </a:defPPr>
+            <a:lvl1pPr marL="0" algn="ctr" defTabSz="914400" rtl="0" eaLnBrk="1" latinLnBrk="0" hangingPunct="1">
+              <a:defRPr sz="1200" kern="1200">
+                <a:solidFill>
+                  <a:schemeClr val="accent2"/>
+                </a:solidFill>
+                <a:latin typeface="+mn-lt"/>
+                <a:ea typeface="+mn-ea"/>
+                <a:cs typeface="+mn-cs"/>
+              </a:defRPr>
+            </a:lvl1pPr>
+            <a:lvl2pPr marL="457200" algn="l" defTabSz="914400" rtl="0" eaLnBrk="1" latinLnBrk="0" hangingPunct="1">
+              <a:defRPr sz="1800" kern="1200">
+                <a:solidFill>
+                  <a:schemeClr val="tx1"/>
+                </a:solidFill>
+                <a:latin typeface="+mn-lt"/>
+                <a:ea typeface="+mn-ea"/>
+                <a:cs typeface="+mn-cs"/>
+              </a:defRPr>
+            </a:lvl2pPr>
+            <a:lvl3pPr marL="914400" algn="l" defTabSz="914400" rtl="0" eaLnBrk="1" latinLnBrk="0" hangingPunct="1">
+              <a:defRPr sz="1800" kern="1200">
+                <a:solidFill>
+                  <a:schemeClr val="tx1"/>
+                </a:solidFill>
+                <a:latin typeface="+mn-lt"/>
+                <a:ea typeface="+mn-ea"/>
+                <a:cs typeface="+mn-cs"/>
+              </a:defRPr>
+            </a:lvl3pPr>
+            <a:lvl4pPr marL="1371600" algn="l" defTabSz="914400" rtl="0" eaLnBrk="1" latinLnBrk="0" hangingPunct="1">
+              <a:defRPr sz="1800" kern="1200">
+                <a:solidFill>
+                  <a:schemeClr val="tx1"/>
+                </a:solidFill>
+                <a:latin typeface="+mn-lt"/>
+                <a:ea typeface="+mn-ea"/>
+                <a:cs typeface="+mn-cs"/>
+              </a:defRPr>
+            </a:lvl4pPr>
+            <a:lvl5pPr marL="1828800" algn="l" defTabSz="914400" rtl="0" eaLnBrk="1" latinLnBrk="0" hangingPunct="1">
+              <a:defRPr sz="1800" kern="1200">
+                <a:solidFill>
+                  <a:schemeClr val="tx1"/>
+                </a:solidFill>
+                <a:latin typeface="+mn-lt"/>
+                <a:ea typeface="+mn-ea"/>
+                <a:cs typeface="+mn-cs"/>
+              </a:defRPr>
+            </a:lvl5pPr>
+            <a:lvl6pPr marL="2286000" algn="l" defTabSz="914400" rtl="0" eaLnBrk="1" latinLnBrk="0" hangingPunct="1">
+              <a:defRPr sz="1800" kern="1200">
+                <a:solidFill>
+                  <a:schemeClr val="tx1"/>
+                </a:solidFill>
+                <a:latin typeface="+mn-lt"/>
+                <a:ea typeface="+mn-ea"/>
+                <a:cs typeface="+mn-cs"/>
+              </a:defRPr>
+            </a:lvl6pPr>
+            <a:lvl7pPr marL="2743200" algn="l" defTabSz="914400" rtl="0" eaLnBrk="1" latinLnBrk="0" hangingPunct="1">
+              <a:defRPr sz="1800" kern="1200">
+                <a:solidFill>
+                  <a:schemeClr val="tx1"/>
+                </a:solidFill>
+                <a:latin typeface="+mn-lt"/>
+                <a:ea typeface="+mn-ea"/>
+                <a:cs typeface="+mn-cs"/>
+              </a:defRPr>
+            </a:lvl7pPr>
+            <a:lvl8pPr marL="3200400" algn="l" defTabSz="914400" rtl="0" eaLnBrk="1" latinLnBrk="0" hangingPunct="1">
+              <a:defRPr sz="1800" kern="1200">
+                <a:solidFill>
+                  <a:schemeClr val="tx1"/>
+                </a:solidFill>
+                <a:latin typeface="+mn-lt"/>
+                <a:ea typeface="+mn-ea"/>
+                <a:cs typeface="+mn-cs"/>
+              </a:defRPr>
+            </a:lvl8pPr>
+            <a:lvl9pPr marL="3657600" algn="l" defTabSz="914400" rtl="0" eaLnBrk="1" latinLnBrk="0" hangingPunct="1">
+              <a:defRPr sz="1800" kern="1200">
+                <a:solidFill>
+                  <a:schemeClr val="tx1"/>
+                </a:solidFill>
+                <a:latin typeface="+mn-lt"/>
+                <a:ea typeface="+mn-ea"/>
+                <a:cs typeface="+mn-cs"/>
+              </a:defRPr>
+            </a:lvl9pPr>
+          </a:lstStyle>
+          <a:p>
+            <a:r>
+              <a:rPr lang="sv-SE">
+                <a:solidFill>
+                  <a:schemeClr val="bg1">
+                    <a:lumMod val="65000"/>
+                  </a:schemeClr>
+                </a:solidFill>
+              </a:rPr>
+              <a:t>DD2424 Project: Transfer Learning | Ksenia Biazruchanka, Tobias Haunreiter, Alexander Soukup, Johannes Jeup</a:t>
+            </a:r>
+            <a:endParaRPr lang="sv-SE" dirty="0">
+              <a:solidFill>
+                <a:schemeClr val="bg1">
+                  <a:lumMod val="65000"/>
+                </a:schemeClr>
+              </a:solidFill>
+            </a:endParaRPr>
+          </a:p>
+        </p:txBody>
+      </p:sp>
+      <p:sp>
+        <p:nvSpPr>
+          <p:cNvPr id="9" name="Platshållare för bildnummer 5">
+            <a:extLst>
+              <a:ext uri="{FF2B5EF4-FFF2-40B4-BE49-F238E27FC236}">
+                <a16:creationId xmlns:a16="http://schemas.microsoft.com/office/drawing/2014/main" id="{26387869-C957-CB52-1AD0-879D80E2A755}"/>
+              </a:ext>
+            </a:extLst>
+          </p:cNvPr>
+          <p:cNvSpPr txBox="1">
+            <a:spLocks/>
+          </p:cNvSpPr>
+          <p:nvPr/>
+        </p:nvSpPr>
+        <p:spPr>
+          <a:xfrm>
+            <a:off x="10236199" y="6473328"/>
+            <a:ext cx="1355726" cy="220120"/>
+          </a:xfrm>
+          <a:prstGeom prst="rect">
+            <a:avLst/>
+          </a:prstGeom>
+        </p:spPr>
+        <p:txBody>
+          <a:bodyPr vert="horz" lIns="91440" tIns="45720" rIns="91440" bIns="45720" rtlCol="0" anchor="ctr"/>
+          <a:lstStyle>
+            <a:defPPr>
+              <a:defRPr lang="sv-SE"/>
+            </a:defPPr>
+            <a:lvl1pPr marL="0" algn="r" defTabSz="914400" rtl="0" eaLnBrk="1" latinLnBrk="0" hangingPunct="1">
+              <a:defRPr sz="1200" kern="1200">
+                <a:solidFill>
+                  <a:schemeClr val="accent2"/>
+                </a:solidFill>
+                <a:latin typeface="+mn-lt"/>
+                <a:ea typeface="+mn-ea"/>
+                <a:cs typeface="+mn-cs"/>
+              </a:defRPr>
+            </a:lvl1pPr>
+            <a:lvl2pPr marL="457200" algn="l" defTabSz="914400" rtl="0" eaLnBrk="1" latinLnBrk="0" hangingPunct="1">
+              <a:defRPr sz="1800" kern="1200">
+                <a:solidFill>
+                  <a:schemeClr val="tx1"/>
+                </a:solidFill>
+                <a:latin typeface="+mn-lt"/>
+                <a:ea typeface="+mn-ea"/>
+                <a:cs typeface="+mn-cs"/>
+              </a:defRPr>
+            </a:lvl2pPr>
+            <a:lvl3pPr marL="914400" algn="l" defTabSz="914400" rtl="0" eaLnBrk="1" latinLnBrk="0" hangingPunct="1">
+              <a:defRPr sz="1800" kern="1200">
+                <a:solidFill>
+                  <a:schemeClr val="tx1"/>
+                </a:solidFill>
+                <a:latin typeface="+mn-lt"/>
+                <a:ea typeface="+mn-ea"/>
+                <a:cs typeface="+mn-cs"/>
+              </a:defRPr>
+            </a:lvl3pPr>
+            <a:lvl4pPr marL="1371600" algn="l" defTabSz="914400" rtl="0" eaLnBrk="1" latinLnBrk="0" hangingPunct="1">
+              <a:defRPr sz="1800" kern="1200">
+                <a:solidFill>
+                  <a:schemeClr val="tx1"/>
+                </a:solidFill>
+                <a:latin typeface="+mn-lt"/>
+                <a:ea typeface="+mn-ea"/>
+                <a:cs typeface="+mn-cs"/>
+              </a:defRPr>
+            </a:lvl4pPr>
+            <a:lvl5pPr marL="1828800" algn="l" defTabSz="914400" rtl="0" eaLnBrk="1" latinLnBrk="0" hangingPunct="1">
+              <a:defRPr sz="1800" kern="1200">
+                <a:solidFill>
+                  <a:schemeClr val="tx1"/>
+                </a:solidFill>
+                <a:latin typeface="+mn-lt"/>
+                <a:ea typeface="+mn-ea"/>
+                <a:cs typeface="+mn-cs"/>
+              </a:defRPr>
+            </a:lvl5pPr>
+            <a:lvl6pPr marL="2286000" algn="l" defTabSz="914400" rtl="0" eaLnBrk="1" latinLnBrk="0" hangingPunct="1">
+              <a:defRPr sz="1800" kern="1200">
+                <a:solidFill>
+                  <a:schemeClr val="tx1"/>
+                </a:solidFill>
+                <a:latin typeface="+mn-lt"/>
+                <a:ea typeface="+mn-ea"/>
+                <a:cs typeface="+mn-cs"/>
+              </a:defRPr>
+            </a:lvl6pPr>
+            <a:lvl7pPr marL="2743200" algn="l" defTabSz="914400" rtl="0" eaLnBrk="1" latinLnBrk="0" hangingPunct="1">
+              <a:defRPr sz="1800" kern="1200">
+                <a:solidFill>
+                  <a:schemeClr val="tx1"/>
+                </a:solidFill>
+                <a:latin typeface="+mn-lt"/>
+                <a:ea typeface="+mn-ea"/>
+                <a:cs typeface="+mn-cs"/>
+              </a:defRPr>
+            </a:lvl7pPr>
+            <a:lvl8pPr marL="3200400" algn="l" defTabSz="914400" rtl="0" eaLnBrk="1" latinLnBrk="0" hangingPunct="1">
+              <a:defRPr sz="1800" kern="1200">
+                <a:solidFill>
+                  <a:schemeClr val="tx1"/>
+                </a:solidFill>
+                <a:latin typeface="+mn-lt"/>
+                <a:ea typeface="+mn-ea"/>
+                <a:cs typeface="+mn-cs"/>
+              </a:defRPr>
+            </a:lvl8pPr>
+            <a:lvl9pPr marL="3657600" algn="l" defTabSz="914400" rtl="0" eaLnBrk="1" latinLnBrk="0" hangingPunct="1">
+              <a:defRPr sz="1800" kern="1200">
+                <a:solidFill>
+                  <a:schemeClr val="tx1"/>
+                </a:solidFill>
+                <a:latin typeface="+mn-lt"/>
+                <a:ea typeface="+mn-ea"/>
+                <a:cs typeface="+mn-cs"/>
+              </a:defRPr>
+            </a:lvl9pPr>
+          </a:lstStyle>
+          <a:p>
+            <a:fld id="{B716C8F4-20CD-364A-8A8E-DE130115B178}" type="slidenum">
+              <a:rPr lang="sv-SE" smtClean="0">
+                <a:solidFill>
+                  <a:schemeClr val="bg1">
+                    <a:lumMod val="65000"/>
+                  </a:schemeClr>
+                </a:solidFill>
+              </a:rPr>
+              <a:pPr/>
+              <a:t>1</a:t>
+            </a:fld>
+            <a:endParaRPr lang="sv-SE" dirty="0">
+              <a:solidFill>
+                <a:schemeClr val="bg1">
+                  <a:lumMod val="65000"/>
+                </a:schemeClr>
+              </a:solidFill>
+            </a:endParaRPr>
           </a:p>
         </p:txBody>
       </p:sp>
@@ -15700,7 +16509,7 @@
 </p:sld>
 </file>
 
-<file path=ppt/slides/slide5.xml><?xml version="1.0" encoding="utf-8"?>
+<file path=ppt/slides/slide2.xml><?xml version="1.0" encoding="utf-8"?>
 <p:sld xmlns:a="http://schemas.openxmlformats.org/drawingml/2006/main" xmlns:r="http://schemas.openxmlformats.org/officeDocument/2006/relationships" xmlns:p="http://schemas.openxmlformats.org/presentationml/2006/main">
   <p:cSld>
     <p:spTree>
@@ -15732,7 +16541,10 @@
           <a:bodyPr/>
           <a:lstStyle/>
           <a:p>
-            <a:endParaRPr lang="en-US" dirty="0"/>
+            <a:r>
+              <a:rPr lang="en-US" dirty="0"/>
+              <a:t>Project Overview</a:t>
+            </a:r>
           </a:p>
         </p:txBody>
       </p:sp>
@@ -15751,7 +16563,471 @@
           <a:bodyPr/>
           <a:lstStyle/>
           <a:p>
+            <a:r>
+              <a:rPr lang="en-US" sz="2400" b="1" dirty="0">
+                <a:solidFill>
+                  <a:srgbClr val="002060"/>
+                </a:solidFill>
+              </a:rPr>
+              <a:t>Binary Classification</a:t>
+            </a:r>
+          </a:p>
+          <a:p>
+            <a:pPr lvl="1"/>
             <a:endParaRPr lang="en-US" dirty="0"/>
+          </a:p>
+          <a:p>
+            <a:r>
+              <a:rPr lang="en-US" sz="2400" b="1" dirty="0">
+                <a:solidFill>
+                  <a:srgbClr val="002060"/>
+                </a:solidFill>
+              </a:rPr>
+              <a:t>Breed Classification</a:t>
+            </a:r>
+          </a:p>
+          <a:p>
+            <a:pPr lvl="1"/>
+            <a:endParaRPr lang="en-US" dirty="0"/>
+          </a:p>
+          <a:p>
+            <a:r>
+              <a:rPr lang="en-US" sz="2400" b="1" dirty="0">
+                <a:solidFill>
+                  <a:srgbClr val="002060"/>
+                </a:solidFill>
+              </a:rPr>
+              <a:t>Semi-Supervised Learning (SSL)</a:t>
+            </a:r>
+          </a:p>
+          <a:p>
+            <a:pPr lvl="1"/>
+            <a:endParaRPr lang="en-US" dirty="0"/>
+          </a:p>
+        </p:txBody>
+      </p:sp>
+      <p:sp>
+        <p:nvSpPr>
+          <p:cNvPr id="7" name="Platshållare för datum 3">
+            <a:extLst>
+              <a:ext uri="{FF2B5EF4-FFF2-40B4-BE49-F238E27FC236}">
+                <a16:creationId xmlns:a16="http://schemas.microsoft.com/office/drawing/2014/main" id="{C967664C-A1B6-AD03-D792-95292DCAA4F8}"/>
+              </a:ext>
+            </a:extLst>
+          </p:cNvPr>
+          <p:cNvSpPr txBox="1">
+            <a:spLocks/>
+          </p:cNvSpPr>
+          <p:nvPr/>
+        </p:nvSpPr>
+        <p:spPr>
+          <a:xfrm>
+            <a:off x="600075" y="6473327"/>
+            <a:ext cx="1355725" cy="220121"/>
+          </a:xfrm>
+          <a:prstGeom prst="rect">
+            <a:avLst/>
+          </a:prstGeom>
+        </p:spPr>
+        <p:txBody>
+          <a:bodyPr vert="horz" lIns="91440" tIns="45720" rIns="91440" bIns="45720" rtlCol="0" anchor="ctr"/>
+          <a:lstStyle>
+            <a:defPPr>
+              <a:defRPr lang="sv-SE"/>
+            </a:defPPr>
+            <a:lvl1pPr marL="0" algn="l" defTabSz="914400" rtl="0" eaLnBrk="1" latinLnBrk="0" hangingPunct="1">
+              <a:defRPr sz="1200" kern="1200">
+                <a:solidFill>
+                  <a:schemeClr val="accent2"/>
+                </a:solidFill>
+                <a:latin typeface="+mn-lt"/>
+                <a:ea typeface="+mn-ea"/>
+                <a:cs typeface="+mn-cs"/>
+              </a:defRPr>
+            </a:lvl1pPr>
+            <a:lvl2pPr marL="457200" algn="l" defTabSz="914400" rtl="0" eaLnBrk="1" latinLnBrk="0" hangingPunct="1">
+              <a:defRPr sz="1800" kern="1200">
+                <a:solidFill>
+                  <a:schemeClr val="tx1"/>
+                </a:solidFill>
+                <a:latin typeface="+mn-lt"/>
+                <a:ea typeface="+mn-ea"/>
+                <a:cs typeface="+mn-cs"/>
+              </a:defRPr>
+            </a:lvl2pPr>
+            <a:lvl3pPr marL="914400" algn="l" defTabSz="914400" rtl="0" eaLnBrk="1" latinLnBrk="0" hangingPunct="1">
+              <a:defRPr sz="1800" kern="1200">
+                <a:solidFill>
+                  <a:schemeClr val="tx1"/>
+                </a:solidFill>
+                <a:latin typeface="+mn-lt"/>
+                <a:ea typeface="+mn-ea"/>
+                <a:cs typeface="+mn-cs"/>
+              </a:defRPr>
+            </a:lvl3pPr>
+            <a:lvl4pPr marL="1371600" algn="l" defTabSz="914400" rtl="0" eaLnBrk="1" latinLnBrk="0" hangingPunct="1">
+              <a:defRPr sz="1800" kern="1200">
+                <a:solidFill>
+                  <a:schemeClr val="tx1"/>
+                </a:solidFill>
+                <a:latin typeface="+mn-lt"/>
+                <a:ea typeface="+mn-ea"/>
+                <a:cs typeface="+mn-cs"/>
+              </a:defRPr>
+            </a:lvl4pPr>
+            <a:lvl5pPr marL="1828800" algn="l" defTabSz="914400" rtl="0" eaLnBrk="1" latinLnBrk="0" hangingPunct="1">
+              <a:defRPr sz="1800" kern="1200">
+                <a:solidFill>
+                  <a:schemeClr val="tx1"/>
+                </a:solidFill>
+                <a:latin typeface="+mn-lt"/>
+                <a:ea typeface="+mn-ea"/>
+                <a:cs typeface="+mn-cs"/>
+              </a:defRPr>
+            </a:lvl5pPr>
+            <a:lvl6pPr marL="2286000" algn="l" defTabSz="914400" rtl="0" eaLnBrk="1" latinLnBrk="0" hangingPunct="1">
+              <a:defRPr sz="1800" kern="1200">
+                <a:solidFill>
+                  <a:schemeClr val="tx1"/>
+                </a:solidFill>
+                <a:latin typeface="+mn-lt"/>
+                <a:ea typeface="+mn-ea"/>
+                <a:cs typeface="+mn-cs"/>
+              </a:defRPr>
+            </a:lvl6pPr>
+            <a:lvl7pPr marL="2743200" algn="l" defTabSz="914400" rtl="0" eaLnBrk="1" latinLnBrk="0" hangingPunct="1">
+              <a:defRPr sz="1800" kern="1200">
+                <a:solidFill>
+                  <a:schemeClr val="tx1"/>
+                </a:solidFill>
+                <a:latin typeface="+mn-lt"/>
+                <a:ea typeface="+mn-ea"/>
+                <a:cs typeface="+mn-cs"/>
+              </a:defRPr>
+            </a:lvl7pPr>
+            <a:lvl8pPr marL="3200400" algn="l" defTabSz="914400" rtl="0" eaLnBrk="1" latinLnBrk="0" hangingPunct="1">
+              <a:defRPr sz="1800" kern="1200">
+                <a:solidFill>
+                  <a:schemeClr val="tx1"/>
+                </a:solidFill>
+                <a:latin typeface="+mn-lt"/>
+                <a:ea typeface="+mn-ea"/>
+                <a:cs typeface="+mn-cs"/>
+              </a:defRPr>
+            </a:lvl8pPr>
+            <a:lvl9pPr marL="3657600" algn="l" defTabSz="914400" rtl="0" eaLnBrk="1" latinLnBrk="0" hangingPunct="1">
+              <a:defRPr sz="1800" kern="1200">
+                <a:solidFill>
+                  <a:schemeClr val="tx1"/>
+                </a:solidFill>
+                <a:latin typeface="+mn-lt"/>
+                <a:ea typeface="+mn-ea"/>
+                <a:cs typeface="+mn-cs"/>
+              </a:defRPr>
+            </a:lvl9pPr>
+          </a:lstStyle>
+          <a:p>
+            <a:fld id="{888E4D63-BE2C-4D4B-BBD2-256262659A9F}" type="datetime1">
+              <a:rPr lang="sv-SE" smtClean="0">
+                <a:solidFill>
+                  <a:schemeClr val="bg1">
+                    <a:lumMod val="50000"/>
+                  </a:schemeClr>
+                </a:solidFill>
+              </a:rPr>
+              <a:pPr/>
+              <a:t>2025-05-21</a:t>
+            </a:fld>
+            <a:endParaRPr lang="sv-SE" dirty="0">
+              <a:solidFill>
+                <a:schemeClr val="bg1">
+                  <a:lumMod val="50000"/>
+                </a:schemeClr>
+              </a:solidFill>
+            </a:endParaRPr>
+          </a:p>
+        </p:txBody>
+      </p:sp>
+      <p:sp>
+        <p:nvSpPr>
+          <p:cNvPr id="8" name="Platshållare för sidfot 4">
+            <a:extLst>
+              <a:ext uri="{FF2B5EF4-FFF2-40B4-BE49-F238E27FC236}">
+                <a16:creationId xmlns:a16="http://schemas.microsoft.com/office/drawing/2014/main" id="{5FB25BFE-F835-D72D-5CF6-5DD83795C63C}"/>
+              </a:ext>
+            </a:extLst>
+          </p:cNvPr>
+          <p:cNvSpPr txBox="1">
+            <a:spLocks/>
+          </p:cNvSpPr>
+          <p:nvPr/>
+        </p:nvSpPr>
+        <p:spPr>
+          <a:xfrm>
+            <a:off x="1955800" y="6470364"/>
+            <a:ext cx="8280399" cy="220120"/>
+          </a:xfrm>
+          <a:prstGeom prst="rect">
+            <a:avLst/>
+          </a:prstGeom>
+        </p:spPr>
+        <p:txBody>
+          <a:bodyPr vert="horz" lIns="91440" tIns="45720" rIns="91440" bIns="45720" rtlCol="0" anchor="ctr"/>
+          <a:lstStyle>
+            <a:defPPr>
+              <a:defRPr lang="sv-SE"/>
+            </a:defPPr>
+            <a:lvl1pPr marL="0" algn="ctr" defTabSz="914400" rtl="0" eaLnBrk="1" latinLnBrk="0" hangingPunct="1">
+              <a:defRPr sz="1200" kern="1200">
+                <a:solidFill>
+                  <a:schemeClr val="accent2"/>
+                </a:solidFill>
+                <a:latin typeface="+mn-lt"/>
+                <a:ea typeface="+mn-ea"/>
+                <a:cs typeface="+mn-cs"/>
+              </a:defRPr>
+            </a:lvl1pPr>
+            <a:lvl2pPr marL="457200" algn="l" defTabSz="914400" rtl="0" eaLnBrk="1" latinLnBrk="0" hangingPunct="1">
+              <a:defRPr sz="1800" kern="1200">
+                <a:solidFill>
+                  <a:schemeClr val="tx1"/>
+                </a:solidFill>
+                <a:latin typeface="+mn-lt"/>
+                <a:ea typeface="+mn-ea"/>
+                <a:cs typeface="+mn-cs"/>
+              </a:defRPr>
+            </a:lvl2pPr>
+            <a:lvl3pPr marL="914400" algn="l" defTabSz="914400" rtl="0" eaLnBrk="1" latinLnBrk="0" hangingPunct="1">
+              <a:defRPr sz="1800" kern="1200">
+                <a:solidFill>
+                  <a:schemeClr val="tx1"/>
+                </a:solidFill>
+                <a:latin typeface="+mn-lt"/>
+                <a:ea typeface="+mn-ea"/>
+                <a:cs typeface="+mn-cs"/>
+              </a:defRPr>
+            </a:lvl3pPr>
+            <a:lvl4pPr marL="1371600" algn="l" defTabSz="914400" rtl="0" eaLnBrk="1" latinLnBrk="0" hangingPunct="1">
+              <a:defRPr sz="1800" kern="1200">
+                <a:solidFill>
+                  <a:schemeClr val="tx1"/>
+                </a:solidFill>
+                <a:latin typeface="+mn-lt"/>
+                <a:ea typeface="+mn-ea"/>
+                <a:cs typeface="+mn-cs"/>
+              </a:defRPr>
+            </a:lvl4pPr>
+            <a:lvl5pPr marL="1828800" algn="l" defTabSz="914400" rtl="0" eaLnBrk="1" latinLnBrk="0" hangingPunct="1">
+              <a:defRPr sz="1800" kern="1200">
+                <a:solidFill>
+                  <a:schemeClr val="tx1"/>
+                </a:solidFill>
+                <a:latin typeface="+mn-lt"/>
+                <a:ea typeface="+mn-ea"/>
+                <a:cs typeface="+mn-cs"/>
+              </a:defRPr>
+            </a:lvl5pPr>
+            <a:lvl6pPr marL="2286000" algn="l" defTabSz="914400" rtl="0" eaLnBrk="1" latinLnBrk="0" hangingPunct="1">
+              <a:defRPr sz="1800" kern="1200">
+                <a:solidFill>
+                  <a:schemeClr val="tx1"/>
+                </a:solidFill>
+                <a:latin typeface="+mn-lt"/>
+                <a:ea typeface="+mn-ea"/>
+                <a:cs typeface="+mn-cs"/>
+              </a:defRPr>
+            </a:lvl6pPr>
+            <a:lvl7pPr marL="2743200" algn="l" defTabSz="914400" rtl="0" eaLnBrk="1" latinLnBrk="0" hangingPunct="1">
+              <a:defRPr sz="1800" kern="1200">
+                <a:solidFill>
+                  <a:schemeClr val="tx1"/>
+                </a:solidFill>
+                <a:latin typeface="+mn-lt"/>
+                <a:ea typeface="+mn-ea"/>
+                <a:cs typeface="+mn-cs"/>
+              </a:defRPr>
+            </a:lvl7pPr>
+            <a:lvl8pPr marL="3200400" algn="l" defTabSz="914400" rtl="0" eaLnBrk="1" latinLnBrk="0" hangingPunct="1">
+              <a:defRPr sz="1800" kern="1200">
+                <a:solidFill>
+                  <a:schemeClr val="tx1"/>
+                </a:solidFill>
+                <a:latin typeface="+mn-lt"/>
+                <a:ea typeface="+mn-ea"/>
+                <a:cs typeface="+mn-cs"/>
+              </a:defRPr>
+            </a:lvl8pPr>
+            <a:lvl9pPr marL="3657600" algn="l" defTabSz="914400" rtl="0" eaLnBrk="1" latinLnBrk="0" hangingPunct="1">
+              <a:defRPr sz="1800" kern="1200">
+                <a:solidFill>
+                  <a:schemeClr val="tx1"/>
+                </a:solidFill>
+                <a:latin typeface="+mn-lt"/>
+                <a:ea typeface="+mn-ea"/>
+                <a:cs typeface="+mn-cs"/>
+              </a:defRPr>
+            </a:lvl9pPr>
+          </a:lstStyle>
+          <a:p>
+            <a:r>
+              <a:rPr lang="sv-SE">
+                <a:solidFill>
+                  <a:schemeClr val="bg1">
+                    <a:lumMod val="50000"/>
+                  </a:schemeClr>
+                </a:solidFill>
+              </a:rPr>
+              <a:t>DD2424 Project: Transfer Learning | Ksenia Biazruchanka, Tobias Haunreiter, Alexander Soukup, Johannes Jeup</a:t>
+            </a:r>
+            <a:endParaRPr lang="sv-SE" dirty="0">
+              <a:solidFill>
+                <a:schemeClr val="bg1">
+                  <a:lumMod val="50000"/>
+                </a:schemeClr>
+              </a:solidFill>
+            </a:endParaRPr>
+          </a:p>
+        </p:txBody>
+      </p:sp>
+      <p:sp>
+        <p:nvSpPr>
+          <p:cNvPr id="9" name="Platshållare för bildnummer 5">
+            <a:extLst>
+              <a:ext uri="{FF2B5EF4-FFF2-40B4-BE49-F238E27FC236}">
+                <a16:creationId xmlns:a16="http://schemas.microsoft.com/office/drawing/2014/main" id="{4089DBF7-F1EF-9B28-0310-C1CDF24E523D}"/>
+              </a:ext>
+            </a:extLst>
+          </p:cNvPr>
+          <p:cNvSpPr txBox="1">
+            <a:spLocks/>
+          </p:cNvSpPr>
+          <p:nvPr/>
+        </p:nvSpPr>
+        <p:spPr>
+          <a:xfrm>
+            <a:off x="10236199" y="6473328"/>
+            <a:ext cx="1355726" cy="220120"/>
+          </a:xfrm>
+          <a:prstGeom prst="rect">
+            <a:avLst/>
+          </a:prstGeom>
+        </p:spPr>
+        <p:txBody>
+          <a:bodyPr vert="horz" lIns="91440" tIns="45720" rIns="91440" bIns="45720" rtlCol="0" anchor="ctr"/>
+          <a:lstStyle>
+            <a:defPPr>
+              <a:defRPr lang="sv-SE"/>
+            </a:defPPr>
+            <a:lvl1pPr marL="0" algn="r" defTabSz="914400" rtl="0" eaLnBrk="1" latinLnBrk="0" hangingPunct="1">
+              <a:defRPr sz="1200" kern="1200">
+                <a:solidFill>
+                  <a:schemeClr val="accent2"/>
+                </a:solidFill>
+                <a:latin typeface="+mn-lt"/>
+                <a:ea typeface="+mn-ea"/>
+                <a:cs typeface="+mn-cs"/>
+              </a:defRPr>
+            </a:lvl1pPr>
+            <a:lvl2pPr marL="457200" algn="l" defTabSz="914400" rtl="0" eaLnBrk="1" latinLnBrk="0" hangingPunct="1">
+              <a:defRPr sz="1800" kern="1200">
+                <a:solidFill>
+                  <a:schemeClr val="tx1"/>
+                </a:solidFill>
+                <a:latin typeface="+mn-lt"/>
+                <a:ea typeface="+mn-ea"/>
+                <a:cs typeface="+mn-cs"/>
+              </a:defRPr>
+            </a:lvl2pPr>
+            <a:lvl3pPr marL="914400" algn="l" defTabSz="914400" rtl="0" eaLnBrk="1" latinLnBrk="0" hangingPunct="1">
+              <a:defRPr sz="1800" kern="1200">
+                <a:solidFill>
+                  <a:schemeClr val="tx1"/>
+                </a:solidFill>
+                <a:latin typeface="+mn-lt"/>
+                <a:ea typeface="+mn-ea"/>
+                <a:cs typeface="+mn-cs"/>
+              </a:defRPr>
+            </a:lvl3pPr>
+            <a:lvl4pPr marL="1371600" algn="l" defTabSz="914400" rtl="0" eaLnBrk="1" latinLnBrk="0" hangingPunct="1">
+              <a:defRPr sz="1800" kern="1200">
+                <a:solidFill>
+                  <a:schemeClr val="tx1"/>
+                </a:solidFill>
+                <a:latin typeface="+mn-lt"/>
+                <a:ea typeface="+mn-ea"/>
+                <a:cs typeface="+mn-cs"/>
+              </a:defRPr>
+            </a:lvl4pPr>
+            <a:lvl5pPr marL="1828800" algn="l" defTabSz="914400" rtl="0" eaLnBrk="1" latinLnBrk="0" hangingPunct="1">
+              <a:defRPr sz="1800" kern="1200">
+                <a:solidFill>
+                  <a:schemeClr val="tx1"/>
+                </a:solidFill>
+                <a:latin typeface="+mn-lt"/>
+                <a:ea typeface="+mn-ea"/>
+                <a:cs typeface="+mn-cs"/>
+              </a:defRPr>
+            </a:lvl5pPr>
+            <a:lvl6pPr marL="2286000" algn="l" defTabSz="914400" rtl="0" eaLnBrk="1" latinLnBrk="0" hangingPunct="1">
+              <a:defRPr sz="1800" kern="1200">
+                <a:solidFill>
+                  <a:schemeClr val="tx1"/>
+                </a:solidFill>
+                <a:latin typeface="+mn-lt"/>
+                <a:ea typeface="+mn-ea"/>
+                <a:cs typeface="+mn-cs"/>
+              </a:defRPr>
+            </a:lvl6pPr>
+            <a:lvl7pPr marL="2743200" algn="l" defTabSz="914400" rtl="0" eaLnBrk="1" latinLnBrk="0" hangingPunct="1">
+              <a:defRPr sz="1800" kern="1200">
+                <a:solidFill>
+                  <a:schemeClr val="tx1"/>
+                </a:solidFill>
+                <a:latin typeface="+mn-lt"/>
+                <a:ea typeface="+mn-ea"/>
+                <a:cs typeface="+mn-cs"/>
+              </a:defRPr>
+            </a:lvl7pPr>
+            <a:lvl8pPr marL="3200400" algn="l" defTabSz="914400" rtl="0" eaLnBrk="1" latinLnBrk="0" hangingPunct="1">
+              <a:defRPr sz="1800" kern="1200">
+                <a:solidFill>
+                  <a:schemeClr val="tx1"/>
+                </a:solidFill>
+                <a:latin typeface="+mn-lt"/>
+                <a:ea typeface="+mn-ea"/>
+                <a:cs typeface="+mn-cs"/>
+              </a:defRPr>
+            </a:lvl8pPr>
+            <a:lvl9pPr marL="3657600" algn="l" defTabSz="914400" rtl="0" eaLnBrk="1" latinLnBrk="0" hangingPunct="1">
+              <a:defRPr sz="1800" kern="1200">
+                <a:solidFill>
+                  <a:schemeClr val="tx1"/>
+                </a:solidFill>
+                <a:latin typeface="+mn-lt"/>
+                <a:ea typeface="+mn-ea"/>
+                <a:cs typeface="+mn-cs"/>
+              </a:defRPr>
+            </a:lvl9pPr>
+          </a:lstStyle>
+          <a:p>
+            <a:fld id="{B716C8F4-20CD-364A-8A8E-DE130115B178}" type="slidenum">
+              <a:rPr lang="sv-SE" smtClean="0">
+                <a:solidFill>
+                  <a:schemeClr val="bg1">
+                    <a:lumMod val="50000"/>
+                  </a:schemeClr>
+                </a:solidFill>
+              </a:rPr>
+              <a:pPr/>
+              <a:t>2</a:t>
+            </a:fld>
+            <a:endParaRPr lang="sv-SE" dirty="0">
+              <a:solidFill>
+                <a:schemeClr val="bg1">
+                  <a:lumMod val="50000"/>
+                </a:schemeClr>
+              </a:solidFill>
+            </a:endParaRPr>
           </a:p>
         </p:txBody>
       </p:sp>
@@ -15759,6 +17035,2590 @@
     <p:extLst>
       <p:ext uri="{BB962C8B-B14F-4D97-AF65-F5344CB8AC3E}">
         <p14:creationId xmlns:p14="http://schemas.microsoft.com/office/powerpoint/2010/main" val="214614124"/>
+      </p:ext>
+    </p:extLst>
+  </p:cSld>
+  <p:clrMapOvr>
+    <a:masterClrMapping/>
+  </p:clrMapOvr>
+</p:sld>
+</file>
+
+<file path=ppt/slides/slide3.xml><?xml version="1.0" encoding="utf-8"?>
+<p:sld xmlns:a="http://schemas.openxmlformats.org/drawingml/2006/main" xmlns:r="http://schemas.openxmlformats.org/officeDocument/2006/relationships" xmlns:p="http://schemas.openxmlformats.org/presentationml/2006/main">
+  <p:cSld>
+    <p:spTree>
+      <p:nvGrpSpPr>
+        <p:cNvPr id="1" name=""/>
+        <p:cNvGrpSpPr/>
+        <p:nvPr/>
+      </p:nvGrpSpPr>
+      <p:grpSpPr>
+        <a:xfrm>
+          <a:off x="0" y="0"/>
+          <a:ext cx="0" cy="0"/>
+          <a:chOff x="0" y="0"/>
+          <a:chExt cx="0" cy="0"/>
+        </a:xfrm>
+      </p:grpSpPr>
+      <p:sp>
+        <p:nvSpPr>
+          <p:cNvPr id="2" name="Titel 1">
+            <a:extLst>
+              <a:ext uri="{FF2B5EF4-FFF2-40B4-BE49-F238E27FC236}">
+                <a16:creationId xmlns:a16="http://schemas.microsoft.com/office/drawing/2014/main" id="{B58F7828-E2D2-DC6F-1C4B-82238F3405AE}"/>
+              </a:ext>
+            </a:extLst>
+          </p:cNvPr>
+          <p:cNvSpPr>
+            <a:spLocks noGrp="1"/>
+          </p:cNvSpPr>
+          <p:nvPr>
+            <p:ph type="title"/>
+          </p:nvPr>
+        </p:nvSpPr>
+        <p:spPr/>
+        <p:txBody>
+          <a:bodyPr/>
+          <a:lstStyle/>
+          <a:p>
+            <a:r>
+              <a:rPr lang="en-US" dirty="0"/>
+              <a:t>Binary Classification</a:t>
+            </a:r>
+          </a:p>
+        </p:txBody>
+      </p:sp>
+      <p:sp>
+        <p:nvSpPr>
+          <p:cNvPr id="3" name="Inhaltsplatzhalter 2">
+            <a:extLst>
+              <a:ext uri="{FF2B5EF4-FFF2-40B4-BE49-F238E27FC236}">
+                <a16:creationId xmlns:a16="http://schemas.microsoft.com/office/drawing/2014/main" id="{2BD1EE81-D28D-1580-AB3A-CA06824E22E7}"/>
+              </a:ext>
+            </a:extLst>
+          </p:cNvPr>
+          <p:cNvSpPr>
+            <a:spLocks noGrp="1"/>
+          </p:cNvSpPr>
+          <p:nvPr>
+            <p:ph idx="1"/>
+          </p:nvPr>
+        </p:nvSpPr>
+        <p:spPr/>
+        <p:txBody>
+          <a:bodyPr/>
+          <a:lstStyle/>
+          <a:p>
+            <a:r>
+              <a:rPr lang="en-US" sz="2400" b="1" dirty="0">
+                <a:solidFill>
+                  <a:srgbClr val="002060"/>
+                </a:solidFill>
+              </a:rPr>
+              <a:t>Cat vs. Dog Using ResNet50</a:t>
+            </a:r>
+          </a:p>
+          <a:p>
+            <a:pPr lvl="1"/>
+            <a:endParaRPr lang="en-US" dirty="0"/>
+          </a:p>
+        </p:txBody>
+      </p:sp>
+      <p:sp>
+        <p:nvSpPr>
+          <p:cNvPr id="7" name="Platshållare för datum 3">
+            <a:extLst>
+              <a:ext uri="{FF2B5EF4-FFF2-40B4-BE49-F238E27FC236}">
+                <a16:creationId xmlns:a16="http://schemas.microsoft.com/office/drawing/2014/main" id="{2ECD1F83-D21B-AF77-EA49-033CCB436F82}"/>
+              </a:ext>
+            </a:extLst>
+          </p:cNvPr>
+          <p:cNvSpPr txBox="1">
+            <a:spLocks/>
+          </p:cNvSpPr>
+          <p:nvPr/>
+        </p:nvSpPr>
+        <p:spPr>
+          <a:xfrm>
+            <a:off x="600075" y="6473327"/>
+            <a:ext cx="1355725" cy="220121"/>
+          </a:xfrm>
+          <a:prstGeom prst="rect">
+            <a:avLst/>
+          </a:prstGeom>
+        </p:spPr>
+        <p:txBody>
+          <a:bodyPr vert="horz" lIns="91440" tIns="45720" rIns="91440" bIns="45720" rtlCol="0" anchor="ctr"/>
+          <a:lstStyle>
+            <a:defPPr>
+              <a:defRPr lang="sv-SE"/>
+            </a:defPPr>
+            <a:lvl1pPr marL="0" algn="l" defTabSz="914400" rtl="0" eaLnBrk="1" latinLnBrk="0" hangingPunct="1">
+              <a:defRPr sz="1200" kern="1200">
+                <a:solidFill>
+                  <a:schemeClr val="accent2"/>
+                </a:solidFill>
+                <a:latin typeface="+mn-lt"/>
+                <a:ea typeface="+mn-ea"/>
+                <a:cs typeface="+mn-cs"/>
+              </a:defRPr>
+            </a:lvl1pPr>
+            <a:lvl2pPr marL="457200" algn="l" defTabSz="914400" rtl="0" eaLnBrk="1" latinLnBrk="0" hangingPunct="1">
+              <a:defRPr sz="1800" kern="1200">
+                <a:solidFill>
+                  <a:schemeClr val="tx1"/>
+                </a:solidFill>
+                <a:latin typeface="+mn-lt"/>
+                <a:ea typeface="+mn-ea"/>
+                <a:cs typeface="+mn-cs"/>
+              </a:defRPr>
+            </a:lvl2pPr>
+            <a:lvl3pPr marL="914400" algn="l" defTabSz="914400" rtl="0" eaLnBrk="1" latinLnBrk="0" hangingPunct="1">
+              <a:defRPr sz="1800" kern="1200">
+                <a:solidFill>
+                  <a:schemeClr val="tx1"/>
+                </a:solidFill>
+                <a:latin typeface="+mn-lt"/>
+                <a:ea typeface="+mn-ea"/>
+                <a:cs typeface="+mn-cs"/>
+              </a:defRPr>
+            </a:lvl3pPr>
+            <a:lvl4pPr marL="1371600" algn="l" defTabSz="914400" rtl="0" eaLnBrk="1" latinLnBrk="0" hangingPunct="1">
+              <a:defRPr sz="1800" kern="1200">
+                <a:solidFill>
+                  <a:schemeClr val="tx1"/>
+                </a:solidFill>
+                <a:latin typeface="+mn-lt"/>
+                <a:ea typeface="+mn-ea"/>
+                <a:cs typeface="+mn-cs"/>
+              </a:defRPr>
+            </a:lvl4pPr>
+            <a:lvl5pPr marL="1828800" algn="l" defTabSz="914400" rtl="0" eaLnBrk="1" latinLnBrk="0" hangingPunct="1">
+              <a:defRPr sz="1800" kern="1200">
+                <a:solidFill>
+                  <a:schemeClr val="tx1"/>
+                </a:solidFill>
+                <a:latin typeface="+mn-lt"/>
+                <a:ea typeface="+mn-ea"/>
+                <a:cs typeface="+mn-cs"/>
+              </a:defRPr>
+            </a:lvl5pPr>
+            <a:lvl6pPr marL="2286000" algn="l" defTabSz="914400" rtl="0" eaLnBrk="1" latinLnBrk="0" hangingPunct="1">
+              <a:defRPr sz="1800" kern="1200">
+                <a:solidFill>
+                  <a:schemeClr val="tx1"/>
+                </a:solidFill>
+                <a:latin typeface="+mn-lt"/>
+                <a:ea typeface="+mn-ea"/>
+                <a:cs typeface="+mn-cs"/>
+              </a:defRPr>
+            </a:lvl6pPr>
+            <a:lvl7pPr marL="2743200" algn="l" defTabSz="914400" rtl="0" eaLnBrk="1" latinLnBrk="0" hangingPunct="1">
+              <a:defRPr sz="1800" kern="1200">
+                <a:solidFill>
+                  <a:schemeClr val="tx1"/>
+                </a:solidFill>
+                <a:latin typeface="+mn-lt"/>
+                <a:ea typeface="+mn-ea"/>
+                <a:cs typeface="+mn-cs"/>
+              </a:defRPr>
+            </a:lvl7pPr>
+            <a:lvl8pPr marL="3200400" algn="l" defTabSz="914400" rtl="0" eaLnBrk="1" latinLnBrk="0" hangingPunct="1">
+              <a:defRPr sz="1800" kern="1200">
+                <a:solidFill>
+                  <a:schemeClr val="tx1"/>
+                </a:solidFill>
+                <a:latin typeface="+mn-lt"/>
+                <a:ea typeface="+mn-ea"/>
+                <a:cs typeface="+mn-cs"/>
+              </a:defRPr>
+            </a:lvl8pPr>
+            <a:lvl9pPr marL="3657600" algn="l" defTabSz="914400" rtl="0" eaLnBrk="1" latinLnBrk="0" hangingPunct="1">
+              <a:defRPr sz="1800" kern="1200">
+                <a:solidFill>
+                  <a:schemeClr val="tx1"/>
+                </a:solidFill>
+                <a:latin typeface="+mn-lt"/>
+                <a:ea typeface="+mn-ea"/>
+                <a:cs typeface="+mn-cs"/>
+              </a:defRPr>
+            </a:lvl9pPr>
+          </a:lstStyle>
+          <a:p>
+            <a:fld id="{888E4D63-BE2C-4D4B-BBD2-256262659A9F}" type="datetime1">
+              <a:rPr lang="sv-SE" smtClean="0">
+                <a:solidFill>
+                  <a:schemeClr val="bg1">
+                    <a:lumMod val="50000"/>
+                  </a:schemeClr>
+                </a:solidFill>
+              </a:rPr>
+              <a:pPr/>
+              <a:t>2025-05-21</a:t>
+            </a:fld>
+            <a:endParaRPr lang="sv-SE" dirty="0">
+              <a:solidFill>
+                <a:schemeClr val="bg1">
+                  <a:lumMod val="50000"/>
+                </a:schemeClr>
+              </a:solidFill>
+            </a:endParaRPr>
+          </a:p>
+        </p:txBody>
+      </p:sp>
+      <p:sp>
+        <p:nvSpPr>
+          <p:cNvPr id="8" name="Platshållare för sidfot 4">
+            <a:extLst>
+              <a:ext uri="{FF2B5EF4-FFF2-40B4-BE49-F238E27FC236}">
+                <a16:creationId xmlns:a16="http://schemas.microsoft.com/office/drawing/2014/main" id="{12F14D8D-0A9A-A5CC-090B-F99029A75BAA}"/>
+              </a:ext>
+            </a:extLst>
+          </p:cNvPr>
+          <p:cNvSpPr txBox="1">
+            <a:spLocks/>
+          </p:cNvSpPr>
+          <p:nvPr/>
+        </p:nvSpPr>
+        <p:spPr>
+          <a:xfrm>
+            <a:off x="1955800" y="6470364"/>
+            <a:ext cx="8280399" cy="220120"/>
+          </a:xfrm>
+          <a:prstGeom prst="rect">
+            <a:avLst/>
+          </a:prstGeom>
+        </p:spPr>
+        <p:txBody>
+          <a:bodyPr vert="horz" lIns="91440" tIns="45720" rIns="91440" bIns="45720" rtlCol="0" anchor="ctr"/>
+          <a:lstStyle>
+            <a:defPPr>
+              <a:defRPr lang="sv-SE"/>
+            </a:defPPr>
+            <a:lvl1pPr marL="0" algn="ctr" defTabSz="914400" rtl="0" eaLnBrk="1" latinLnBrk="0" hangingPunct="1">
+              <a:defRPr sz="1200" kern="1200">
+                <a:solidFill>
+                  <a:schemeClr val="accent2"/>
+                </a:solidFill>
+                <a:latin typeface="+mn-lt"/>
+                <a:ea typeface="+mn-ea"/>
+                <a:cs typeface="+mn-cs"/>
+              </a:defRPr>
+            </a:lvl1pPr>
+            <a:lvl2pPr marL="457200" algn="l" defTabSz="914400" rtl="0" eaLnBrk="1" latinLnBrk="0" hangingPunct="1">
+              <a:defRPr sz="1800" kern="1200">
+                <a:solidFill>
+                  <a:schemeClr val="tx1"/>
+                </a:solidFill>
+                <a:latin typeface="+mn-lt"/>
+                <a:ea typeface="+mn-ea"/>
+                <a:cs typeface="+mn-cs"/>
+              </a:defRPr>
+            </a:lvl2pPr>
+            <a:lvl3pPr marL="914400" algn="l" defTabSz="914400" rtl="0" eaLnBrk="1" latinLnBrk="0" hangingPunct="1">
+              <a:defRPr sz="1800" kern="1200">
+                <a:solidFill>
+                  <a:schemeClr val="tx1"/>
+                </a:solidFill>
+                <a:latin typeface="+mn-lt"/>
+                <a:ea typeface="+mn-ea"/>
+                <a:cs typeface="+mn-cs"/>
+              </a:defRPr>
+            </a:lvl3pPr>
+            <a:lvl4pPr marL="1371600" algn="l" defTabSz="914400" rtl="0" eaLnBrk="1" latinLnBrk="0" hangingPunct="1">
+              <a:defRPr sz="1800" kern="1200">
+                <a:solidFill>
+                  <a:schemeClr val="tx1"/>
+                </a:solidFill>
+                <a:latin typeface="+mn-lt"/>
+                <a:ea typeface="+mn-ea"/>
+                <a:cs typeface="+mn-cs"/>
+              </a:defRPr>
+            </a:lvl4pPr>
+            <a:lvl5pPr marL="1828800" algn="l" defTabSz="914400" rtl="0" eaLnBrk="1" latinLnBrk="0" hangingPunct="1">
+              <a:defRPr sz="1800" kern="1200">
+                <a:solidFill>
+                  <a:schemeClr val="tx1"/>
+                </a:solidFill>
+                <a:latin typeface="+mn-lt"/>
+                <a:ea typeface="+mn-ea"/>
+                <a:cs typeface="+mn-cs"/>
+              </a:defRPr>
+            </a:lvl5pPr>
+            <a:lvl6pPr marL="2286000" algn="l" defTabSz="914400" rtl="0" eaLnBrk="1" latinLnBrk="0" hangingPunct="1">
+              <a:defRPr sz="1800" kern="1200">
+                <a:solidFill>
+                  <a:schemeClr val="tx1"/>
+                </a:solidFill>
+                <a:latin typeface="+mn-lt"/>
+                <a:ea typeface="+mn-ea"/>
+                <a:cs typeface="+mn-cs"/>
+              </a:defRPr>
+            </a:lvl6pPr>
+            <a:lvl7pPr marL="2743200" algn="l" defTabSz="914400" rtl="0" eaLnBrk="1" latinLnBrk="0" hangingPunct="1">
+              <a:defRPr sz="1800" kern="1200">
+                <a:solidFill>
+                  <a:schemeClr val="tx1"/>
+                </a:solidFill>
+                <a:latin typeface="+mn-lt"/>
+                <a:ea typeface="+mn-ea"/>
+                <a:cs typeface="+mn-cs"/>
+              </a:defRPr>
+            </a:lvl7pPr>
+            <a:lvl8pPr marL="3200400" algn="l" defTabSz="914400" rtl="0" eaLnBrk="1" latinLnBrk="0" hangingPunct="1">
+              <a:defRPr sz="1800" kern="1200">
+                <a:solidFill>
+                  <a:schemeClr val="tx1"/>
+                </a:solidFill>
+                <a:latin typeface="+mn-lt"/>
+                <a:ea typeface="+mn-ea"/>
+                <a:cs typeface="+mn-cs"/>
+              </a:defRPr>
+            </a:lvl8pPr>
+            <a:lvl9pPr marL="3657600" algn="l" defTabSz="914400" rtl="0" eaLnBrk="1" latinLnBrk="0" hangingPunct="1">
+              <a:defRPr sz="1800" kern="1200">
+                <a:solidFill>
+                  <a:schemeClr val="tx1"/>
+                </a:solidFill>
+                <a:latin typeface="+mn-lt"/>
+                <a:ea typeface="+mn-ea"/>
+                <a:cs typeface="+mn-cs"/>
+              </a:defRPr>
+            </a:lvl9pPr>
+          </a:lstStyle>
+          <a:p>
+            <a:r>
+              <a:rPr lang="sv-SE">
+                <a:solidFill>
+                  <a:schemeClr val="bg1">
+                    <a:lumMod val="50000"/>
+                  </a:schemeClr>
+                </a:solidFill>
+              </a:rPr>
+              <a:t>DD2424 Project: Transfer Learning | Ksenia Biazruchanka, Tobias Haunreiter, Alexander Soukup, Johannes Jeup</a:t>
+            </a:r>
+            <a:endParaRPr lang="sv-SE" dirty="0">
+              <a:solidFill>
+                <a:schemeClr val="bg1">
+                  <a:lumMod val="50000"/>
+                </a:schemeClr>
+              </a:solidFill>
+            </a:endParaRPr>
+          </a:p>
+        </p:txBody>
+      </p:sp>
+      <p:sp>
+        <p:nvSpPr>
+          <p:cNvPr id="9" name="Platshållare för bildnummer 5">
+            <a:extLst>
+              <a:ext uri="{FF2B5EF4-FFF2-40B4-BE49-F238E27FC236}">
+                <a16:creationId xmlns:a16="http://schemas.microsoft.com/office/drawing/2014/main" id="{0396A856-15AE-3EE9-51F0-CFD51A3CD954}"/>
+              </a:ext>
+            </a:extLst>
+          </p:cNvPr>
+          <p:cNvSpPr txBox="1">
+            <a:spLocks/>
+          </p:cNvSpPr>
+          <p:nvPr/>
+        </p:nvSpPr>
+        <p:spPr>
+          <a:xfrm>
+            <a:off x="10236199" y="6473328"/>
+            <a:ext cx="1355726" cy="220120"/>
+          </a:xfrm>
+          <a:prstGeom prst="rect">
+            <a:avLst/>
+          </a:prstGeom>
+        </p:spPr>
+        <p:txBody>
+          <a:bodyPr vert="horz" lIns="91440" tIns="45720" rIns="91440" bIns="45720" rtlCol="0" anchor="ctr"/>
+          <a:lstStyle>
+            <a:defPPr>
+              <a:defRPr lang="sv-SE"/>
+            </a:defPPr>
+            <a:lvl1pPr marL="0" algn="r" defTabSz="914400" rtl="0" eaLnBrk="1" latinLnBrk="0" hangingPunct="1">
+              <a:defRPr sz="1200" kern="1200">
+                <a:solidFill>
+                  <a:schemeClr val="accent2"/>
+                </a:solidFill>
+                <a:latin typeface="+mn-lt"/>
+                <a:ea typeface="+mn-ea"/>
+                <a:cs typeface="+mn-cs"/>
+              </a:defRPr>
+            </a:lvl1pPr>
+            <a:lvl2pPr marL="457200" algn="l" defTabSz="914400" rtl="0" eaLnBrk="1" latinLnBrk="0" hangingPunct="1">
+              <a:defRPr sz="1800" kern="1200">
+                <a:solidFill>
+                  <a:schemeClr val="tx1"/>
+                </a:solidFill>
+                <a:latin typeface="+mn-lt"/>
+                <a:ea typeface="+mn-ea"/>
+                <a:cs typeface="+mn-cs"/>
+              </a:defRPr>
+            </a:lvl2pPr>
+            <a:lvl3pPr marL="914400" algn="l" defTabSz="914400" rtl="0" eaLnBrk="1" latinLnBrk="0" hangingPunct="1">
+              <a:defRPr sz="1800" kern="1200">
+                <a:solidFill>
+                  <a:schemeClr val="tx1"/>
+                </a:solidFill>
+                <a:latin typeface="+mn-lt"/>
+                <a:ea typeface="+mn-ea"/>
+                <a:cs typeface="+mn-cs"/>
+              </a:defRPr>
+            </a:lvl3pPr>
+            <a:lvl4pPr marL="1371600" algn="l" defTabSz="914400" rtl="0" eaLnBrk="1" latinLnBrk="0" hangingPunct="1">
+              <a:defRPr sz="1800" kern="1200">
+                <a:solidFill>
+                  <a:schemeClr val="tx1"/>
+                </a:solidFill>
+                <a:latin typeface="+mn-lt"/>
+                <a:ea typeface="+mn-ea"/>
+                <a:cs typeface="+mn-cs"/>
+              </a:defRPr>
+            </a:lvl4pPr>
+            <a:lvl5pPr marL="1828800" algn="l" defTabSz="914400" rtl="0" eaLnBrk="1" latinLnBrk="0" hangingPunct="1">
+              <a:defRPr sz="1800" kern="1200">
+                <a:solidFill>
+                  <a:schemeClr val="tx1"/>
+                </a:solidFill>
+                <a:latin typeface="+mn-lt"/>
+                <a:ea typeface="+mn-ea"/>
+                <a:cs typeface="+mn-cs"/>
+              </a:defRPr>
+            </a:lvl5pPr>
+            <a:lvl6pPr marL="2286000" algn="l" defTabSz="914400" rtl="0" eaLnBrk="1" latinLnBrk="0" hangingPunct="1">
+              <a:defRPr sz="1800" kern="1200">
+                <a:solidFill>
+                  <a:schemeClr val="tx1"/>
+                </a:solidFill>
+                <a:latin typeface="+mn-lt"/>
+                <a:ea typeface="+mn-ea"/>
+                <a:cs typeface="+mn-cs"/>
+              </a:defRPr>
+            </a:lvl6pPr>
+            <a:lvl7pPr marL="2743200" algn="l" defTabSz="914400" rtl="0" eaLnBrk="1" latinLnBrk="0" hangingPunct="1">
+              <a:defRPr sz="1800" kern="1200">
+                <a:solidFill>
+                  <a:schemeClr val="tx1"/>
+                </a:solidFill>
+                <a:latin typeface="+mn-lt"/>
+                <a:ea typeface="+mn-ea"/>
+                <a:cs typeface="+mn-cs"/>
+              </a:defRPr>
+            </a:lvl7pPr>
+            <a:lvl8pPr marL="3200400" algn="l" defTabSz="914400" rtl="0" eaLnBrk="1" latinLnBrk="0" hangingPunct="1">
+              <a:defRPr sz="1800" kern="1200">
+                <a:solidFill>
+                  <a:schemeClr val="tx1"/>
+                </a:solidFill>
+                <a:latin typeface="+mn-lt"/>
+                <a:ea typeface="+mn-ea"/>
+                <a:cs typeface="+mn-cs"/>
+              </a:defRPr>
+            </a:lvl8pPr>
+            <a:lvl9pPr marL="3657600" algn="l" defTabSz="914400" rtl="0" eaLnBrk="1" latinLnBrk="0" hangingPunct="1">
+              <a:defRPr sz="1800" kern="1200">
+                <a:solidFill>
+                  <a:schemeClr val="tx1"/>
+                </a:solidFill>
+                <a:latin typeface="+mn-lt"/>
+                <a:ea typeface="+mn-ea"/>
+                <a:cs typeface="+mn-cs"/>
+              </a:defRPr>
+            </a:lvl9pPr>
+          </a:lstStyle>
+          <a:p>
+            <a:fld id="{B716C8F4-20CD-364A-8A8E-DE130115B178}" type="slidenum">
+              <a:rPr lang="sv-SE" smtClean="0">
+                <a:solidFill>
+                  <a:schemeClr val="bg1">
+                    <a:lumMod val="50000"/>
+                  </a:schemeClr>
+                </a:solidFill>
+              </a:rPr>
+              <a:pPr/>
+              <a:t>3</a:t>
+            </a:fld>
+            <a:endParaRPr lang="sv-SE" dirty="0">
+              <a:solidFill>
+                <a:schemeClr val="bg1">
+                  <a:lumMod val="50000"/>
+                </a:schemeClr>
+              </a:solidFill>
+            </a:endParaRPr>
+          </a:p>
+        </p:txBody>
+      </p:sp>
+    </p:spTree>
+    <p:extLst>
+      <p:ext uri="{BB962C8B-B14F-4D97-AF65-F5344CB8AC3E}">
+        <p14:creationId xmlns:p14="http://schemas.microsoft.com/office/powerpoint/2010/main" val="3067886182"/>
+      </p:ext>
+    </p:extLst>
+  </p:cSld>
+  <p:clrMapOvr>
+    <a:masterClrMapping/>
+  </p:clrMapOvr>
+</p:sld>
+</file>
+
+<file path=ppt/slides/slide4.xml><?xml version="1.0" encoding="utf-8"?>
+<p:sld xmlns:a="http://schemas.openxmlformats.org/drawingml/2006/main" xmlns:r="http://schemas.openxmlformats.org/officeDocument/2006/relationships" xmlns:p="http://schemas.openxmlformats.org/presentationml/2006/main">
+  <p:cSld>
+    <p:spTree>
+      <p:nvGrpSpPr>
+        <p:cNvPr id="1" name=""/>
+        <p:cNvGrpSpPr/>
+        <p:nvPr/>
+      </p:nvGrpSpPr>
+      <p:grpSpPr>
+        <a:xfrm>
+          <a:off x="0" y="0"/>
+          <a:ext cx="0" cy="0"/>
+          <a:chOff x="0" y="0"/>
+          <a:chExt cx="0" cy="0"/>
+        </a:xfrm>
+      </p:grpSpPr>
+      <p:sp>
+        <p:nvSpPr>
+          <p:cNvPr id="2" name="Titel 1">
+            <a:extLst>
+              <a:ext uri="{FF2B5EF4-FFF2-40B4-BE49-F238E27FC236}">
+                <a16:creationId xmlns:a16="http://schemas.microsoft.com/office/drawing/2014/main" id="{D9FF4866-62A1-0E64-85B3-67642B7ADD5A}"/>
+              </a:ext>
+            </a:extLst>
+          </p:cNvPr>
+          <p:cNvSpPr>
+            <a:spLocks noGrp="1"/>
+          </p:cNvSpPr>
+          <p:nvPr>
+            <p:ph type="title"/>
+          </p:nvPr>
+        </p:nvSpPr>
+        <p:spPr/>
+        <p:txBody>
+          <a:bodyPr/>
+          <a:lstStyle/>
+          <a:p>
+            <a:r>
+              <a:rPr lang="en-US" dirty="0"/>
+              <a:t>Breed Classification</a:t>
+            </a:r>
+          </a:p>
+        </p:txBody>
+      </p:sp>
+      <p:sp>
+        <p:nvSpPr>
+          <p:cNvPr id="3" name="Inhaltsplatzhalter 2">
+            <a:extLst>
+              <a:ext uri="{FF2B5EF4-FFF2-40B4-BE49-F238E27FC236}">
+                <a16:creationId xmlns:a16="http://schemas.microsoft.com/office/drawing/2014/main" id="{40BFBBB2-E4C2-7FCE-868B-B0704779EC7D}"/>
+              </a:ext>
+            </a:extLst>
+          </p:cNvPr>
+          <p:cNvSpPr>
+            <a:spLocks noGrp="1"/>
+          </p:cNvSpPr>
+          <p:nvPr>
+            <p:ph idx="1"/>
+          </p:nvPr>
+        </p:nvSpPr>
+        <p:spPr/>
+        <p:txBody>
+          <a:bodyPr/>
+          <a:lstStyle/>
+          <a:p>
+            <a:r>
+              <a:rPr lang="en-US" sz="2400" b="1" dirty="0">
+                <a:solidFill>
+                  <a:srgbClr val="002060"/>
+                </a:solidFill>
+              </a:rPr>
+              <a:t>Fine-tuning &amp; Gradual Unfreezing for 37 Breeds</a:t>
+            </a:r>
+          </a:p>
+          <a:p>
+            <a:pPr lvl="1"/>
+            <a:endParaRPr lang="en-US" dirty="0"/>
+          </a:p>
+        </p:txBody>
+      </p:sp>
+      <p:sp>
+        <p:nvSpPr>
+          <p:cNvPr id="7" name="Platshållare för datum 3">
+            <a:extLst>
+              <a:ext uri="{FF2B5EF4-FFF2-40B4-BE49-F238E27FC236}">
+                <a16:creationId xmlns:a16="http://schemas.microsoft.com/office/drawing/2014/main" id="{EABFEBCE-5350-B59D-F82C-7D67401B74B5}"/>
+              </a:ext>
+            </a:extLst>
+          </p:cNvPr>
+          <p:cNvSpPr txBox="1">
+            <a:spLocks/>
+          </p:cNvSpPr>
+          <p:nvPr/>
+        </p:nvSpPr>
+        <p:spPr>
+          <a:xfrm>
+            <a:off x="600075" y="6473327"/>
+            <a:ext cx="1355725" cy="220121"/>
+          </a:xfrm>
+          <a:prstGeom prst="rect">
+            <a:avLst/>
+          </a:prstGeom>
+        </p:spPr>
+        <p:txBody>
+          <a:bodyPr vert="horz" lIns="91440" tIns="45720" rIns="91440" bIns="45720" rtlCol="0" anchor="ctr"/>
+          <a:lstStyle>
+            <a:defPPr>
+              <a:defRPr lang="sv-SE"/>
+            </a:defPPr>
+            <a:lvl1pPr marL="0" algn="l" defTabSz="914400" rtl="0" eaLnBrk="1" latinLnBrk="0" hangingPunct="1">
+              <a:defRPr sz="1200" kern="1200">
+                <a:solidFill>
+                  <a:schemeClr val="accent2"/>
+                </a:solidFill>
+                <a:latin typeface="+mn-lt"/>
+                <a:ea typeface="+mn-ea"/>
+                <a:cs typeface="+mn-cs"/>
+              </a:defRPr>
+            </a:lvl1pPr>
+            <a:lvl2pPr marL="457200" algn="l" defTabSz="914400" rtl="0" eaLnBrk="1" latinLnBrk="0" hangingPunct="1">
+              <a:defRPr sz="1800" kern="1200">
+                <a:solidFill>
+                  <a:schemeClr val="tx1"/>
+                </a:solidFill>
+                <a:latin typeface="+mn-lt"/>
+                <a:ea typeface="+mn-ea"/>
+                <a:cs typeface="+mn-cs"/>
+              </a:defRPr>
+            </a:lvl2pPr>
+            <a:lvl3pPr marL="914400" algn="l" defTabSz="914400" rtl="0" eaLnBrk="1" latinLnBrk="0" hangingPunct="1">
+              <a:defRPr sz="1800" kern="1200">
+                <a:solidFill>
+                  <a:schemeClr val="tx1"/>
+                </a:solidFill>
+                <a:latin typeface="+mn-lt"/>
+                <a:ea typeface="+mn-ea"/>
+                <a:cs typeface="+mn-cs"/>
+              </a:defRPr>
+            </a:lvl3pPr>
+            <a:lvl4pPr marL="1371600" algn="l" defTabSz="914400" rtl="0" eaLnBrk="1" latinLnBrk="0" hangingPunct="1">
+              <a:defRPr sz="1800" kern="1200">
+                <a:solidFill>
+                  <a:schemeClr val="tx1"/>
+                </a:solidFill>
+                <a:latin typeface="+mn-lt"/>
+                <a:ea typeface="+mn-ea"/>
+                <a:cs typeface="+mn-cs"/>
+              </a:defRPr>
+            </a:lvl4pPr>
+            <a:lvl5pPr marL="1828800" algn="l" defTabSz="914400" rtl="0" eaLnBrk="1" latinLnBrk="0" hangingPunct="1">
+              <a:defRPr sz="1800" kern="1200">
+                <a:solidFill>
+                  <a:schemeClr val="tx1"/>
+                </a:solidFill>
+                <a:latin typeface="+mn-lt"/>
+                <a:ea typeface="+mn-ea"/>
+                <a:cs typeface="+mn-cs"/>
+              </a:defRPr>
+            </a:lvl5pPr>
+            <a:lvl6pPr marL="2286000" algn="l" defTabSz="914400" rtl="0" eaLnBrk="1" latinLnBrk="0" hangingPunct="1">
+              <a:defRPr sz="1800" kern="1200">
+                <a:solidFill>
+                  <a:schemeClr val="tx1"/>
+                </a:solidFill>
+                <a:latin typeface="+mn-lt"/>
+                <a:ea typeface="+mn-ea"/>
+                <a:cs typeface="+mn-cs"/>
+              </a:defRPr>
+            </a:lvl6pPr>
+            <a:lvl7pPr marL="2743200" algn="l" defTabSz="914400" rtl="0" eaLnBrk="1" latinLnBrk="0" hangingPunct="1">
+              <a:defRPr sz="1800" kern="1200">
+                <a:solidFill>
+                  <a:schemeClr val="tx1"/>
+                </a:solidFill>
+                <a:latin typeface="+mn-lt"/>
+                <a:ea typeface="+mn-ea"/>
+                <a:cs typeface="+mn-cs"/>
+              </a:defRPr>
+            </a:lvl7pPr>
+            <a:lvl8pPr marL="3200400" algn="l" defTabSz="914400" rtl="0" eaLnBrk="1" latinLnBrk="0" hangingPunct="1">
+              <a:defRPr sz="1800" kern="1200">
+                <a:solidFill>
+                  <a:schemeClr val="tx1"/>
+                </a:solidFill>
+                <a:latin typeface="+mn-lt"/>
+                <a:ea typeface="+mn-ea"/>
+                <a:cs typeface="+mn-cs"/>
+              </a:defRPr>
+            </a:lvl8pPr>
+            <a:lvl9pPr marL="3657600" algn="l" defTabSz="914400" rtl="0" eaLnBrk="1" latinLnBrk="0" hangingPunct="1">
+              <a:defRPr sz="1800" kern="1200">
+                <a:solidFill>
+                  <a:schemeClr val="tx1"/>
+                </a:solidFill>
+                <a:latin typeface="+mn-lt"/>
+                <a:ea typeface="+mn-ea"/>
+                <a:cs typeface="+mn-cs"/>
+              </a:defRPr>
+            </a:lvl9pPr>
+          </a:lstStyle>
+          <a:p>
+            <a:fld id="{888E4D63-BE2C-4D4B-BBD2-256262659A9F}" type="datetime1">
+              <a:rPr lang="sv-SE" smtClean="0">
+                <a:solidFill>
+                  <a:schemeClr val="bg1">
+                    <a:lumMod val="50000"/>
+                  </a:schemeClr>
+                </a:solidFill>
+              </a:rPr>
+              <a:pPr/>
+              <a:t>2025-05-21</a:t>
+            </a:fld>
+            <a:endParaRPr lang="sv-SE" dirty="0">
+              <a:solidFill>
+                <a:schemeClr val="bg1">
+                  <a:lumMod val="50000"/>
+                </a:schemeClr>
+              </a:solidFill>
+            </a:endParaRPr>
+          </a:p>
+        </p:txBody>
+      </p:sp>
+      <p:sp>
+        <p:nvSpPr>
+          <p:cNvPr id="8" name="Platshållare för sidfot 4">
+            <a:extLst>
+              <a:ext uri="{FF2B5EF4-FFF2-40B4-BE49-F238E27FC236}">
+                <a16:creationId xmlns:a16="http://schemas.microsoft.com/office/drawing/2014/main" id="{D2049C64-F3E8-98F3-EB77-FF568ADAFEB3}"/>
+              </a:ext>
+            </a:extLst>
+          </p:cNvPr>
+          <p:cNvSpPr txBox="1">
+            <a:spLocks/>
+          </p:cNvSpPr>
+          <p:nvPr/>
+        </p:nvSpPr>
+        <p:spPr>
+          <a:xfrm>
+            <a:off x="1955800" y="6470364"/>
+            <a:ext cx="8280399" cy="220120"/>
+          </a:xfrm>
+          <a:prstGeom prst="rect">
+            <a:avLst/>
+          </a:prstGeom>
+        </p:spPr>
+        <p:txBody>
+          <a:bodyPr vert="horz" lIns="91440" tIns="45720" rIns="91440" bIns="45720" rtlCol="0" anchor="ctr"/>
+          <a:lstStyle>
+            <a:defPPr>
+              <a:defRPr lang="sv-SE"/>
+            </a:defPPr>
+            <a:lvl1pPr marL="0" algn="ctr" defTabSz="914400" rtl="0" eaLnBrk="1" latinLnBrk="0" hangingPunct="1">
+              <a:defRPr sz="1200" kern="1200">
+                <a:solidFill>
+                  <a:schemeClr val="accent2"/>
+                </a:solidFill>
+                <a:latin typeface="+mn-lt"/>
+                <a:ea typeface="+mn-ea"/>
+                <a:cs typeface="+mn-cs"/>
+              </a:defRPr>
+            </a:lvl1pPr>
+            <a:lvl2pPr marL="457200" algn="l" defTabSz="914400" rtl="0" eaLnBrk="1" latinLnBrk="0" hangingPunct="1">
+              <a:defRPr sz="1800" kern="1200">
+                <a:solidFill>
+                  <a:schemeClr val="tx1"/>
+                </a:solidFill>
+                <a:latin typeface="+mn-lt"/>
+                <a:ea typeface="+mn-ea"/>
+                <a:cs typeface="+mn-cs"/>
+              </a:defRPr>
+            </a:lvl2pPr>
+            <a:lvl3pPr marL="914400" algn="l" defTabSz="914400" rtl="0" eaLnBrk="1" latinLnBrk="0" hangingPunct="1">
+              <a:defRPr sz="1800" kern="1200">
+                <a:solidFill>
+                  <a:schemeClr val="tx1"/>
+                </a:solidFill>
+                <a:latin typeface="+mn-lt"/>
+                <a:ea typeface="+mn-ea"/>
+                <a:cs typeface="+mn-cs"/>
+              </a:defRPr>
+            </a:lvl3pPr>
+            <a:lvl4pPr marL="1371600" algn="l" defTabSz="914400" rtl="0" eaLnBrk="1" latinLnBrk="0" hangingPunct="1">
+              <a:defRPr sz="1800" kern="1200">
+                <a:solidFill>
+                  <a:schemeClr val="tx1"/>
+                </a:solidFill>
+                <a:latin typeface="+mn-lt"/>
+                <a:ea typeface="+mn-ea"/>
+                <a:cs typeface="+mn-cs"/>
+              </a:defRPr>
+            </a:lvl4pPr>
+            <a:lvl5pPr marL="1828800" algn="l" defTabSz="914400" rtl="0" eaLnBrk="1" latinLnBrk="0" hangingPunct="1">
+              <a:defRPr sz="1800" kern="1200">
+                <a:solidFill>
+                  <a:schemeClr val="tx1"/>
+                </a:solidFill>
+                <a:latin typeface="+mn-lt"/>
+                <a:ea typeface="+mn-ea"/>
+                <a:cs typeface="+mn-cs"/>
+              </a:defRPr>
+            </a:lvl5pPr>
+            <a:lvl6pPr marL="2286000" algn="l" defTabSz="914400" rtl="0" eaLnBrk="1" latinLnBrk="0" hangingPunct="1">
+              <a:defRPr sz="1800" kern="1200">
+                <a:solidFill>
+                  <a:schemeClr val="tx1"/>
+                </a:solidFill>
+                <a:latin typeface="+mn-lt"/>
+                <a:ea typeface="+mn-ea"/>
+                <a:cs typeface="+mn-cs"/>
+              </a:defRPr>
+            </a:lvl6pPr>
+            <a:lvl7pPr marL="2743200" algn="l" defTabSz="914400" rtl="0" eaLnBrk="1" latinLnBrk="0" hangingPunct="1">
+              <a:defRPr sz="1800" kern="1200">
+                <a:solidFill>
+                  <a:schemeClr val="tx1"/>
+                </a:solidFill>
+                <a:latin typeface="+mn-lt"/>
+                <a:ea typeface="+mn-ea"/>
+                <a:cs typeface="+mn-cs"/>
+              </a:defRPr>
+            </a:lvl7pPr>
+            <a:lvl8pPr marL="3200400" algn="l" defTabSz="914400" rtl="0" eaLnBrk="1" latinLnBrk="0" hangingPunct="1">
+              <a:defRPr sz="1800" kern="1200">
+                <a:solidFill>
+                  <a:schemeClr val="tx1"/>
+                </a:solidFill>
+                <a:latin typeface="+mn-lt"/>
+                <a:ea typeface="+mn-ea"/>
+                <a:cs typeface="+mn-cs"/>
+              </a:defRPr>
+            </a:lvl8pPr>
+            <a:lvl9pPr marL="3657600" algn="l" defTabSz="914400" rtl="0" eaLnBrk="1" latinLnBrk="0" hangingPunct="1">
+              <a:defRPr sz="1800" kern="1200">
+                <a:solidFill>
+                  <a:schemeClr val="tx1"/>
+                </a:solidFill>
+                <a:latin typeface="+mn-lt"/>
+                <a:ea typeface="+mn-ea"/>
+                <a:cs typeface="+mn-cs"/>
+              </a:defRPr>
+            </a:lvl9pPr>
+          </a:lstStyle>
+          <a:p>
+            <a:r>
+              <a:rPr lang="sv-SE">
+                <a:solidFill>
+                  <a:schemeClr val="bg1">
+                    <a:lumMod val="50000"/>
+                  </a:schemeClr>
+                </a:solidFill>
+              </a:rPr>
+              <a:t>DD2424 Project: Transfer Learning | Ksenia Biazruchanka, Tobias Haunreiter, Alexander Soukup, Johannes Jeup</a:t>
+            </a:r>
+            <a:endParaRPr lang="sv-SE" dirty="0">
+              <a:solidFill>
+                <a:schemeClr val="bg1">
+                  <a:lumMod val="50000"/>
+                </a:schemeClr>
+              </a:solidFill>
+            </a:endParaRPr>
+          </a:p>
+        </p:txBody>
+      </p:sp>
+      <p:sp>
+        <p:nvSpPr>
+          <p:cNvPr id="9" name="Platshållare för bildnummer 5">
+            <a:extLst>
+              <a:ext uri="{FF2B5EF4-FFF2-40B4-BE49-F238E27FC236}">
+                <a16:creationId xmlns:a16="http://schemas.microsoft.com/office/drawing/2014/main" id="{8136EB9B-069B-C96C-9CB6-FF60FAEA14BA}"/>
+              </a:ext>
+            </a:extLst>
+          </p:cNvPr>
+          <p:cNvSpPr txBox="1">
+            <a:spLocks/>
+          </p:cNvSpPr>
+          <p:nvPr/>
+        </p:nvSpPr>
+        <p:spPr>
+          <a:xfrm>
+            <a:off x="10236199" y="6473328"/>
+            <a:ext cx="1355726" cy="220120"/>
+          </a:xfrm>
+          <a:prstGeom prst="rect">
+            <a:avLst/>
+          </a:prstGeom>
+        </p:spPr>
+        <p:txBody>
+          <a:bodyPr vert="horz" lIns="91440" tIns="45720" rIns="91440" bIns="45720" rtlCol="0" anchor="ctr"/>
+          <a:lstStyle>
+            <a:defPPr>
+              <a:defRPr lang="sv-SE"/>
+            </a:defPPr>
+            <a:lvl1pPr marL="0" algn="r" defTabSz="914400" rtl="0" eaLnBrk="1" latinLnBrk="0" hangingPunct="1">
+              <a:defRPr sz="1200" kern="1200">
+                <a:solidFill>
+                  <a:schemeClr val="accent2"/>
+                </a:solidFill>
+                <a:latin typeface="+mn-lt"/>
+                <a:ea typeface="+mn-ea"/>
+                <a:cs typeface="+mn-cs"/>
+              </a:defRPr>
+            </a:lvl1pPr>
+            <a:lvl2pPr marL="457200" algn="l" defTabSz="914400" rtl="0" eaLnBrk="1" latinLnBrk="0" hangingPunct="1">
+              <a:defRPr sz="1800" kern="1200">
+                <a:solidFill>
+                  <a:schemeClr val="tx1"/>
+                </a:solidFill>
+                <a:latin typeface="+mn-lt"/>
+                <a:ea typeface="+mn-ea"/>
+                <a:cs typeface="+mn-cs"/>
+              </a:defRPr>
+            </a:lvl2pPr>
+            <a:lvl3pPr marL="914400" algn="l" defTabSz="914400" rtl="0" eaLnBrk="1" latinLnBrk="0" hangingPunct="1">
+              <a:defRPr sz="1800" kern="1200">
+                <a:solidFill>
+                  <a:schemeClr val="tx1"/>
+                </a:solidFill>
+                <a:latin typeface="+mn-lt"/>
+                <a:ea typeface="+mn-ea"/>
+                <a:cs typeface="+mn-cs"/>
+              </a:defRPr>
+            </a:lvl3pPr>
+            <a:lvl4pPr marL="1371600" algn="l" defTabSz="914400" rtl="0" eaLnBrk="1" latinLnBrk="0" hangingPunct="1">
+              <a:defRPr sz="1800" kern="1200">
+                <a:solidFill>
+                  <a:schemeClr val="tx1"/>
+                </a:solidFill>
+                <a:latin typeface="+mn-lt"/>
+                <a:ea typeface="+mn-ea"/>
+                <a:cs typeface="+mn-cs"/>
+              </a:defRPr>
+            </a:lvl4pPr>
+            <a:lvl5pPr marL="1828800" algn="l" defTabSz="914400" rtl="0" eaLnBrk="1" latinLnBrk="0" hangingPunct="1">
+              <a:defRPr sz="1800" kern="1200">
+                <a:solidFill>
+                  <a:schemeClr val="tx1"/>
+                </a:solidFill>
+                <a:latin typeface="+mn-lt"/>
+                <a:ea typeface="+mn-ea"/>
+                <a:cs typeface="+mn-cs"/>
+              </a:defRPr>
+            </a:lvl5pPr>
+            <a:lvl6pPr marL="2286000" algn="l" defTabSz="914400" rtl="0" eaLnBrk="1" latinLnBrk="0" hangingPunct="1">
+              <a:defRPr sz="1800" kern="1200">
+                <a:solidFill>
+                  <a:schemeClr val="tx1"/>
+                </a:solidFill>
+                <a:latin typeface="+mn-lt"/>
+                <a:ea typeface="+mn-ea"/>
+                <a:cs typeface="+mn-cs"/>
+              </a:defRPr>
+            </a:lvl6pPr>
+            <a:lvl7pPr marL="2743200" algn="l" defTabSz="914400" rtl="0" eaLnBrk="1" latinLnBrk="0" hangingPunct="1">
+              <a:defRPr sz="1800" kern="1200">
+                <a:solidFill>
+                  <a:schemeClr val="tx1"/>
+                </a:solidFill>
+                <a:latin typeface="+mn-lt"/>
+                <a:ea typeface="+mn-ea"/>
+                <a:cs typeface="+mn-cs"/>
+              </a:defRPr>
+            </a:lvl7pPr>
+            <a:lvl8pPr marL="3200400" algn="l" defTabSz="914400" rtl="0" eaLnBrk="1" latinLnBrk="0" hangingPunct="1">
+              <a:defRPr sz="1800" kern="1200">
+                <a:solidFill>
+                  <a:schemeClr val="tx1"/>
+                </a:solidFill>
+                <a:latin typeface="+mn-lt"/>
+                <a:ea typeface="+mn-ea"/>
+                <a:cs typeface="+mn-cs"/>
+              </a:defRPr>
+            </a:lvl8pPr>
+            <a:lvl9pPr marL="3657600" algn="l" defTabSz="914400" rtl="0" eaLnBrk="1" latinLnBrk="0" hangingPunct="1">
+              <a:defRPr sz="1800" kern="1200">
+                <a:solidFill>
+                  <a:schemeClr val="tx1"/>
+                </a:solidFill>
+                <a:latin typeface="+mn-lt"/>
+                <a:ea typeface="+mn-ea"/>
+                <a:cs typeface="+mn-cs"/>
+              </a:defRPr>
+            </a:lvl9pPr>
+          </a:lstStyle>
+          <a:p>
+            <a:fld id="{B716C8F4-20CD-364A-8A8E-DE130115B178}" type="slidenum">
+              <a:rPr lang="sv-SE" smtClean="0">
+                <a:solidFill>
+                  <a:schemeClr val="bg1">
+                    <a:lumMod val="50000"/>
+                  </a:schemeClr>
+                </a:solidFill>
+              </a:rPr>
+              <a:pPr/>
+              <a:t>4</a:t>
+            </a:fld>
+            <a:endParaRPr lang="sv-SE" dirty="0">
+              <a:solidFill>
+                <a:schemeClr val="bg1">
+                  <a:lumMod val="50000"/>
+                </a:schemeClr>
+              </a:solidFill>
+            </a:endParaRPr>
+          </a:p>
+        </p:txBody>
+      </p:sp>
+    </p:spTree>
+    <p:extLst>
+      <p:ext uri="{BB962C8B-B14F-4D97-AF65-F5344CB8AC3E}">
+        <p14:creationId xmlns:p14="http://schemas.microsoft.com/office/powerpoint/2010/main" val="2906884876"/>
+      </p:ext>
+    </p:extLst>
+  </p:cSld>
+  <p:clrMapOvr>
+    <a:masterClrMapping/>
+  </p:clrMapOvr>
+</p:sld>
+</file>
+
+<file path=ppt/slides/slide5.xml><?xml version="1.0" encoding="utf-8"?>
+<p:sld xmlns:a="http://schemas.openxmlformats.org/drawingml/2006/main" xmlns:r="http://schemas.openxmlformats.org/officeDocument/2006/relationships" xmlns:p="http://schemas.openxmlformats.org/presentationml/2006/main">
+  <p:cSld>
+    <p:spTree>
+      <p:nvGrpSpPr>
+        <p:cNvPr id="1" name=""/>
+        <p:cNvGrpSpPr/>
+        <p:nvPr/>
+      </p:nvGrpSpPr>
+      <p:grpSpPr>
+        <a:xfrm>
+          <a:off x="0" y="0"/>
+          <a:ext cx="0" cy="0"/>
+          <a:chOff x="0" y="0"/>
+          <a:chExt cx="0" cy="0"/>
+        </a:xfrm>
+      </p:grpSpPr>
+      <p:sp>
+        <p:nvSpPr>
+          <p:cNvPr id="2" name="Titel 1">
+            <a:extLst>
+              <a:ext uri="{FF2B5EF4-FFF2-40B4-BE49-F238E27FC236}">
+                <a16:creationId xmlns:a16="http://schemas.microsoft.com/office/drawing/2014/main" id="{D9FF4866-62A1-0E64-85B3-67642B7ADD5A}"/>
+              </a:ext>
+            </a:extLst>
+          </p:cNvPr>
+          <p:cNvSpPr>
+            <a:spLocks noGrp="1"/>
+          </p:cNvSpPr>
+          <p:nvPr>
+            <p:ph type="title"/>
+          </p:nvPr>
+        </p:nvSpPr>
+        <p:spPr/>
+        <p:txBody>
+          <a:bodyPr/>
+          <a:lstStyle/>
+          <a:p>
+            <a:r>
+              <a:rPr lang="en-US" dirty="0"/>
+              <a:t>Imbalanced Classes</a:t>
+            </a:r>
+          </a:p>
+        </p:txBody>
+      </p:sp>
+      <p:sp>
+        <p:nvSpPr>
+          <p:cNvPr id="3" name="Inhaltsplatzhalter 2">
+            <a:extLst>
+              <a:ext uri="{FF2B5EF4-FFF2-40B4-BE49-F238E27FC236}">
+                <a16:creationId xmlns:a16="http://schemas.microsoft.com/office/drawing/2014/main" id="{40BFBBB2-E4C2-7FCE-868B-B0704779EC7D}"/>
+              </a:ext>
+            </a:extLst>
+          </p:cNvPr>
+          <p:cNvSpPr>
+            <a:spLocks noGrp="1"/>
+          </p:cNvSpPr>
+          <p:nvPr>
+            <p:ph idx="1"/>
+          </p:nvPr>
+        </p:nvSpPr>
+        <p:spPr/>
+        <p:txBody>
+          <a:bodyPr/>
+          <a:lstStyle/>
+          <a:p>
+            <a:r>
+              <a:rPr lang="en-US" sz="2400" b="1" dirty="0">
+                <a:solidFill>
+                  <a:srgbClr val="002060"/>
+                </a:solidFill>
+              </a:rPr>
+              <a:t>Handling Class Imbalance with Weights and Oversampling</a:t>
+            </a:r>
+          </a:p>
+          <a:p>
+            <a:pPr lvl="1"/>
+            <a:endParaRPr lang="en-US" dirty="0"/>
+          </a:p>
+        </p:txBody>
+      </p:sp>
+      <p:sp>
+        <p:nvSpPr>
+          <p:cNvPr id="7" name="Platshållare för datum 3">
+            <a:extLst>
+              <a:ext uri="{FF2B5EF4-FFF2-40B4-BE49-F238E27FC236}">
+                <a16:creationId xmlns:a16="http://schemas.microsoft.com/office/drawing/2014/main" id="{D87F0818-16E1-A83F-E124-90AB2731619A}"/>
+              </a:ext>
+            </a:extLst>
+          </p:cNvPr>
+          <p:cNvSpPr txBox="1">
+            <a:spLocks/>
+          </p:cNvSpPr>
+          <p:nvPr/>
+        </p:nvSpPr>
+        <p:spPr>
+          <a:xfrm>
+            <a:off x="600075" y="6473327"/>
+            <a:ext cx="1355725" cy="220121"/>
+          </a:xfrm>
+          <a:prstGeom prst="rect">
+            <a:avLst/>
+          </a:prstGeom>
+        </p:spPr>
+        <p:txBody>
+          <a:bodyPr vert="horz" lIns="91440" tIns="45720" rIns="91440" bIns="45720" rtlCol="0" anchor="ctr"/>
+          <a:lstStyle>
+            <a:defPPr>
+              <a:defRPr lang="sv-SE"/>
+            </a:defPPr>
+            <a:lvl1pPr marL="0" algn="l" defTabSz="914400" rtl="0" eaLnBrk="1" latinLnBrk="0" hangingPunct="1">
+              <a:defRPr sz="1200" kern="1200">
+                <a:solidFill>
+                  <a:schemeClr val="accent2"/>
+                </a:solidFill>
+                <a:latin typeface="+mn-lt"/>
+                <a:ea typeface="+mn-ea"/>
+                <a:cs typeface="+mn-cs"/>
+              </a:defRPr>
+            </a:lvl1pPr>
+            <a:lvl2pPr marL="457200" algn="l" defTabSz="914400" rtl="0" eaLnBrk="1" latinLnBrk="0" hangingPunct="1">
+              <a:defRPr sz="1800" kern="1200">
+                <a:solidFill>
+                  <a:schemeClr val="tx1"/>
+                </a:solidFill>
+                <a:latin typeface="+mn-lt"/>
+                <a:ea typeface="+mn-ea"/>
+                <a:cs typeface="+mn-cs"/>
+              </a:defRPr>
+            </a:lvl2pPr>
+            <a:lvl3pPr marL="914400" algn="l" defTabSz="914400" rtl="0" eaLnBrk="1" latinLnBrk="0" hangingPunct="1">
+              <a:defRPr sz="1800" kern="1200">
+                <a:solidFill>
+                  <a:schemeClr val="tx1"/>
+                </a:solidFill>
+                <a:latin typeface="+mn-lt"/>
+                <a:ea typeface="+mn-ea"/>
+                <a:cs typeface="+mn-cs"/>
+              </a:defRPr>
+            </a:lvl3pPr>
+            <a:lvl4pPr marL="1371600" algn="l" defTabSz="914400" rtl="0" eaLnBrk="1" latinLnBrk="0" hangingPunct="1">
+              <a:defRPr sz="1800" kern="1200">
+                <a:solidFill>
+                  <a:schemeClr val="tx1"/>
+                </a:solidFill>
+                <a:latin typeface="+mn-lt"/>
+                <a:ea typeface="+mn-ea"/>
+                <a:cs typeface="+mn-cs"/>
+              </a:defRPr>
+            </a:lvl4pPr>
+            <a:lvl5pPr marL="1828800" algn="l" defTabSz="914400" rtl="0" eaLnBrk="1" latinLnBrk="0" hangingPunct="1">
+              <a:defRPr sz="1800" kern="1200">
+                <a:solidFill>
+                  <a:schemeClr val="tx1"/>
+                </a:solidFill>
+                <a:latin typeface="+mn-lt"/>
+                <a:ea typeface="+mn-ea"/>
+                <a:cs typeface="+mn-cs"/>
+              </a:defRPr>
+            </a:lvl5pPr>
+            <a:lvl6pPr marL="2286000" algn="l" defTabSz="914400" rtl="0" eaLnBrk="1" latinLnBrk="0" hangingPunct="1">
+              <a:defRPr sz="1800" kern="1200">
+                <a:solidFill>
+                  <a:schemeClr val="tx1"/>
+                </a:solidFill>
+                <a:latin typeface="+mn-lt"/>
+                <a:ea typeface="+mn-ea"/>
+                <a:cs typeface="+mn-cs"/>
+              </a:defRPr>
+            </a:lvl6pPr>
+            <a:lvl7pPr marL="2743200" algn="l" defTabSz="914400" rtl="0" eaLnBrk="1" latinLnBrk="0" hangingPunct="1">
+              <a:defRPr sz="1800" kern="1200">
+                <a:solidFill>
+                  <a:schemeClr val="tx1"/>
+                </a:solidFill>
+                <a:latin typeface="+mn-lt"/>
+                <a:ea typeface="+mn-ea"/>
+                <a:cs typeface="+mn-cs"/>
+              </a:defRPr>
+            </a:lvl7pPr>
+            <a:lvl8pPr marL="3200400" algn="l" defTabSz="914400" rtl="0" eaLnBrk="1" latinLnBrk="0" hangingPunct="1">
+              <a:defRPr sz="1800" kern="1200">
+                <a:solidFill>
+                  <a:schemeClr val="tx1"/>
+                </a:solidFill>
+                <a:latin typeface="+mn-lt"/>
+                <a:ea typeface="+mn-ea"/>
+                <a:cs typeface="+mn-cs"/>
+              </a:defRPr>
+            </a:lvl8pPr>
+            <a:lvl9pPr marL="3657600" algn="l" defTabSz="914400" rtl="0" eaLnBrk="1" latinLnBrk="0" hangingPunct="1">
+              <a:defRPr sz="1800" kern="1200">
+                <a:solidFill>
+                  <a:schemeClr val="tx1"/>
+                </a:solidFill>
+                <a:latin typeface="+mn-lt"/>
+                <a:ea typeface="+mn-ea"/>
+                <a:cs typeface="+mn-cs"/>
+              </a:defRPr>
+            </a:lvl9pPr>
+          </a:lstStyle>
+          <a:p>
+            <a:fld id="{888E4D63-BE2C-4D4B-BBD2-256262659A9F}" type="datetime1">
+              <a:rPr lang="sv-SE" smtClean="0">
+                <a:solidFill>
+                  <a:schemeClr val="bg1">
+                    <a:lumMod val="50000"/>
+                  </a:schemeClr>
+                </a:solidFill>
+              </a:rPr>
+              <a:pPr/>
+              <a:t>2025-05-21</a:t>
+            </a:fld>
+            <a:endParaRPr lang="sv-SE" dirty="0">
+              <a:solidFill>
+                <a:schemeClr val="bg1">
+                  <a:lumMod val="50000"/>
+                </a:schemeClr>
+              </a:solidFill>
+            </a:endParaRPr>
+          </a:p>
+        </p:txBody>
+      </p:sp>
+      <p:sp>
+        <p:nvSpPr>
+          <p:cNvPr id="8" name="Platshållare för sidfot 4">
+            <a:extLst>
+              <a:ext uri="{FF2B5EF4-FFF2-40B4-BE49-F238E27FC236}">
+                <a16:creationId xmlns:a16="http://schemas.microsoft.com/office/drawing/2014/main" id="{F4304310-BB8A-7B70-7FE6-B0A260C829CD}"/>
+              </a:ext>
+            </a:extLst>
+          </p:cNvPr>
+          <p:cNvSpPr txBox="1">
+            <a:spLocks/>
+          </p:cNvSpPr>
+          <p:nvPr/>
+        </p:nvSpPr>
+        <p:spPr>
+          <a:xfrm>
+            <a:off x="1955800" y="6470364"/>
+            <a:ext cx="8280399" cy="220120"/>
+          </a:xfrm>
+          <a:prstGeom prst="rect">
+            <a:avLst/>
+          </a:prstGeom>
+        </p:spPr>
+        <p:txBody>
+          <a:bodyPr vert="horz" lIns="91440" tIns="45720" rIns="91440" bIns="45720" rtlCol="0" anchor="ctr"/>
+          <a:lstStyle>
+            <a:defPPr>
+              <a:defRPr lang="sv-SE"/>
+            </a:defPPr>
+            <a:lvl1pPr marL="0" algn="ctr" defTabSz="914400" rtl="0" eaLnBrk="1" latinLnBrk="0" hangingPunct="1">
+              <a:defRPr sz="1200" kern="1200">
+                <a:solidFill>
+                  <a:schemeClr val="accent2"/>
+                </a:solidFill>
+                <a:latin typeface="+mn-lt"/>
+                <a:ea typeface="+mn-ea"/>
+                <a:cs typeface="+mn-cs"/>
+              </a:defRPr>
+            </a:lvl1pPr>
+            <a:lvl2pPr marL="457200" algn="l" defTabSz="914400" rtl="0" eaLnBrk="1" latinLnBrk="0" hangingPunct="1">
+              <a:defRPr sz="1800" kern="1200">
+                <a:solidFill>
+                  <a:schemeClr val="tx1"/>
+                </a:solidFill>
+                <a:latin typeface="+mn-lt"/>
+                <a:ea typeface="+mn-ea"/>
+                <a:cs typeface="+mn-cs"/>
+              </a:defRPr>
+            </a:lvl2pPr>
+            <a:lvl3pPr marL="914400" algn="l" defTabSz="914400" rtl="0" eaLnBrk="1" latinLnBrk="0" hangingPunct="1">
+              <a:defRPr sz="1800" kern="1200">
+                <a:solidFill>
+                  <a:schemeClr val="tx1"/>
+                </a:solidFill>
+                <a:latin typeface="+mn-lt"/>
+                <a:ea typeface="+mn-ea"/>
+                <a:cs typeface="+mn-cs"/>
+              </a:defRPr>
+            </a:lvl3pPr>
+            <a:lvl4pPr marL="1371600" algn="l" defTabSz="914400" rtl="0" eaLnBrk="1" latinLnBrk="0" hangingPunct="1">
+              <a:defRPr sz="1800" kern="1200">
+                <a:solidFill>
+                  <a:schemeClr val="tx1"/>
+                </a:solidFill>
+                <a:latin typeface="+mn-lt"/>
+                <a:ea typeface="+mn-ea"/>
+                <a:cs typeface="+mn-cs"/>
+              </a:defRPr>
+            </a:lvl4pPr>
+            <a:lvl5pPr marL="1828800" algn="l" defTabSz="914400" rtl="0" eaLnBrk="1" latinLnBrk="0" hangingPunct="1">
+              <a:defRPr sz="1800" kern="1200">
+                <a:solidFill>
+                  <a:schemeClr val="tx1"/>
+                </a:solidFill>
+                <a:latin typeface="+mn-lt"/>
+                <a:ea typeface="+mn-ea"/>
+                <a:cs typeface="+mn-cs"/>
+              </a:defRPr>
+            </a:lvl5pPr>
+            <a:lvl6pPr marL="2286000" algn="l" defTabSz="914400" rtl="0" eaLnBrk="1" latinLnBrk="0" hangingPunct="1">
+              <a:defRPr sz="1800" kern="1200">
+                <a:solidFill>
+                  <a:schemeClr val="tx1"/>
+                </a:solidFill>
+                <a:latin typeface="+mn-lt"/>
+                <a:ea typeface="+mn-ea"/>
+                <a:cs typeface="+mn-cs"/>
+              </a:defRPr>
+            </a:lvl6pPr>
+            <a:lvl7pPr marL="2743200" algn="l" defTabSz="914400" rtl="0" eaLnBrk="1" latinLnBrk="0" hangingPunct="1">
+              <a:defRPr sz="1800" kern="1200">
+                <a:solidFill>
+                  <a:schemeClr val="tx1"/>
+                </a:solidFill>
+                <a:latin typeface="+mn-lt"/>
+                <a:ea typeface="+mn-ea"/>
+                <a:cs typeface="+mn-cs"/>
+              </a:defRPr>
+            </a:lvl7pPr>
+            <a:lvl8pPr marL="3200400" algn="l" defTabSz="914400" rtl="0" eaLnBrk="1" latinLnBrk="0" hangingPunct="1">
+              <a:defRPr sz="1800" kern="1200">
+                <a:solidFill>
+                  <a:schemeClr val="tx1"/>
+                </a:solidFill>
+                <a:latin typeface="+mn-lt"/>
+                <a:ea typeface="+mn-ea"/>
+                <a:cs typeface="+mn-cs"/>
+              </a:defRPr>
+            </a:lvl8pPr>
+            <a:lvl9pPr marL="3657600" algn="l" defTabSz="914400" rtl="0" eaLnBrk="1" latinLnBrk="0" hangingPunct="1">
+              <a:defRPr sz="1800" kern="1200">
+                <a:solidFill>
+                  <a:schemeClr val="tx1"/>
+                </a:solidFill>
+                <a:latin typeface="+mn-lt"/>
+                <a:ea typeface="+mn-ea"/>
+                <a:cs typeface="+mn-cs"/>
+              </a:defRPr>
+            </a:lvl9pPr>
+          </a:lstStyle>
+          <a:p>
+            <a:r>
+              <a:rPr lang="sv-SE">
+                <a:solidFill>
+                  <a:schemeClr val="bg1">
+                    <a:lumMod val="50000"/>
+                  </a:schemeClr>
+                </a:solidFill>
+              </a:rPr>
+              <a:t>DD2424 Project: Transfer Learning | Ksenia Biazruchanka, Tobias Haunreiter, Alexander Soukup, Johannes Jeup</a:t>
+            </a:r>
+            <a:endParaRPr lang="sv-SE" dirty="0">
+              <a:solidFill>
+                <a:schemeClr val="bg1">
+                  <a:lumMod val="50000"/>
+                </a:schemeClr>
+              </a:solidFill>
+            </a:endParaRPr>
+          </a:p>
+        </p:txBody>
+      </p:sp>
+      <p:sp>
+        <p:nvSpPr>
+          <p:cNvPr id="9" name="Platshållare för bildnummer 5">
+            <a:extLst>
+              <a:ext uri="{FF2B5EF4-FFF2-40B4-BE49-F238E27FC236}">
+                <a16:creationId xmlns:a16="http://schemas.microsoft.com/office/drawing/2014/main" id="{DA8CD499-30D8-7EED-2D55-A3FD4FB6364A}"/>
+              </a:ext>
+            </a:extLst>
+          </p:cNvPr>
+          <p:cNvSpPr txBox="1">
+            <a:spLocks/>
+          </p:cNvSpPr>
+          <p:nvPr/>
+        </p:nvSpPr>
+        <p:spPr>
+          <a:xfrm>
+            <a:off x="10236199" y="6473328"/>
+            <a:ext cx="1355726" cy="220120"/>
+          </a:xfrm>
+          <a:prstGeom prst="rect">
+            <a:avLst/>
+          </a:prstGeom>
+        </p:spPr>
+        <p:txBody>
+          <a:bodyPr vert="horz" lIns="91440" tIns="45720" rIns="91440" bIns="45720" rtlCol="0" anchor="ctr"/>
+          <a:lstStyle>
+            <a:defPPr>
+              <a:defRPr lang="sv-SE"/>
+            </a:defPPr>
+            <a:lvl1pPr marL="0" algn="r" defTabSz="914400" rtl="0" eaLnBrk="1" latinLnBrk="0" hangingPunct="1">
+              <a:defRPr sz="1200" kern="1200">
+                <a:solidFill>
+                  <a:schemeClr val="accent2"/>
+                </a:solidFill>
+                <a:latin typeface="+mn-lt"/>
+                <a:ea typeface="+mn-ea"/>
+                <a:cs typeface="+mn-cs"/>
+              </a:defRPr>
+            </a:lvl1pPr>
+            <a:lvl2pPr marL="457200" algn="l" defTabSz="914400" rtl="0" eaLnBrk="1" latinLnBrk="0" hangingPunct="1">
+              <a:defRPr sz="1800" kern="1200">
+                <a:solidFill>
+                  <a:schemeClr val="tx1"/>
+                </a:solidFill>
+                <a:latin typeface="+mn-lt"/>
+                <a:ea typeface="+mn-ea"/>
+                <a:cs typeface="+mn-cs"/>
+              </a:defRPr>
+            </a:lvl2pPr>
+            <a:lvl3pPr marL="914400" algn="l" defTabSz="914400" rtl="0" eaLnBrk="1" latinLnBrk="0" hangingPunct="1">
+              <a:defRPr sz="1800" kern="1200">
+                <a:solidFill>
+                  <a:schemeClr val="tx1"/>
+                </a:solidFill>
+                <a:latin typeface="+mn-lt"/>
+                <a:ea typeface="+mn-ea"/>
+                <a:cs typeface="+mn-cs"/>
+              </a:defRPr>
+            </a:lvl3pPr>
+            <a:lvl4pPr marL="1371600" algn="l" defTabSz="914400" rtl="0" eaLnBrk="1" latinLnBrk="0" hangingPunct="1">
+              <a:defRPr sz="1800" kern="1200">
+                <a:solidFill>
+                  <a:schemeClr val="tx1"/>
+                </a:solidFill>
+                <a:latin typeface="+mn-lt"/>
+                <a:ea typeface="+mn-ea"/>
+                <a:cs typeface="+mn-cs"/>
+              </a:defRPr>
+            </a:lvl4pPr>
+            <a:lvl5pPr marL="1828800" algn="l" defTabSz="914400" rtl="0" eaLnBrk="1" latinLnBrk="0" hangingPunct="1">
+              <a:defRPr sz="1800" kern="1200">
+                <a:solidFill>
+                  <a:schemeClr val="tx1"/>
+                </a:solidFill>
+                <a:latin typeface="+mn-lt"/>
+                <a:ea typeface="+mn-ea"/>
+                <a:cs typeface="+mn-cs"/>
+              </a:defRPr>
+            </a:lvl5pPr>
+            <a:lvl6pPr marL="2286000" algn="l" defTabSz="914400" rtl="0" eaLnBrk="1" latinLnBrk="0" hangingPunct="1">
+              <a:defRPr sz="1800" kern="1200">
+                <a:solidFill>
+                  <a:schemeClr val="tx1"/>
+                </a:solidFill>
+                <a:latin typeface="+mn-lt"/>
+                <a:ea typeface="+mn-ea"/>
+                <a:cs typeface="+mn-cs"/>
+              </a:defRPr>
+            </a:lvl6pPr>
+            <a:lvl7pPr marL="2743200" algn="l" defTabSz="914400" rtl="0" eaLnBrk="1" latinLnBrk="0" hangingPunct="1">
+              <a:defRPr sz="1800" kern="1200">
+                <a:solidFill>
+                  <a:schemeClr val="tx1"/>
+                </a:solidFill>
+                <a:latin typeface="+mn-lt"/>
+                <a:ea typeface="+mn-ea"/>
+                <a:cs typeface="+mn-cs"/>
+              </a:defRPr>
+            </a:lvl7pPr>
+            <a:lvl8pPr marL="3200400" algn="l" defTabSz="914400" rtl="0" eaLnBrk="1" latinLnBrk="0" hangingPunct="1">
+              <a:defRPr sz="1800" kern="1200">
+                <a:solidFill>
+                  <a:schemeClr val="tx1"/>
+                </a:solidFill>
+                <a:latin typeface="+mn-lt"/>
+                <a:ea typeface="+mn-ea"/>
+                <a:cs typeface="+mn-cs"/>
+              </a:defRPr>
+            </a:lvl8pPr>
+            <a:lvl9pPr marL="3657600" algn="l" defTabSz="914400" rtl="0" eaLnBrk="1" latinLnBrk="0" hangingPunct="1">
+              <a:defRPr sz="1800" kern="1200">
+                <a:solidFill>
+                  <a:schemeClr val="tx1"/>
+                </a:solidFill>
+                <a:latin typeface="+mn-lt"/>
+                <a:ea typeface="+mn-ea"/>
+                <a:cs typeface="+mn-cs"/>
+              </a:defRPr>
+            </a:lvl9pPr>
+          </a:lstStyle>
+          <a:p>
+            <a:fld id="{B716C8F4-20CD-364A-8A8E-DE130115B178}" type="slidenum">
+              <a:rPr lang="sv-SE" smtClean="0">
+                <a:solidFill>
+                  <a:schemeClr val="bg1">
+                    <a:lumMod val="50000"/>
+                  </a:schemeClr>
+                </a:solidFill>
+              </a:rPr>
+              <a:pPr/>
+              <a:t>5</a:t>
+            </a:fld>
+            <a:endParaRPr lang="sv-SE" dirty="0">
+              <a:solidFill>
+                <a:schemeClr val="bg1">
+                  <a:lumMod val="50000"/>
+                </a:schemeClr>
+              </a:solidFill>
+            </a:endParaRPr>
+          </a:p>
+        </p:txBody>
+      </p:sp>
+    </p:spTree>
+    <p:extLst>
+      <p:ext uri="{BB962C8B-B14F-4D97-AF65-F5344CB8AC3E}">
+        <p14:creationId xmlns:p14="http://schemas.microsoft.com/office/powerpoint/2010/main" val="2157156751"/>
+      </p:ext>
+    </p:extLst>
+  </p:cSld>
+  <p:clrMapOvr>
+    <a:masterClrMapping/>
+  </p:clrMapOvr>
+</p:sld>
+</file>
+
+<file path=ppt/slides/slide6.xml><?xml version="1.0" encoding="utf-8"?>
+<p:sld xmlns:a="http://schemas.openxmlformats.org/drawingml/2006/main" xmlns:r="http://schemas.openxmlformats.org/officeDocument/2006/relationships" xmlns:p="http://schemas.openxmlformats.org/presentationml/2006/main">
+  <p:cSld>
+    <p:spTree>
+      <p:nvGrpSpPr>
+        <p:cNvPr id="1" name=""/>
+        <p:cNvGrpSpPr/>
+        <p:nvPr/>
+      </p:nvGrpSpPr>
+      <p:grpSpPr>
+        <a:xfrm>
+          <a:off x="0" y="0"/>
+          <a:ext cx="0" cy="0"/>
+          <a:chOff x="0" y="0"/>
+          <a:chExt cx="0" cy="0"/>
+        </a:xfrm>
+      </p:grpSpPr>
+      <p:sp>
+        <p:nvSpPr>
+          <p:cNvPr id="2" name="Titel 1">
+            <a:extLst>
+              <a:ext uri="{FF2B5EF4-FFF2-40B4-BE49-F238E27FC236}">
+                <a16:creationId xmlns:a16="http://schemas.microsoft.com/office/drawing/2014/main" id="{732E711C-BA83-5858-2A07-105FA2DE3416}"/>
+              </a:ext>
+            </a:extLst>
+          </p:cNvPr>
+          <p:cNvSpPr>
+            <a:spLocks noGrp="1"/>
+          </p:cNvSpPr>
+          <p:nvPr>
+            <p:ph type="title"/>
+          </p:nvPr>
+        </p:nvSpPr>
+        <p:spPr/>
+        <p:txBody>
+          <a:bodyPr/>
+          <a:lstStyle/>
+          <a:p>
+            <a:r>
+              <a:rPr lang="en-US" dirty="0"/>
+              <a:t>FixMatch (SSL)</a:t>
+            </a:r>
+          </a:p>
+        </p:txBody>
+      </p:sp>
+      <p:sp>
+        <p:nvSpPr>
+          <p:cNvPr id="3" name="Inhaltsplatzhalter 2">
+            <a:extLst>
+              <a:ext uri="{FF2B5EF4-FFF2-40B4-BE49-F238E27FC236}">
+                <a16:creationId xmlns:a16="http://schemas.microsoft.com/office/drawing/2014/main" id="{47C59EA8-DD3E-D62F-97C1-1B8CDC51852D}"/>
+              </a:ext>
+            </a:extLst>
+          </p:cNvPr>
+          <p:cNvSpPr>
+            <a:spLocks noGrp="1"/>
+          </p:cNvSpPr>
+          <p:nvPr>
+            <p:ph idx="1"/>
+          </p:nvPr>
+        </p:nvSpPr>
+        <p:spPr/>
+        <p:txBody>
+          <a:bodyPr/>
+          <a:lstStyle/>
+          <a:p>
+            <a:r>
+              <a:rPr lang="en-US" sz="2400" b="1" dirty="0">
+                <a:solidFill>
+                  <a:srgbClr val="002060"/>
+                </a:solidFill>
+              </a:rPr>
+              <a:t>Semi-Supervised Learning with Strong/Weak Augmentations</a:t>
+            </a:r>
+          </a:p>
+          <a:p>
+            <a:pPr lvl="1"/>
+            <a:endParaRPr lang="en-US" dirty="0"/>
+          </a:p>
+        </p:txBody>
+      </p:sp>
+      <p:sp>
+        <p:nvSpPr>
+          <p:cNvPr id="7" name="Platshållare för datum 3">
+            <a:extLst>
+              <a:ext uri="{FF2B5EF4-FFF2-40B4-BE49-F238E27FC236}">
+                <a16:creationId xmlns:a16="http://schemas.microsoft.com/office/drawing/2014/main" id="{20E453B1-1C87-268F-D3D8-14446D2F3608}"/>
+              </a:ext>
+            </a:extLst>
+          </p:cNvPr>
+          <p:cNvSpPr txBox="1">
+            <a:spLocks/>
+          </p:cNvSpPr>
+          <p:nvPr/>
+        </p:nvSpPr>
+        <p:spPr>
+          <a:xfrm>
+            <a:off x="600075" y="6473327"/>
+            <a:ext cx="1355725" cy="220121"/>
+          </a:xfrm>
+          <a:prstGeom prst="rect">
+            <a:avLst/>
+          </a:prstGeom>
+        </p:spPr>
+        <p:txBody>
+          <a:bodyPr vert="horz" lIns="91440" tIns="45720" rIns="91440" bIns="45720" rtlCol="0" anchor="ctr"/>
+          <a:lstStyle>
+            <a:defPPr>
+              <a:defRPr lang="sv-SE"/>
+            </a:defPPr>
+            <a:lvl1pPr marL="0" algn="l" defTabSz="914400" rtl="0" eaLnBrk="1" latinLnBrk="0" hangingPunct="1">
+              <a:defRPr sz="1200" kern="1200">
+                <a:solidFill>
+                  <a:schemeClr val="accent2"/>
+                </a:solidFill>
+                <a:latin typeface="+mn-lt"/>
+                <a:ea typeface="+mn-ea"/>
+                <a:cs typeface="+mn-cs"/>
+              </a:defRPr>
+            </a:lvl1pPr>
+            <a:lvl2pPr marL="457200" algn="l" defTabSz="914400" rtl="0" eaLnBrk="1" latinLnBrk="0" hangingPunct="1">
+              <a:defRPr sz="1800" kern="1200">
+                <a:solidFill>
+                  <a:schemeClr val="tx1"/>
+                </a:solidFill>
+                <a:latin typeface="+mn-lt"/>
+                <a:ea typeface="+mn-ea"/>
+                <a:cs typeface="+mn-cs"/>
+              </a:defRPr>
+            </a:lvl2pPr>
+            <a:lvl3pPr marL="914400" algn="l" defTabSz="914400" rtl="0" eaLnBrk="1" latinLnBrk="0" hangingPunct="1">
+              <a:defRPr sz="1800" kern="1200">
+                <a:solidFill>
+                  <a:schemeClr val="tx1"/>
+                </a:solidFill>
+                <a:latin typeface="+mn-lt"/>
+                <a:ea typeface="+mn-ea"/>
+                <a:cs typeface="+mn-cs"/>
+              </a:defRPr>
+            </a:lvl3pPr>
+            <a:lvl4pPr marL="1371600" algn="l" defTabSz="914400" rtl="0" eaLnBrk="1" latinLnBrk="0" hangingPunct="1">
+              <a:defRPr sz="1800" kern="1200">
+                <a:solidFill>
+                  <a:schemeClr val="tx1"/>
+                </a:solidFill>
+                <a:latin typeface="+mn-lt"/>
+                <a:ea typeface="+mn-ea"/>
+                <a:cs typeface="+mn-cs"/>
+              </a:defRPr>
+            </a:lvl4pPr>
+            <a:lvl5pPr marL="1828800" algn="l" defTabSz="914400" rtl="0" eaLnBrk="1" latinLnBrk="0" hangingPunct="1">
+              <a:defRPr sz="1800" kern="1200">
+                <a:solidFill>
+                  <a:schemeClr val="tx1"/>
+                </a:solidFill>
+                <a:latin typeface="+mn-lt"/>
+                <a:ea typeface="+mn-ea"/>
+                <a:cs typeface="+mn-cs"/>
+              </a:defRPr>
+            </a:lvl5pPr>
+            <a:lvl6pPr marL="2286000" algn="l" defTabSz="914400" rtl="0" eaLnBrk="1" latinLnBrk="0" hangingPunct="1">
+              <a:defRPr sz="1800" kern="1200">
+                <a:solidFill>
+                  <a:schemeClr val="tx1"/>
+                </a:solidFill>
+                <a:latin typeface="+mn-lt"/>
+                <a:ea typeface="+mn-ea"/>
+                <a:cs typeface="+mn-cs"/>
+              </a:defRPr>
+            </a:lvl6pPr>
+            <a:lvl7pPr marL="2743200" algn="l" defTabSz="914400" rtl="0" eaLnBrk="1" latinLnBrk="0" hangingPunct="1">
+              <a:defRPr sz="1800" kern="1200">
+                <a:solidFill>
+                  <a:schemeClr val="tx1"/>
+                </a:solidFill>
+                <a:latin typeface="+mn-lt"/>
+                <a:ea typeface="+mn-ea"/>
+                <a:cs typeface="+mn-cs"/>
+              </a:defRPr>
+            </a:lvl7pPr>
+            <a:lvl8pPr marL="3200400" algn="l" defTabSz="914400" rtl="0" eaLnBrk="1" latinLnBrk="0" hangingPunct="1">
+              <a:defRPr sz="1800" kern="1200">
+                <a:solidFill>
+                  <a:schemeClr val="tx1"/>
+                </a:solidFill>
+                <a:latin typeface="+mn-lt"/>
+                <a:ea typeface="+mn-ea"/>
+                <a:cs typeface="+mn-cs"/>
+              </a:defRPr>
+            </a:lvl8pPr>
+            <a:lvl9pPr marL="3657600" algn="l" defTabSz="914400" rtl="0" eaLnBrk="1" latinLnBrk="0" hangingPunct="1">
+              <a:defRPr sz="1800" kern="1200">
+                <a:solidFill>
+                  <a:schemeClr val="tx1"/>
+                </a:solidFill>
+                <a:latin typeface="+mn-lt"/>
+                <a:ea typeface="+mn-ea"/>
+                <a:cs typeface="+mn-cs"/>
+              </a:defRPr>
+            </a:lvl9pPr>
+          </a:lstStyle>
+          <a:p>
+            <a:fld id="{888E4D63-BE2C-4D4B-BBD2-256262659A9F}" type="datetime1">
+              <a:rPr lang="sv-SE" smtClean="0">
+                <a:solidFill>
+                  <a:schemeClr val="bg1">
+                    <a:lumMod val="50000"/>
+                  </a:schemeClr>
+                </a:solidFill>
+              </a:rPr>
+              <a:pPr/>
+              <a:t>2025-05-21</a:t>
+            </a:fld>
+            <a:endParaRPr lang="sv-SE" dirty="0">
+              <a:solidFill>
+                <a:schemeClr val="bg1">
+                  <a:lumMod val="50000"/>
+                </a:schemeClr>
+              </a:solidFill>
+            </a:endParaRPr>
+          </a:p>
+        </p:txBody>
+      </p:sp>
+      <p:sp>
+        <p:nvSpPr>
+          <p:cNvPr id="8" name="Platshållare för sidfot 4">
+            <a:extLst>
+              <a:ext uri="{FF2B5EF4-FFF2-40B4-BE49-F238E27FC236}">
+                <a16:creationId xmlns:a16="http://schemas.microsoft.com/office/drawing/2014/main" id="{73D44270-B7D2-12C6-55A0-5B934E038EBF}"/>
+              </a:ext>
+            </a:extLst>
+          </p:cNvPr>
+          <p:cNvSpPr txBox="1">
+            <a:spLocks/>
+          </p:cNvSpPr>
+          <p:nvPr/>
+        </p:nvSpPr>
+        <p:spPr>
+          <a:xfrm>
+            <a:off x="1955800" y="6470364"/>
+            <a:ext cx="8280399" cy="220120"/>
+          </a:xfrm>
+          <a:prstGeom prst="rect">
+            <a:avLst/>
+          </a:prstGeom>
+        </p:spPr>
+        <p:txBody>
+          <a:bodyPr vert="horz" lIns="91440" tIns="45720" rIns="91440" bIns="45720" rtlCol="0" anchor="ctr"/>
+          <a:lstStyle>
+            <a:defPPr>
+              <a:defRPr lang="sv-SE"/>
+            </a:defPPr>
+            <a:lvl1pPr marL="0" algn="ctr" defTabSz="914400" rtl="0" eaLnBrk="1" latinLnBrk="0" hangingPunct="1">
+              <a:defRPr sz="1200" kern="1200">
+                <a:solidFill>
+                  <a:schemeClr val="accent2"/>
+                </a:solidFill>
+                <a:latin typeface="+mn-lt"/>
+                <a:ea typeface="+mn-ea"/>
+                <a:cs typeface="+mn-cs"/>
+              </a:defRPr>
+            </a:lvl1pPr>
+            <a:lvl2pPr marL="457200" algn="l" defTabSz="914400" rtl="0" eaLnBrk="1" latinLnBrk="0" hangingPunct="1">
+              <a:defRPr sz="1800" kern="1200">
+                <a:solidFill>
+                  <a:schemeClr val="tx1"/>
+                </a:solidFill>
+                <a:latin typeface="+mn-lt"/>
+                <a:ea typeface="+mn-ea"/>
+                <a:cs typeface="+mn-cs"/>
+              </a:defRPr>
+            </a:lvl2pPr>
+            <a:lvl3pPr marL="914400" algn="l" defTabSz="914400" rtl="0" eaLnBrk="1" latinLnBrk="0" hangingPunct="1">
+              <a:defRPr sz="1800" kern="1200">
+                <a:solidFill>
+                  <a:schemeClr val="tx1"/>
+                </a:solidFill>
+                <a:latin typeface="+mn-lt"/>
+                <a:ea typeface="+mn-ea"/>
+                <a:cs typeface="+mn-cs"/>
+              </a:defRPr>
+            </a:lvl3pPr>
+            <a:lvl4pPr marL="1371600" algn="l" defTabSz="914400" rtl="0" eaLnBrk="1" latinLnBrk="0" hangingPunct="1">
+              <a:defRPr sz="1800" kern="1200">
+                <a:solidFill>
+                  <a:schemeClr val="tx1"/>
+                </a:solidFill>
+                <a:latin typeface="+mn-lt"/>
+                <a:ea typeface="+mn-ea"/>
+                <a:cs typeface="+mn-cs"/>
+              </a:defRPr>
+            </a:lvl4pPr>
+            <a:lvl5pPr marL="1828800" algn="l" defTabSz="914400" rtl="0" eaLnBrk="1" latinLnBrk="0" hangingPunct="1">
+              <a:defRPr sz="1800" kern="1200">
+                <a:solidFill>
+                  <a:schemeClr val="tx1"/>
+                </a:solidFill>
+                <a:latin typeface="+mn-lt"/>
+                <a:ea typeface="+mn-ea"/>
+                <a:cs typeface="+mn-cs"/>
+              </a:defRPr>
+            </a:lvl5pPr>
+            <a:lvl6pPr marL="2286000" algn="l" defTabSz="914400" rtl="0" eaLnBrk="1" latinLnBrk="0" hangingPunct="1">
+              <a:defRPr sz="1800" kern="1200">
+                <a:solidFill>
+                  <a:schemeClr val="tx1"/>
+                </a:solidFill>
+                <a:latin typeface="+mn-lt"/>
+                <a:ea typeface="+mn-ea"/>
+                <a:cs typeface="+mn-cs"/>
+              </a:defRPr>
+            </a:lvl6pPr>
+            <a:lvl7pPr marL="2743200" algn="l" defTabSz="914400" rtl="0" eaLnBrk="1" latinLnBrk="0" hangingPunct="1">
+              <a:defRPr sz="1800" kern="1200">
+                <a:solidFill>
+                  <a:schemeClr val="tx1"/>
+                </a:solidFill>
+                <a:latin typeface="+mn-lt"/>
+                <a:ea typeface="+mn-ea"/>
+                <a:cs typeface="+mn-cs"/>
+              </a:defRPr>
+            </a:lvl7pPr>
+            <a:lvl8pPr marL="3200400" algn="l" defTabSz="914400" rtl="0" eaLnBrk="1" latinLnBrk="0" hangingPunct="1">
+              <a:defRPr sz="1800" kern="1200">
+                <a:solidFill>
+                  <a:schemeClr val="tx1"/>
+                </a:solidFill>
+                <a:latin typeface="+mn-lt"/>
+                <a:ea typeface="+mn-ea"/>
+                <a:cs typeface="+mn-cs"/>
+              </a:defRPr>
+            </a:lvl8pPr>
+            <a:lvl9pPr marL="3657600" algn="l" defTabSz="914400" rtl="0" eaLnBrk="1" latinLnBrk="0" hangingPunct="1">
+              <a:defRPr sz="1800" kern="1200">
+                <a:solidFill>
+                  <a:schemeClr val="tx1"/>
+                </a:solidFill>
+                <a:latin typeface="+mn-lt"/>
+                <a:ea typeface="+mn-ea"/>
+                <a:cs typeface="+mn-cs"/>
+              </a:defRPr>
+            </a:lvl9pPr>
+          </a:lstStyle>
+          <a:p>
+            <a:r>
+              <a:rPr lang="sv-SE">
+                <a:solidFill>
+                  <a:schemeClr val="bg1">
+                    <a:lumMod val="50000"/>
+                  </a:schemeClr>
+                </a:solidFill>
+              </a:rPr>
+              <a:t>DD2424 Project: Transfer Learning | Ksenia Biazruchanka, Tobias Haunreiter, Alexander Soukup, Johannes Jeup</a:t>
+            </a:r>
+            <a:endParaRPr lang="sv-SE" dirty="0">
+              <a:solidFill>
+                <a:schemeClr val="bg1">
+                  <a:lumMod val="50000"/>
+                </a:schemeClr>
+              </a:solidFill>
+            </a:endParaRPr>
+          </a:p>
+        </p:txBody>
+      </p:sp>
+      <p:sp>
+        <p:nvSpPr>
+          <p:cNvPr id="9" name="Platshållare för bildnummer 5">
+            <a:extLst>
+              <a:ext uri="{FF2B5EF4-FFF2-40B4-BE49-F238E27FC236}">
+                <a16:creationId xmlns:a16="http://schemas.microsoft.com/office/drawing/2014/main" id="{AFD13401-EE95-5ACE-7DED-8E9EF013544E}"/>
+              </a:ext>
+            </a:extLst>
+          </p:cNvPr>
+          <p:cNvSpPr txBox="1">
+            <a:spLocks/>
+          </p:cNvSpPr>
+          <p:nvPr/>
+        </p:nvSpPr>
+        <p:spPr>
+          <a:xfrm>
+            <a:off x="10236199" y="6473328"/>
+            <a:ext cx="1355726" cy="220120"/>
+          </a:xfrm>
+          <a:prstGeom prst="rect">
+            <a:avLst/>
+          </a:prstGeom>
+        </p:spPr>
+        <p:txBody>
+          <a:bodyPr vert="horz" lIns="91440" tIns="45720" rIns="91440" bIns="45720" rtlCol="0" anchor="ctr"/>
+          <a:lstStyle>
+            <a:defPPr>
+              <a:defRPr lang="sv-SE"/>
+            </a:defPPr>
+            <a:lvl1pPr marL="0" algn="r" defTabSz="914400" rtl="0" eaLnBrk="1" latinLnBrk="0" hangingPunct="1">
+              <a:defRPr sz="1200" kern="1200">
+                <a:solidFill>
+                  <a:schemeClr val="accent2"/>
+                </a:solidFill>
+                <a:latin typeface="+mn-lt"/>
+                <a:ea typeface="+mn-ea"/>
+                <a:cs typeface="+mn-cs"/>
+              </a:defRPr>
+            </a:lvl1pPr>
+            <a:lvl2pPr marL="457200" algn="l" defTabSz="914400" rtl="0" eaLnBrk="1" latinLnBrk="0" hangingPunct="1">
+              <a:defRPr sz="1800" kern="1200">
+                <a:solidFill>
+                  <a:schemeClr val="tx1"/>
+                </a:solidFill>
+                <a:latin typeface="+mn-lt"/>
+                <a:ea typeface="+mn-ea"/>
+                <a:cs typeface="+mn-cs"/>
+              </a:defRPr>
+            </a:lvl2pPr>
+            <a:lvl3pPr marL="914400" algn="l" defTabSz="914400" rtl="0" eaLnBrk="1" latinLnBrk="0" hangingPunct="1">
+              <a:defRPr sz="1800" kern="1200">
+                <a:solidFill>
+                  <a:schemeClr val="tx1"/>
+                </a:solidFill>
+                <a:latin typeface="+mn-lt"/>
+                <a:ea typeface="+mn-ea"/>
+                <a:cs typeface="+mn-cs"/>
+              </a:defRPr>
+            </a:lvl3pPr>
+            <a:lvl4pPr marL="1371600" algn="l" defTabSz="914400" rtl="0" eaLnBrk="1" latinLnBrk="0" hangingPunct="1">
+              <a:defRPr sz="1800" kern="1200">
+                <a:solidFill>
+                  <a:schemeClr val="tx1"/>
+                </a:solidFill>
+                <a:latin typeface="+mn-lt"/>
+                <a:ea typeface="+mn-ea"/>
+                <a:cs typeface="+mn-cs"/>
+              </a:defRPr>
+            </a:lvl4pPr>
+            <a:lvl5pPr marL="1828800" algn="l" defTabSz="914400" rtl="0" eaLnBrk="1" latinLnBrk="0" hangingPunct="1">
+              <a:defRPr sz="1800" kern="1200">
+                <a:solidFill>
+                  <a:schemeClr val="tx1"/>
+                </a:solidFill>
+                <a:latin typeface="+mn-lt"/>
+                <a:ea typeface="+mn-ea"/>
+                <a:cs typeface="+mn-cs"/>
+              </a:defRPr>
+            </a:lvl5pPr>
+            <a:lvl6pPr marL="2286000" algn="l" defTabSz="914400" rtl="0" eaLnBrk="1" latinLnBrk="0" hangingPunct="1">
+              <a:defRPr sz="1800" kern="1200">
+                <a:solidFill>
+                  <a:schemeClr val="tx1"/>
+                </a:solidFill>
+                <a:latin typeface="+mn-lt"/>
+                <a:ea typeface="+mn-ea"/>
+                <a:cs typeface="+mn-cs"/>
+              </a:defRPr>
+            </a:lvl6pPr>
+            <a:lvl7pPr marL="2743200" algn="l" defTabSz="914400" rtl="0" eaLnBrk="1" latinLnBrk="0" hangingPunct="1">
+              <a:defRPr sz="1800" kern="1200">
+                <a:solidFill>
+                  <a:schemeClr val="tx1"/>
+                </a:solidFill>
+                <a:latin typeface="+mn-lt"/>
+                <a:ea typeface="+mn-ea"/>
+                <a:cs typeface="+mn-cs"/>
+              </a:defRPr>
+            </a:lvl7pPr>
+            <a:lvl8pPr marL="3200400" algn="l" defTabSz="914400" rtl="0" eaLnBrk="1" latinLnBrk="0" hangingPunct="1">
+              <a:defRPr sz="1800" kern="1200">
+                <a:solidFill>
+                  <a:schemeClr val="tx1"/>
+                </a:solidFill>
+                <a:latin typeface="+mn-lt"/>
+                <a:ea typeface="+mn-ea"/>
+                <a:cs typeface="+mn-cs"/>
+              </a:defRPr>
+            </a:lvl8pPr>
+            <a:lvl9pPr marL="3657600" algn="l" defTabSz="914400" rtl="0" eaLnBrk="1" latinLnBrk="0" hangingPunct="1">
+              <a:defRPr sz="1800" kern="1200">
+                <a:solidFill>
+                  <a:schemeClr val="tx1"/>
+                </a:solidFill>
+                <a:latin typeface="+mn-lt"/>
+                <a:ea typeface="+mn-ea"/>
+                <a:cs typeface="+mn-cs"/>
+              </a:defRPr>
+            </a:lvl9pPr>
+          </a:lstStyle>
+          <a:p>
+            <a:fld id="{B716C8F4-20CD-364A-8A8E-DE130115B178}" type="slidenum">
+              <a:rPr lang="sv-SE" smtClean="0">
+                <a:solidFill>
+                  <a:schemeClr val="bg1">
+                    <a:lumMod val="50000"/>
+                  </a:schemeClr>
+                </a:solidFill>
+              </a:rPr>
+              <a:pPr/>
+              <a:t>6</a:t>
+            </a:fld>
+            <a:endParaRPr lang="sv-SE" dirty="0">
+              <a:solidFill>
+                <a:schemeClr val="bg1">
+                  <a:lumMod val="50000"/>
+                </a:schemeClr>
+              </a:solidFill>
+            </a:endParaRPr>
+          </a:p>
+        </p:txBody>
+      </p:sp>
+    </p:spTree>
+    <p:extLst>
+      <p:ext uri="{BB962C8B-B14F-4D97-AF65-F5344CB8AC3E}">
+        <p14:creationId xmlns:p14="http://schemas.microsoft.com/office/powerpoint/2010/main" val="2236761859"/>
+      </p:ext>
+    </p:extLst>
+  </p:cSld>
+  <p:clrMapOvr>
+    <a:masterClrMapping/>
+  </p:clrMapOvr>
+</p:sld>
+</file>
+
+<file path=ppt/slides/slide7.xml><?xml version="1.0" encoding="utf-8"?>
+<p:sld xmlns:a="http://schemas.openxmlformats.org/drawingml/2006/main" xmlns:r="http://schemas.openxmlformats.org/officeDocument/2006/relationships" xmlns:p="http://schemas.openxmlformats.org/presentationml/2006/main">
+  <p:cSld>
+    <p:spTree>
+      <p:nvGrpSpPr>
+        <p:cNvPr id="1" name=""/>
+        <p:cNvGrpSpPr/>
+        <p:nvPr/>
+      </p:nvGrpSpPr>
+      <p:grpSpPr>
+        <a:xfrm>
+          <a:off x="0" y="0"/>
+          <a:ext cx="0" cy="0"/>
+          <a:chOff x="0" y="0"/>
+          <a:chExt cx="0" cy="0"/>
+        </a:xfrm>
+      </p:grpSpPr>
+      <p:sp>
+        <p:nvSpPr>
+          <p:cNvPr id="2" name="Titel 1">
+            <a:extLst>
+              <a:ext uri="{FF2B5EF4-FFF2-40B4-BE49-F238E27FC236}">
+                <a16:creationId xmlns:a16="http://schemas.microsoft.com/office/drawing/2014/main" id="{64225C8C-FDF9-4B5C-F532-1EE74FBE9408}"/>
+              </a:ext>
+            </a:extLst>
+          </p:cNvPr>
+          <p:cNvSpPr>
+            <a:spLocks noGrp="1"/>
+          </p:cNvSpPr>
+          <p:nvPr>
+            <p:ph type="title"/>
+          </p:nvPr>
+        </p:nvSpPr>
+        <p:spPr/>
+        <p:txBody>
+          <a:bodyPr/>
+          <a:lstStyle/>
+          <a:p>
+            <a:r>
+              <a:rPr lang="en-US" dirty="0"/>
+              <a:t>Results</a:t>
+            </a:r>
+          </a:p>
+        </p:txBody>
+      </p:sp>
+      <p:sp>
+        <p:nvSpPr>
+          <p:cNvPr id="3" name="Inhaltsplatzhalter 2">
+            <a:extLst>
+              <a:ext uri="{FF2B5EF4-FFF2-40B4-BE49-F238E27FC236}">
+                <a16:creationId xmlns:a16="http://schemas.microsoft.com/office/drawing/2014/main" id="{343D710B-EBCF-D90D-50B2-5B55E035EFC6}"/>
+              </a:ext>
+            </a:extLst>
+          </p:cNvPr>
+          <p:cNvSpPr>
+            <a:spLocks noGrp="1"/>
+          </p:cNvSpPr>
+          <p:nvPr>
+            <p:ph idx="1"/>
+          </p:nvPr>
+        </p:nvSpPr>
+        <p:spPr/>
+        <p:txBody>
+          <a:bodyPr/>
+          <a:lstStyle/>
+          <a:p>
+            <a:endParaRPr lang="en-US" dirty="0"/>
+          </a:p>
+        </p:txBody>
+      </p:sp>
+      <p:sp>
+        <p:nvSpPr>
+          <p:cNvPr id="7" name="Platshållare för datum 3">
+            <a:extLst>
+              <a:ext uri="{FF2B5EF4-FFF2-40B4-BE49-F238E27FC236}">
+                <a16:creationId xmlns:a16="http://schemas.microsoft.com/office/drawing/2014/main" id="{17AADBC4-8DF6-967A-029B-E85A20BAE864}"/>
+              </a:ext>
+            </a:extLst>
+          </p:cNvPr>
+          <p:cNvSpPr txBox="1">
+            <a:spLocks/>
+          </p:cNvSpPr>
+          <p:nvPr/>
+        </p:nvSpPr>
+        <p:spPr>
+          <a:xfrm>
+            <a:off x="600075" y="6473327"/>
+            <a:ext cx="1355725" cy="220121"/>
+          </a:xfrm>
+          <a:prstGeom prst="rect">
+            <a:avLst/>
+          </a:prstGeom>
+        </p:spPr>
+        <p:txBody>
+          <a:bodyPr vert="horz" lIns="91440" tIns="45720" rIns="91440" bIns="45720" rtlCol="0" anchor="ctr"/>
+          <a:lstStyle>
+            <a:defPPr>
+              <a:defRPr lang="sv-SE"/>
+            </a:defPPr>
+            <a:lvl1pPr marL="0" algn="l" defTabSz="914400" rtl="0" eaLnBrk="1" latinLnBrk="0" hangingPunct="1">
+              <a:defRPr sz="1200" kern="1200">
+                <a:solidFill>
+                  <a:schemeClr val="accent2"/>
+                </a:solidFill>
+                <a:latin typeface="+mn-lt"/>
+                <a:ea typeface="+mn-ea"/>
+                <a:cs typeface="+mn-cs"/>
+              </a:defRPr>
+            </a:lvl1pPr>
+            <a:lvl2pPr marL="457200" algn="l" defTabSz="914400" rtl="0" eaLnBrk="1" latinLnBrk="0" hangingPunct="1">
+              <a:defRPr sz="1800" kern="1200">
+                <a:solidFill>
+                  <a:schemeClr val="tx1"/>
+                </a:solidFill>
+                <a:latin typeface="+mn-lt"/>
+                <a:ea typeface="+mn-ea"/>
+                <a:cs typeface="+mn-cs"/>
+              </a:defRPr>
+            </a:lvl2pPr>
+            <a:lvl3pPr marL="914400" algn="l" defTabSz="914400" rtl="0" eaLnBrk="1" latinLnBrk="0" hangingPunct="1">
+              <a:defRPr sz="1800" kern="1200">
+                <a:solidFill>
+                  <a:schemeClr val="tx1"/>
+                </a:solidFill>
+                <a:latin typeface="+mn-lt"/>
+                <a:ea typeface="+mn-ea"/>
+                <a:cs typeface="+mn-cs"/>
+              </a:defRPr>
+            </a:lvl3pPr>
+            <a:lvl4pPr marL="1371600" algn="l" defTabSz="914400" rtl="0" eaLnBrk="1" latinLnBrk="0" hangingPunct="1">
+              <a:defRPr sz="1800" kern="1200">
+                <a:solidFill>
+                  <a:schemeClr val="tx1"/>
+                </a:solidFill>
+                <a:latin typeface="+mn-lt"/>
+                <a:ea typeface="+mn-ea"/>
+                <a:cs typeface="+mn-cs"/>
+              </a:defRPr>
+            </a:lvl4pPr>
+            <a:lvl5pPr marL="1828800" algn="l" defTabSz="914400" rtl="0" eaLnBrk="1" latinLnBrk="0" hangingPunct="1">
+              <a:defRPr sz="1800" kern="1200">
+                <a:solidFill>
+                  <a:schemeClr val="tx1"/>
+                </a:solidFill>
+                <a:latin typeface="+mn-lt"/>
+                <a:ea typeface="+mn-ea"/>
+                <a:cs typeface="+mn-cs"/>
+              </a:defRPr>
+            </a:lvl5pPr>
+            <a:lvl6pPr marL="2286000" algn="l" defTabSz="914400" rtl="0" eaLnBrk="1" latinLnBrk="0" hangingPunct="1">
+              <a:defRPr sz="1800" kern="1200">
+                <a:solidFill>
+                  <a:schemeClr val="tx1"/>
+                </a:solidFill>
+                <a:latin typeface="+mn-lt"/>
+                <a:ea typeface="+mn-ea"/>
+                <a:cs typeface="+mn-cs"/>
+              </a:defRPr>
+            </a:lvl6pPr>
+            <a:lvl7pPr marL="2743200" algn="l" defTabSz="914400" rtl="0" eaLnBrk="1" latinLnBrk="0" hangingPunct="1">
+              <a:defRPr sz="1800" kern="1200">
+                <a:solidFill>
+                  <a:schemeClr val="tx1"/>
+                </a:solidFill>
+                <a:latin typeface="+mn-lt"/>
+                <a:ea typeface="+mn-ea"/>
+                <a:cs typeface="+mn-cs"/>
+              </a:defRPr>
+            </a:lvl7pPr>
+            <a:lvl8pPr marL="3200400" algn="l" defTabSz="914400" rtl="0" eaLnBrk="1" latinLnBrk="0" hangingPunct="1">
+              <a:defRPr sz="1800" kern="1200">
+                <a:solidFill>
+                  <a:schemeClr val="tx1"/>
+                </a:solidFill>
+                <a:latin typeface="+mn-lt"/>
+                <a:ea typeface="+mn-ea"/>
+                <a:cs typeface="+mn-cs"/>
+              </a:defRPr>
+            </a:lvl8pPr>
+            <a:lvl9pPr marL="3657600" algn="l" defTabSz="914400" rtl="0" eaLnBrk="1" latinLnBrk="0" hangingPunct="1">
+              <a:defRPr sz="1800" kern="1200">
+                <a:solidFill>
+                  <a:schemeClr val="tx1"/>
+                </a:solidFill>
+                <a:latin typeface="+mn-lt"/>
+                <a:ea typeface="+mn-ea"/>
+                <a:cs typeface="+mn-cs"/>
+              </a:defRPr>
+            </a:lvl9pPr>
+          </a:lstStyle>
+          <a:p>
+            <a:fld id="{888E4D63-BE2C-4D4B-BBD2-256262659A9F}" type="datetime1">
+              <a:rPr lang="sv-SE" smtClean="0">
+                <a:solidFill>
+                  <a:schemeClr val="bg1">
+                    <a:lumMod val="50000"/>
+                  </a:schemeClr>
+                </a:solidFill>
+              </a:rPr>
+              <a:pPr/>
+              <a:t>2025-05-21</a:t>
+            </a:fld>
+            <a:endParaRPr lang="sv-SE" dirty="0">
+              <a:solidFill>
+                <a:schemeClr val="bg1">
+                  <a:lumMod val="50000"/>
+                </a:schemeClr>
+              </a:solidFill>
+            </a:endParaRPr>
+          </a:p>
+        </p:txBody>
+      </p:sp>
+      <p:sp>
+        <p:nvSpPr>
+          <p:cNvPr id="8" name="Platshållare för sidfot 4">
+            <a:extLst>
+              <a:ext uri="{FF2B5EF4-FFF2-40B4-BE49-F238E27FC236}">
+                <a16:creationId xmlns:a16="http://schemas.microsoft.com/office/drawing/2014/main" id="{A2E16514-729B-21BB-EF96-27ABF586F77B}"/>
+              </a:ext>
+            </a:extLst>
+          </p:cNvPr>
+          <p:cNvSpPr txBox="1">
+            <a:spLocks/>
+          </p:cNvSpPr>
+          <p:nvPr/>
+        </p:nvSpPr>
+        <p:spPr>
+          <a:xfrm>
+            <a:off x="1955800" y="6470364"/>
+            <a:ext cx="8280399" cy="220120"/>
+          </a:xfrm>
+          <a:prstGeom prst="rect">
+            <a:avLst/>
+          </a:prstGeom>
+        </p:spPr>
+        <p:txBody>
+          <a:bodyPr vert="horz" lIns="91440" tIns="45720" rIns="91440" bIns="45720" rtlCol="0" anchor="ctr"/>
+          <a:lstStyle>
+            <a:defPPr>
+              <a:defRPr lang="sv-SE"/>
+            </a:defPPr>
+            <a:lvl1pPr marL="0" algn="ctr" defTabSz="914400" rtl="0" eaLnBrk="1" latinLnBrk="0" hangingPunct="1">
+              <a:defRPr sz="1200" kern="1200">
+                <a:solidFill>
+                  <a:schemeClr val="accent2"/>
+                </a:solidFill>
+                <a:latin typeface="+mn-lt"/>
+                <a:ea typeface="+mn-ea"/>
+                <a:cs typeface="+mn-cs"/>
+              </a:defRPr>
+            </a:lvl1pPr>
+            <a:lvl2pPr marL="457200" algn="l" defTabSz="914400" rtl="0" eaLnBrk="1" latinLnBrk="0" hangingPunct="1">
+              <a:defRPr sz="1800" kern="1200">
+                <a:solidFill>
+                  <a:schemeClr val="tx1"/>
+                </a:solidFill>
+                <a:latin typeface="+mn-lt"/>
+                <a:ea typeface="+mn-ea"/>
+                <a:cs typeface="+mn-cs"/>
+              </a:defRPr>
+            </a:lvl2pPr>
+            <a:lvl3pPr marL="914400" algn="l" defTabSz="914400" rtl="0" eaLnBrk="1" latinLnBrk="0" hangingPunct="1">
+              <a:defRPr sz="1800" kern="1200">
+                <a:solidFill>
+                  <a:schemeClr val="tx1"/>
+                </a:solidFill>
+                <a:latin typeface="+mn-lt"/>
+                <a:ea typeface="+mn-ea"/>
+                <a:cs typeface="+mn-cs"/>
+              </a:defRPr>
+            </a:lvl3pPr>
+            <a:lvl4pPr marL="1371600" algn="l" defTabSz="914400" rtl="0" eaLnBrk="1" latinLnBrk="0" hangingPunct="1">
+              <a:defRPr sz="1800" kern="1200">
+                <a:solidFill>
+                  <a:schemeClr val="tx1"/>
+                </a:solidFill>
+                <a:latin typeface="+mn-lt"/>
+                <a:ea typeface="+mn-ea"/>
+                <a:cs typeface="+mn-cs"/>
+              </a:defRPr>
+            </a:lvl4pPr>
+            <a:lvl5pPr marL="1828800" algn="l" defTabSz="914400" rtl="0" eaLnBrk="1" latinLnBrk="0" hangingPunct="1">
+              <a:defRPr sz="1800" kern="1200">
+                <a:solidFill>
+                  <a:schemeClr val="tx1"/>
+                </a:solidFill>
+                <a:latin typeface="+mn-lt"/>
+                <a:ea typeface="+mn-ea"/>
+                <a:cs typeface="+mn-cs"/>
+              </a:defRPr>
+            </a:lvl5pPr>
+            <a:lvl6pPr marL="2286000" algn="l" defTabSz="914400" rtl="0" eaLnBrk="1" latinLnBrk="0" hangingPunct="1">
+              <a:defRPr sz="1800" kern="1200">
+                <a:solidFill>
+                  <a:schemeClr val="tx1"/>
+                </a:solidFill>
+                <a:latin typeface="+mn-lt"/>
+                <a:ea typeface="+mn-ea"/>
+                <a:cs typeface="+mn-cs"/>
+              </a:defRPr>
+            </a:lvl6pPr>
+            <a:lvl7pPr marL="2743200" algn="l" defTabSz="914400" rtl="0" eaLnBrk="1" latinLnBrk="0" hangingPunct="1">
+              <a:defRPr sz="1800" kern="1200">
+                <a:solidFill>
+                  <a:schemeClr val="tx1"/>
+                </a:solidFill>
+                <a:latin typeface="+mn-lt"/>
+                <a:ea typeface="+mn-ea"/>
+                <a:cs typeface="+mn-cs"/>
+              </a:defRPr>
+            </a:lvl7pPr>
+            <a:lvl8pPr marL="3200400" algn="l" defTabSz="914400" rtl="0" eaLnBrk="1" latinLnBrk="0" hangingPunct="1">
+              <a:defRPr sz="1800" kern="1200">
+                <a:solidFill>
+                  <a:schemeClr val="tx1"/>
+                </a:solidFill>
+                <a:latin typeface="+mn-lt"/>
+                <a:ea typeface="+mn-ea"/>
+                <a:cs typeface="+mn-cs"/>
+              </a:defRPr>
+            </a:lvl8pPr>
+            <a:lvl9pPr marL="3657600" algn="l" defTabSz="914400" rtl="0" eaLnBrk="1" latinLnBrk="0" hangingPunct="1">
+              <a:defRPr sz="1800" kern="1200">
+                <a:solidFill>
+                  <a:schemeClr val="tx1"/>
+                </a:solidFill>
+                <a:latin typeface="+mn-lt"/>
+                <a:ea typeface="+mn-ea"/>
+                <a:cs typeface="+mn-cs"/>
+              </a:defRPr>
+            </a:lvl9pPr>
+          </a:lstStyle>
+          <a:p>
+            <a:r>
+              <a:rPr lang="sv-SE">
+                <a:solidFill>
+                  <a:schemeClr val="bg1">
+                    <a:lumMod val="50000"/>
+                  </a:schemeClr>
+                </a:solidFill>
+              </a:rPr>
+              <a:t>DD2424 Project: Transfer Learning | Ksenia Biazruchanka, Tobias Haunreiter, Alexander Soukup, Johannes Jeup</a:t>
+            </a:r>
+            <a:endParaRPr lang="sv-SE" dirty="0">
+              <a:solidFill>
+                <a:schemeClr val="bg1">
+                  <a:lumMod val="50000"/>
+                </a:schemeClr>
+              </a:solidFill>
+            </a:endParaRPr>
+          </a:p>
+        </p:txBody>
+      </p:sp>
+      <p:sp>
+        <p:nvSpPr>
+          <p:cNvPr id="9" name="Platshållare för bildnummer 5">
+            <a:extLst>
+              <a:ext uri="{FF2B5EF4-FFF2-40B4-BE49-F238E27FC236}">
+                <a16:creationId xmlns:a16="http://schemas.microsoft.com/office/drawing/2014/main" id="{8BD878A8-C905-F916-2A74-27C87CD3820F}"/>
+              </a:ext>
+            </a:extLst>
+          </p:cNvPr>
+          <p:cNvSpPr txBox="1">
+            <a:spLocks/>
+          </p:cNvSpPr>
+          <p:nvPr/>
+        </p:nvSpPr>
+        <p:spPr>
+          <a:xfrm>
+            <a:off x="10236199" y="6473328"/>
+            <a:ext cx="1355726" cy="220120"/>
+          </a:xfrm>
+          <a:prstGeom prst="rect">
+            <a:avLst/>
+          </a:prstGeom>
+        </p:spPr>
+        <p:txBody>
+          <a:bodyPr vert="horz" lIns="91440" tIns="45720" rIns="91440" bIns="45720" rtlCol="0" anchor="ctr"/>
+          <a:lstStyle>
+            <a:defPPr>
+              <a:defRPr lang="sv-SE"/>
+            </a:defPPr>
+            <a:lvl1pPr marL="0" algn="r" defTabSz="914400" rtl="0" eaLnBrk="1" latinLnBrk="0" hangingPunct="1">
+              <a:defRPr sz="1200" kern="1200">
+                <a:solidFill>
+                  <a:schemeClr val="accent2"/>
+                </a:solidFill>
+                <a:latin typeface="+mn-lt"/>
+                <a:ea typeface="+mn-ea"/>
+                <a:cs typeface="+mn-cs"/>
+              </a:defRPr>
+            </a:lvl1pPr>
+            <a:lvl2pPr marL="457200" algn="l" defTabSz="914400" rtl="0" eaLnBrk="1" latinLnBrk="0" hangingPunct="1">
+              <a:defRPr sz="1800" kern="1200">
+                <a:solidFill>
+                  <a:schemeClr val="tx1"/>
+                </a:solidFill>
+                <a:latin typeface="+mn-lt"/>
+                <a:ea typeface="+mn-ea"/>
+                <a:cs typeface="+mn-cs"/>
+              </a:defRPr>
+            </a:lvl2pPr>
+            <a:lvl3pPr marL="914400" algn="l" defTabSz="914400" rtl="0" eaLnBrk="1" latinLnBrk="0" hangingPunct="1">
+              <a:defRPr sz="1800" kern="1200">
+                <a:solidFill>
+                  <a:schemeClr val="tx1"/>
+                </a:solidFill>
+                <a:latin typeface="+mn-lt"/>
+                <a:ea typeface="+mn-ea"/>
+                <a:cs typeface="+mn-cs"/>
+              </a:defRPr>
+            </a:lvl3pPr>
+            <a:lvl4pPr marL="1371600" algn="l" defTabSz="914400" rtl="0" eaLnBrk="1" latinLnBrk="0" hangingPunct="1">
+              <a:defRPr sz="1800" kern="1200">
+                <a:solidFill>
+                  <a:schemeClr val="tx1"/>
+                </a:solidFill>
+                <a:latin typeface="+mn-lt"/>
+                <a:ea typeface="+mn-ea"/>
+                <a:cs typeface="+mn-cs"/>
+              </a:defRPr>
+            </a:lvl4pPr>
+            <a:lvl5pPr marL="1828800" algn="l" defTabSz="914400" rtl="0" eaLnBrk="1" latinLnBrk="0" hangingPunct="1">
+              <a:defRPr sz="1800" kern="1200">
+                <a:solidFill>
+                  <a:schemeClr val="tx1"/>
+                </a:solidFill>
+                <a:latin typeface="+mn-lt"/>
+                <a:ea typeface="+mn-ea"/>
+                <a:cs typeface="+mn-cs"/>
+              </a:defRPr>
+            </a:lvl5pPr>
+            <a:lvl6pPr marL="2286000" algn="l" defTabSz="914400" rtl="0" eaLnBrk="1" latinLnBrk="0" hangingPunct="1">
+              <a:defRPr sz="1800" kern="1200">
+                <a:solidFill>
+                  <a:schemeClr val="tx1"/>
+                </a:solidFill>
+                <a:latin typeface="+mn-lt"/>
+                <a:ea typeface="+mn-ea"/>
+                <a:cs typeface="+mn-cs"/>
+              </a:defRPr>
+            </a:lvl6pPr>
+            <a:lvl7pPr marL="2743200" algn="l" defTabSz="914400" rtl="0" eaLnBrk="1" latinLnBrk="0" hangingPunct="1">
+              <a:defRPr sz="1800" kern="1200">
+                <a:solidFill>
+                  <a:schemeClr val="tx1"/>
+                </a:solidFill>
+                <a:latin typeface="+mn-lt"/>
+                <a:ea typeface="+mn-ea"/>
+                <a:cs typeface="+mn-cs"/>
+              </a:defRPr>
+            </a:lvl7pPr>
+            <a:lvl8pPr marL="3200400" algn="l" defTabSz="914400" rtl="0" eaLnBrk="1" latinLnBrk="0" hangingPunct="1">
+              <a:defRPr sz="1800" kern="1200">
+                <a:solidFill>
+                  <a:schemeClr val="tx1"/>
+                </a:solidFill>
+                <a:latin typeface="+mn-lt"/>
+                <a:ea typeface="+mn-ea"/>
+                <a:cs typeface="+mn-cs"/>
+              </a:defRPr>
+            </a:lvl8pPr>
+            <a:lvl9pPr marL="3657600" algn="l" defTabSz="914400" rtl="0" eaLnBrk="1" latinLnBrk="0" hangingPunct="1">
+              <a:defRPr sz="1800" kern="1200">
+                <a:solidFill>
+                  <a:schemeClr val="tx1"/>
+                </a:solidFill>
+                <a:latin typeface="+mn-lt"/>
+                <a:ea typeface="+mn-ea"/>
+                <a:cs typeface="+mn-cs"/>
+              </a:defRPr>
+            </a:lvl9pPr>
+          </a:lstStyle>
+          <a:p>
+            <a:fld id="{B716C8F4-20CD-364A-8A8E-DE130115B178}" type="slidenum">
+              <a:rPr lang="sv-SE" smtClean="0">
+                <a:solidFill>
+                  <a:schemeClr val="bg1">
+                    <a:lumMod val="50000"/>
+                  </a:schemeClr>
+                </a:solidFill>
+              </a:rPr>
+              <a:pPr/>
+              <a:t>7</a:t>
+            </a:fld>
+            <a:endParaRPr lang="sv-SE" dirty="0">
+              <a:solidFill>
+                <a:schemeClr val="bg1">
+                  <a:lumMod val="50000"/>
+                </a:schemeClr>
+              </a:solidFill>
+            </a:endParaRPr>
+          </a:p>
+        </p:txBody>
+      </p:sp>
+    </p:spTree>
+    <p:extLst>
+      <p:ext uri="{BB962C8B-B14F-4D97-AF65-F5344CB8AC3E}">
+        <p14:creationId xmlns:p14="http://schemas.microsoft.com/office/powerpoint/2010/main" val="2196825616"/>
       </p:ext>
     </p:extLst>
   </p:cSld>

</xml_diff>